<commit_message>
implement ./src/queue `not tested`
</commit_message>
<xml_diff>
--- a/bookshelf.index.pptx
+++ b/bookshelf.index.pptx
@@ -9,6 +9,7 @@
     <p:sldId id="257" r:id="rId3"/>
     <p:sldId id="259" r:id="rId4"/>
     <p:sldId id="260" r:id="rId5"/>
+    <p:sldId id="261" r:id="rId6"/>
   </p:sldIdLst>
   <p:sldSz cx="12192000" cy="6858000"/>
   <p:notesSz cx="6858000" cy="9144000"/>
@@ -7254,7 +7255,7 @@
             </a:r>
             <a:r>
               <a:rPr lang="en-US" altLang="ko-KR" dirty="0"/>
-              <a:t>/database</a:t>
+              <a:t>/database/</a:t>
             </a:r>
             <a:endParaRPr lang="ko-KR" altLang="en-US" dirty="0"/>
           </a:p>
@@ -7463,6 +7464,1589 @@
     <p:extLst>
       <p:ext uri="{BB962C8B-B14F-4D97-AF65-F5344CB8AC3E}">
         <p14:creationId xmlns:p14="http://schemas.microsoft.com/office/powerpoint/2010/main" val="363624100"/>
+      </p:ext>
+    </p:extLst>
+  </p:cSld>
+  <p:clrMapOvr>
+    <a:masterClrMapping/>
+  </p:clrMapOvr>
+</p:sld>
+</file>
+
+<file path=ppt/slides/slide5.xml><?xml version="1.0" encoding="utf-8"?>
+<p:sld xmlns:a="http://schemas.openxmlformats.org/drawingml/2006/main" xmlns:r="http://schemas.openxmlformats.org/officeDocument/2006/relationships" xmlns:p="http://schemas.openxmlformats.org/presentationml/2006/main">
+  <p:cSld>
+    <p:spTree>
+      <p:nvGrpSpPr>
+        <p:cNvPr id="1" name=""/>
+        <p:cNvGrpSpPr/>
+        <p:nvPr/>
+      </p:nvGrpSpPr>
+      <p:grpSpPr>
+        <a:xfrm>
+          <a:off x="0" y="0"/>
+          <a:ext cx="0" cy="0"/>
+          <a:chOff x="0" y="0"/>
+          <a:chExt cx="0" cy="0"/>
+        </a:xfrm>
+      </p:grpSpPr>
+      <p:sp>
+        <p:nvSpPr>
+          <p:cNvPr id="4" name="직사각형 3">
+            <a:extLst>
+              <a:ext uri="{FF2B5EF4-FFF2-40B4-BE49-F238E27FC236}">
+                <a16:creationId xmlns:a16="http://schemas.microsoft.com/office/drawing/2014/main" id="{D70BD8EF-8717-4ECD-AFDC-77F330B1E7DC}"/>
+              </a:ext>
+            </a:extLst>
+          </p:cNvPr>
+          <p:cNvSpPr/>
+          <p:nvPr/>
+        </p:nvSpPr>
+        <p:spPr>
+          <a:xfrm>
+            <a:off x="243068" y="242496"/>
+            <a:ext cx="1504709" cy="369332"/>
+          </a:xfrm>
+          <a:prstGeom prst="rect">
+            <a:avLst/>
+          </a:prstGeom>
+        </p:spPr>
+        <p:style>
+          <a:lnRef idx="2">
+            <a:schemeClr val="accent5"/>
+          </a:lnRef>
+          <a:fillRef idx="1">
+            <a:schemeClr val="lt1"/>
+          </a:fillRef>
+          <a:effectRef idx="0">
+            <a:schemeClr val="accent5"/>
+          </a:effectRef>
+          <a:fontRef idx="minor">
+            <a:schemeClr val="dk1"/>
+          </a:fontRef>
+        </p:style>
+        <p:txBody>
+          <a:bodyPr wrap="square" rtlCol="0" anchor="ctr">
+            <a:spAutoFit/>
+          </a:bodyPr>
+          <a:lstStyle/>
+          <a:p>
+            <a:pPr algn="ctr"/>
+            <a:r>
+              <a:rPr lang="en-US" altLang="ko-KR" dirty="0"/>
+              <a:t>./</a:t>
+            </a:r>
+            <a:r>
+              <a:rPr lang="en-US" altLang="ko-KR" dirty="0" err="1"/>
+              <a:t>src</a:t>
+            </a:r>
+            <a:r>
+              <a:rPr lang="en-US" altLang="ko-KR" dirty="0"/>
+              <a:t>/queue/</a:t>
+            </a:r>
+            <a:endParaRPr lang="ko-KR" altLang="en-US" dirty="0"/>
+          </a:p>
+        </p:txBody>
+      </p:sp>
+      <p:sp>
+        <p:nvSpPr>
+          <p:cNvPr id="9" name="사각형: 둥근 모서리 8">
+            <a:extLst>
+              <a:ext uri="{FF2B5EF4-FFF2-40B4-BE49-F238E27FC236}">
+                <a16:creationId xmlns:a16="http://schemas.microsoft.com/office/drawing/2014/main" id="{383D294D-9204-4679-8E68-7D8EFC2BD112}"/>
+              </a:ext>
+            </a:extLst>
+          </p:cNvPr>
+          <p:cNvSpPr/>
+          <p:nvPr/>
+        </p:nvSpPr>
+        <p:spPr>
+          <a:xfrm>
+            <a:off x="1474980" y="1738848"/>
+            <a:ext cx="1331088" cy="408623"/>
+          </a:xfrm>
+          <a:prstGeom prst="roundRect">
+            <a:avLst/>
+          </a:prstGeom>
+        </p:spPr>
+        <p:style>
+          <a:lnRef idx="2">
+            <a:schemeClr val="accent5"/>
+          </a:lnRef>
+          <a:fillRef idx="1">
+            <a:schemeClr val="lt1"/>
+          </a:fillRef>
+          <a:effectRef idx="0">
+            <a:schemeClr val="accent5"/>
+          </a:effectRef>
+          <a:fontRef idx="minor">
+            <a:schemeClr val="dk1"/>
+          </a:fontRef>
+        </p:style>
+        <p:txBody>
+          <a:bodyPr wrap="square" rtlCol="0" anchor="ctr">
+            <a:spAutoFit/>
+          </a:bodyPr>
+          <a:lstStyle/>
+          <a:p>
+            <a:pPr algn="ctr"/>
+            <a:r>
+              <a:rPr lang="en-US" altLang="ko-KR" dirty="0"/>
+              <a:t>./library/</a:t>
+            </a:r>
+            <a:endParaRPr lang="ko-KR" altLang="en-US" dirty="0"/>
+          </a:p>
+        </p:txBody>
+      </p:sp>
+      <p:sp>
+        <p:nvSpPr>
+          <p:cNvPr id="10" name="사각형: 둥근 모서리 9">
+            <a:extLst>
+              <a:ext uri="{FF2B5EF4-FFF2-40B4-BE49-F238E27FC236}">
+                <a16:creationId xmlns:a16="http://schemas.microsoft.com/office/drawing/2014/main" id="{052B5B97-EA70-4714-AB2A-04EEA14B4504}"/>
+              </a:ext>
+            </a:extLst>
+          </p:cNvPr>
+          <p:cNvSpPr/>
+          <p:nvPr/>
+        </p:nvSpPr>
+        <p:spPr>
+          <a:xfrm>
+            <a:off x="1474980" y="3479985"/>
+            <a:ext cx="1504708" cy="408623"/>
+          </a:xfrm>
+          <a:prstGeom prst="roundRect">
+            <a:avLst/>
+          </a:prstGeom>
+        </p:spPr>
+        <p:style>
+          <a:lnRef idx="2">
+            <a:schemeClr val="accent5"/>
+          </a:lnRef>
+          <a:fillRef idx="1">
+            <a:schemeClr val="lt1"/>
+          </a:fillRef>
+          <a:effectRef idx="0">
+            <a:schemeClr val="accent5"/>
+          </a:effectRef>
+          <a:fontRef idx="minor">
+            <a:schemeClr val="dk1"/>
+          </a:fontRef>
+        </p:style>
+        <p:txBody>
+          <a:bodyPr wrap="square" rtlCol="0" anchor="ctr">
+            <a:spAutoFit/>
+          </a:bodyPr>
+          <a:lstStyle/>
+          <a:p>
+            <a:pPr algn="ctr"/>
+            <a:r>
+              <a:rPr lang="en-US" altLang="ko-KR" dirty="0"/>
+              <a:t>./database/</a:t>
+            </a:r>
+            <a:endParaRPr lang="ko-KR" altLang="en-US" dirty="0"/>
+          </a:p>
+        </p:txBody>
+      </p:sp>
+      <p:sp>
+        <p:nvSpPr>
+          <p:cNvPr id="13" name="사각형: 둥근 모서리 12">
+            <a:extLst>
+              <a:ext uri="{FF2B5EF4-FFF2-40B4-BE49-F238E27FC236}">
+                <a16:creationId xmlns:a16="http://schemas.microsoft.com/office/drawing/2014/main" id="{CD760EB8-021D-4F35-B460-C040B21F10C6}"/>
+              </a:ext>
+            </a:extLst>
+          </p:cNvPr>
+          <p:cNvSpPr/>
+          <p:nvPr/>
+        </p:nvSpPr>
+        <p:spPr>
+          <a:xfrm>
+            <a:off x="1466695" y="713612"/>
+            <a:ext cx="1210347" cy="408623"/>
+          </a:xfrm>
+          <a:prstGeom prst="roundRect">
+            <a:avLst/>
+          </a:prstGeom>
+        </p:spPr>
+        <p:style>
+          <a:lnRef idx="2">
+            <a:schemeClr val="accent5"/>
+          </a:lnRef>
+          <a:fillRef idx="1">
+            <a:schemeClr val="lt1"/>
+          </a:fillRef>
+          <a:effectRef idx="0">
+            <a:schemeClr val="accent5"/>
+          </a:effectRef>
+          <a:fontRef idx="minor">
+            <a:schemeClr val="dk1"/>
+          </a:fontRef>
+        </p:style>
+        <p:txBody>
+          <a:bodyPr wrap="square" rtlCol="0" anchor="ctr">
+            <a:spAutoFit/>
+          </a:bodyPr>
+          <a:lstStyle/>
+          <a:p>
+            <a:pPr algn="ctr"/>
+            <a:r>
+              <a:rPr lang="en-US" altLang="ko-KR" dirty="0"/>
+              <a:t>./index.js</a:t>
+            </a:r>
+            <a:endParaRPr lang="ko-KR" altLang="en-US" dirty="0"/>
+          </a:p>
+        </p:txBody>
+      </p:sp>
+      <p:cxnSp>
+        <p:nvCxnSpPr>
+          <p:cNvPr id="18" name="연결선: 꺾임 17">
+            <a:extLst>
+              <a:ext uri="{FF2B5EF4-FFF2-40B4-BE49-F238E27FC236}">
+                <a16:creationId xmlns:a16="http://schemas.microsoft.com/office/drawing/2014/main" id="{AFCBC277-5EA5-438D-BDDA-67DCFF20175F}"/>
+              </a:ext>
+            </a:extLst>
+          </p:cNvPr>
+          <p:cNvCxnSpPr>
+            <a:stCxn id="4" idx="2"/>
+            <a:endCxn id="13" idx="1"/>
+          </p:cNvCxnSpPr>
+          <p:nvPr/>
+        </p:nvCxnSpPr>
+        <p:spPr>
+          <a:xfrm rot="16200000" flipH="1">
+            <a:off x="1078011" y="529240"/>
+            <a:ext cx="306096" cy="471272"/>
+          </a:xfrm>
+          <a:prstGeom prst="bentConnector2">
+            <a:avLst/>
+          </a:prstGeom>
+        </p:spPr>
+        <p:style>
+          <a:lnRef idx="1">
+            <a:schemeClr val="accent1"/>
+          </a:lnRef>
+          <a:fillRef idx="0">
+            <a:schemeClr val="accent1"/>
+          </a:fillRef>
+          <a:effectRef idx="0">
+            <a:schemeClr val="accent1"/>
+          </a:effectRef>
+          <a:fontRef idx="minor">
+            <a:schemeClr val="tx1"/>
+          </a:fontRef>
+        </p:style>
+      </p:cxnSp>
+      <p:cxnSp>
+        <p:nvCxnSpPr>
+          <p:cNvPr id="20" name="연결선: 꺾임 19">
+            <a:extLst>
+              <a:ext uri="{FF2B5EF4-FFF2-40B4-BE49-F238E27FC236}">
+                <a16:creationId xmlns:a16="http://schemas.microsoft.com/office/drawing/2014/main" id="{22509D3B-4610-4B79-86A2-B7608348322C}"/>
+              </a:ext>
+            </a:extLst>
+          </p:cNvPr>
+          <p:cNvCxnSpPr>
+            <a:stCxn id="4" idx="2"/>
+            <a:endCxn id="9" idx="1"/>
+          </p:cNvCxnSpPr>
+          <p:nvPr/>
+        </p:nvCxnSpPr>
+        <p:spPr>
+          <a:xfrm rot="16200000" flipH="1">
+            <a:off x="569535" y="1037715"/>
+            <a:ext cx="1331332" cy="479557"/>
+          </a:xfrm>
+          <a:prstGeom prst="bentConnector2">
+            <a:avLst/>
+          </a:prstGeom>
+        </p:spPr>
+        <p:style>
+          <a:lnRef idx="1">
+            <a:schemeClr val="accent1"/>
+          </a:lnRef>
+          <a:fillRef idx="0">
+            <a:schemeClr val="accent1"/>
+          </a:fillRef>
+          <a:effectRef idx="0">
+            <a:schemeClr val="accent1"/>
+          </a:effectRef>
+          <a:fontRef idx="minor">
+            <a:schemeClr val="tx1"/>
+          </a:fontRef>
+        </p:style>
+      </p:cxnSp>
+      <p:cxnSp>
+        <p:nvCxnSpPr>
+          <p:cNvPr id="22" name="연결선: 꺾임 21">
+            <a:extLst>
+              <a:ext uri="{FF2B5EF4-FFF2-40B4-BE49-F238E27FC236}">
+                <a16:creationId xmlns:a16="http://schemas.microsoft.com/office/drawing/2014/main" id="{D7F5E837-3F99-49F5-9A13-BDFFA4647A12}"/>
+              </a:ext>
+            </a:extLst>
+          </p:cNvPr>
+          <p:cNvCxnSpPr>
+            <a:stCxn id="4" idx="2"/>
+            <a:endCxn id="10" idx="1"/>
+          </p:cNvCxnSpPr>
+          <p:nvPr/>
+        </p:nvCxnSpPr>
+        <p:spPr>
+          <a:xfrm rot="16200000" flipH="1">
+            <a:off x="-301033" y="1908283"/>
+            <a:ext cx="3072469" cy="479557"/>
+          </a:xfrm>
+          <a:prstGeom prst="bentConnector2">
+            <a:avLst/>
+          </a:prstGeom>
+        </p:spPr>
+        <p:style>
+          <a:lnRef idx="1">
+            <a:schemeClr val="accent1"/>
+          </a:lnRef>
+          <a:fillRef idx="0">
+            <a:schemeClr val="accent1"/>
+          </a:fillRef>
+          <a:effectRef idx="0">
+            <a:schemeClr val="accent1"/>
+          </a:effectRef>
+          <a:fontRef idx="minor">
+            <a:schemeClr val="tx1"/>
+          </a:fontRef>
+        </p:style>
+      </p:cxnSp>
+      <p:sp>
+        <p:nvSpPr>
+          <p:cNvPr id="65" name="직사각형 64">
+            <a:extLst>
+              <a:ext uri="{FF2B5EF4-FFF2-40B4-BE49-F238E27FC236}">
+                <a16:creationId xmlns:a16="http://schemas.microsoft.com/office/drawing/2014/main" id="{DAF309D5-A662-491B-BEC7-CEF52897EAD4}"/>
+              </a:ext>
+            </a:extLst>
+          </p:cNvPr>
+          <p:cNvSpPr/>
+          <p:nvPr/>
+        </p:nvSpPr>
+        <p:spPr>
+          <a:xfrm>
+            <a:off x="4530697" y="242496"/>
+            <a:ext cx="1962702" cy="369332"/>
+          </a:xfrm>
+          <a:prstGeom prst="rect">
+            <a:avLst/>
+          </a:prstGeom>
+        </p:spPr>
+        <p:style>
+          <a:lnRef idx="2">
+            <a:schemeClr val="accent5"/>
+          </a:lnRef>
+          <a:fillRef idx="1">
+            <a:schemeClr val="lt1"/>
+          </a:fillRef>
+          <a:effectRef idx="0">
+            <a:schemeClr val="accent5"/>
+          </a:effectRef>
+          <a:fontRef idx="minor">
+            <a:schemeClr val="dk1"/>
+          </a:fontRef>
+        </p:style>
+        <p:txBody>
+          <a:bodyPr wrap="square" rtlCol="0" anchor="ctr">
+            <a:spAutoFit/>
+          </a:bodyPr>
+          <a:lstStyle/>
+          <a:p>
+            <a:pPr algn="ctr"/>
+            <a:r>
+              <a:rPr lang="en-US" altLang="ko-KR" dirty="0"/>
+              <a:t>./</a:t>
+            </a:r>
+            <a:r>
+              <a:rPr lang="en-US" altLang="ko-KR" dirty="0" err="1"/>
+              <a:t>src</a:t>
+            </a:r>
+            <a:r>
+              <a:rPr lang="en-US" altLang="ko-KR" dirty="0"/>
+              <a:t>/processor/</a:t>
+            </a:r>
+            <a:endParaRPr lang="ko-KR" altLang="en-US" dirty="0"/>
+          </a:p>
+        </p:txBody>
+      </p:sp>
+      <p:cxnSp>
+        <p:nvCxnSpPr>
+          <p:cNvPr id="81" name="연결선: 꺾임 80">
+            <a:extLst>
+              <a:ext uri="{FF2B5EF4-FFF2-40B4-BE49-F238E27FC236}">
+                <a16:creationId xmlns:a16="http://schemas.microsoft.com/office/drawing/2014/main" id="{D6B733BD-50F5-4A64-863C-7002FF7EA3DC}"/>
+              </a:ext>
+            </a:extLst>
+          </p:cNvPr>
+          <p:cNvCxnSpPr>
+            <a:stCxn id="9" idx="3"/>
+            <a:endCxn id="13" idx="2"/>
+          </p:cNvCxnSpPr>
+          <p:nvPr/>
+        </p:nvCxnSpPr>
+        <p:spPr>
+          <a:xfrm flipH="1" flipV="1">
+            <a:off x="2071869" y="1122235"/>
+            <a:ext cx="734199" cy="820925"/>
+          </a:xfrm>
+          <a:prstGeom prst="bentConnector4">
+            <a:avLst>
+              <a:gd name="adj1" fmla="val -31136"/>
+              <a:gd name="adj2" fmla="val 62444"/>
+            </a:avLst>
+          </a:prstGeom>
+          <a:ln>
+            <a:tailEnd type="triangle"/>
+          </a:ln>
+        </p:spPr>
+        <p:style>
+          <a:lnRef idx="1">
+            <a:schemeClr val="accent1"/>
+          </a:lnRef>
+          <a:fillRef idx="0">
+            <a:schemeClr val="accent1"/>
+          </a:fillRef>
+          <a:effectRef idx="0">
+            <a:schemeClr val="accent1"/>
+          </a:effectRef>
+          <a:fontRef idx="minor">
+            <a:schemeClr val="tx1"/>
+          </a:fontRef>
+        </p:style>
+      </p:cxnSp>
+      <p:cxnSp>
+        <p:nvCxnSpPr>
+          <p:cNvPr id="83" name="연결선: 꺾임 82">
+            <a:extLst>
+              <a:ext uri="{FF2B5EF4-FFF2-40B4-BE49-F238E27FC236}">
+                <a16:creationId xmlns:a16="http://schemas.microsoft.com/office/drawing/2014/main" id="{AB423549-89E3-47E0-A87C-F6E1719D403D}"/>
+              </a:ext>
+            </a:extLst>
+          </p:cNvPr>
+          <p:cNvCxnSpPr>
+            <a:stCxn id="10" idx="3"/>
+            <a:endCxn id="13" idx="2"/>
+          </p:cNvCxnSpPr>
+          <p:nvPr/>
+        </p:nvCxnSpPr>
+        <p:spPr>
+          <a:xfrm flipH="1" flipV="1">
+            <a:off x="2071869" y="1122235"/>
+            <a:ext cx="907819" cy="2562062"/>
+          </a:xfrm>
+          <a:prstGeom prst="bentConnector4">
+            <a:avLst>
+              <a:gd name="adj1" fmla="val -21356"/>
+              <a:gd name="adj2" fmla="val 83352"/>
+            </a:avLst>
+          </a:prstGeom>
+          <a:ln>
+            <a:tailEnd type="triangle"/>
+          </a:ln>
+        </p:spPr>
+        <p:style>
+          <a:lnRef idx="1">
+            <a:schemeClr val="accent1"/>
+          </a:lnRef>
+          <a:fillRef idx="0">
+            <a:schemeClr val="accent1"/>
+          </a:fillRef>
+          <a:effectRef idx="0">
+            <a:schemeClr val="accent1"/>
+          </a:effectRef>
+          <a:fontRef idx="minor">
+            <a:schemeClr val="tx1"/>
+          </a:fontRef>
+        </p:style>
+      </p:cxnSp>
+      <p:sp>
+        <p:nvSpPr>
+          <p:cNvPr id="11" name="사각형: 둥근 모서리 10">
+            <a:extLst>
+              <a:ext uri="{FF2B5EF4-FFF2-40B4-BE49-F238E27FC236}">
+                <a16:creationId xmlns:a16="http://schemas.microsoft.com/office/drawing/2014/main" id="{FD657F31-49FE-4273-9856-7EB7E5DD7F10}"/>
+              </a:ext>
+            </a:extLst>
+          </p:cNvPr>
+          <p:cNvSpPr/>
+          <p:nvPr/>
+        </p:nvSpPr>
+        <p:spPr>
+          <a:xfrm>
+            <a:off x="2370372" y="2240945"/>
+            <a:ext cx="1226916" cy="408623"/>
+          </a:xfrm>
+          <a:prstGeom prst="roundRect">
+            <a:avLst/>
+          </a:prstGeom>
+        </p:spPr>
+        <p:style>
+          <a:lnRef idx="2">
+            <a:schemeClr val="accent5"/>
+          </a:lnRef>
+          <a:fillRef idx="1">
+            <a:schemeClr val="lt1"/>
+          </a:fillRef>
+          <a:effectRef idx="0">
+            <a:schemeClr val="accent5"/>
+          </a:effectRef>
+          <a:fontRef idx="minor">
+            <a:schemeClr val="dk1"/>
+          </a:fontRef>
+        </p:style>
+        <p:txBody>
+          <a:bodyPr wrap="square" rtlCol="0" anchor="ctr">
+            <a:spAutoFit/>
+          </a:bodyPr>
+          <a:lstStyle/>
+          <a:p>
+            <a:pPr algn="ctr"/>
+            <a:r>
+              <a:rPr lang="en-US" altLang="ko-KR" dirty="0"/>
+              <a:t>./scan.js</a:t>
+            </a:r>
+            <a:endParaRPr lang="ko-KR" altLang="en-US" dirty="0"/>
+          </a:p>
+        </p:txBody>
+      </p:sp>
+      <p:sp>
+        <p:nvSpPr>
+          <p:cNvPr id="12" name="사각형: 둥근 모서리 11">
+            <a:extLst>
+              <a:ext uri="{FF2B5EF4-FFF2-40B4-BE49-F238E27FC236}">
+                <a16:creationId xmlns:a16="http://schemas.microsoft.com/office/drawing/2014/main" id="{910C8017-76CA-4856-ACDF-3F6A282AD2DF}"/>
+              </a:ext>
+            </a:extLst>
+          </p:cNvPr>
+          <p:cNvSpPr/>
+          <p:nvPr/>
+        </p:nvSpPr>
+        <p:spPr>
+          <a:xfrm>
+            <a:off x="2370372" y="2774564"/>
+            <a:ext cx="1235201" cy="408623"/>
+          </a:xfrm>
+          <a:prstGeom prst="roundRect">
+            <a:avLst/>
+          </a:prstGeom>
+        </p:spPr>
+        <p:style>
+          <a:lnRef idx="2">
+            <a:schemeClr val="accent5"/>
+          </a:lnRef>
+          <a:fillRef idx="1">
+            <a:schemeClr val="lt1"/>
+          </a:fillRef>
+          <a:effectRef idx="0">
+            <a:schemeClr val="accent5"/>
+          </a:effectRef>
+          <a:fontRef idx="minor">
+            <a:schemeClr val="dk1"/>
+          </a:fontRef>
+        </p:style>
+        <p:txBody>
+          <a:bodyPr wrap="square" rtlCol="0" anchor="ctr">
+            <a:spAutoFit/>
+          </a:bodyPr>
+          <a:lstStyle/>
+          <a:p>
+            <a:pPr algn="ctr"/>
+            <a:r>
+              <a:rPr lang="en-US" altLang="ko-KR" dirty="0"/>
+              <a:t>./meta.js</a:t>
+            </a:r>
+            <a:endParaRPr lang="ko-KR" altLang="en-US" dirty="0"/>
+          </a:p>
+        </p:txBody>
+      </p:sp>
+      <p:sp>
+        <p:nvSpPr>
+          <p:cNvPr id="87" name="사각형: 둥근 모서리 86">
+            <a:extLst>
+              <a:ext uri="{FF2B5EF4-FFF2-40B4-BE49-F238E27FC236}">
+                <a16:creationId xmlns:a16="http://schemas.microsoft.com/office/drawing/2014/main" id="{2D699A6C-591B-485B-9917-C3FF9779A0B8}"/>
+              </a:ext>
+            </a:extLst>
+          </p:cNvPr>
+          <p:cNvSpPr/>
+          <p:nvPr/>
+        </p:nvSpPr>
+        <p:spPr>
+          <a:xfrm>
+            <a:off x="6107575" y="716094"/>
+            <a:ext cx="1210347" cy="408623"/>
+          </a:xfrm>
+          <a:prstGeom prst="roundRect">
+            <a:avLst/>
+          </a:prstGeom>
+        </p:spPr>
+        <p:style>
+          <a:lnRef idx="2">
+            <a:schemeClr val="accent5"/>
+          </a:lnRef>
+          <a:fillRef idx="1">
+            <a:schemeClr val="lt1"/>
+          </a:fillRef>
+          <a:effectRef idx="0">
+            <a:schemeClr val="accent5"/>
+          </a:effectRef>
+          <a:fontRef idx="minor">
+            <a:schemeClr val="dk1"/>
+          </a:fontRef>
+        </p:style>
+        <p:txBody>
+          <a:bodyPr rtlCol="0" anchor="ctr">
+            <a:spAutoFit/>
+          </a:bodyPr>
+          <a:lstStyle/>
+          <a:p>
+            <a:pPr algn="ctr"/>
+            <a:r>
+              <a:rPr lang="en-US" altLang="ko-KR" dirty="0"/>
+              <a:t>./index.js</a:t>
+            </a:r>
+          </a:p>
+        </p:txBody>
+      </p:sp>
+      <p:cxnSp>
+        <p:nvCxnSpPr>
+          <p:cNvPr id="93" name="직선 화살표 연결선 92">
+            <a:extLst>
+              <a:ext uri="{FF2B5EF4-FFF2-40B4-BE49-F238E27FC236}">
+                <a16:creationId xmlns:a16="http://schemas.microsoft.com/office/drawing/2014/main" id="{DA683F11-B438-4008-B5C7-42DCE8764C3C}"/>
+              </a:ext>
+            </a:extLst>
+          </p:cNvPr>
+          <p:cNvCxnSpPr>
+            <a:stCxn id="13" idx="3"/>
+            <a:endCxn id="87" idx="1"/>
+          </p:cNvCxnSpPr>
+          <p:nvPr/>
+        </p:nvCxnSpPr>
+        <p:spPr>
+          <a:xfrm>
+            <a:off x="2677042" y="917924"/>
+            <a:ext cx="3430533" cy="2482"/>
+          </a:xfrm>
+          <a:prstGeom prst="straightConnector1">
+            <a:avLst/>
+          </a:prstGeom>
+          <a:ln>
+            <a:headEnd type="triangle"/>
+            <a:tailEnd type="triangle"/>
+          </a:ln>
+        </p:spPr>
+        <p:style>
+          <a:lnRef idx="1">
+            <a:schemeClr val="accent1"/>
+          </a:lnRef>
+          <a:fillRef idx="0">
+            <a:schemeClr val="accent1"/>
+          </a:fillRef>
+          <a:effectRef idx="0">
+            <a:schemeClr val="accent1"/>
+          </a:effectRef>
+          <a:fontRef idx="minor">
+            <a:schemeClr val="tx1"/>
+          </a:fontRef>
+        </p:style>
+      </p:cxnSp>
+      <p:cxnSp>
+        <p:nvCxnSpPr>
+          <p:cNvPr id="95" name="연결선: 꺾임 94">
+            <a:extLst>
+              <a:ext uri="{FF2B5EF4-FFF2-40B4-BE49-F238E27FC236}">
+                <a16:creationId xmlns:a16="http://schemas.microsoft.com/office/drawing/2014/main" id="{D0D28679-D9FC-4EF6-B27B-F9ED48C3BFA8}"/>
+              </a:ext>
+            </a:extLst>
+          </p:cNvPr>
+          <p:cNvCxnSpPr>
+            <a:stCxn id="65" idx="2"/>
+            <a:endCxn id="87" idx="1"/>
+          </p:cNvCxnSpPr>
+          <p:nvPr/>
+        </p:nvCxnSpPr>
+        <p:spPr>
+          <a:xfrm rot="16200000" flipH="1">
+            <a:off x="5655522" y="468353"/>
+            <a:ext cx="308578" cy="595527"/>
+          </a:xfrm>
+          <a:prstGeom prst="bentConnector2">
+            <a:avLst/>
+          </a:prstGeom>
+        </p:spPr>
+        <p:style>
+          <a:lnRef idx="1">
+            <a:schemeClr val="accent1"/>
+          </a:lnRef>
+          <a:fillRef idx="0">
+            <a:schemeClr val="accent1"/>
+          </a:fillRef>
+          <a:effectRef idx="0">
+            <a:schemeClr val="accent1"/>
+          </a:effectRef>
+          <a:fontRef idx="minor">
+            <a:schemeClr val="tx1"/>
+          </a:fontRef>
+        </p:style>
+      </p:cxnSp>
+      <p:sp>
+        <p:nvSpPr>
+          <p:cNvPr id="97" name="사각형: 둥근 모서리 96">
+            <a:extLst>
+              <a:ext uri="{FF2B5EF4-FFF2-40B4-BE49-F238E27FC236}">
+                <a16:creationId xmlns:a16="http://schemas.microsoft.com/office/drawing/2014/main" id="{4ECCA4D5-12CB-4002-A576-DFE9F9D11A73}"/>
+              </a:ext>
+            </a:extLst>
+          </p:cNvPr>
+          <p:cNvSpPr/>
+          <p:nvPr/>
+        </p:nvSpPr>
+        <p:spPr>
+          <a:xfrm>
+            <a:off x="6095432" y="1738846"/>
+            <a:ext cx="1210347" cy="408623"/>
+          </a:xfrm>
+          <a:prstGeom prst="roundRect">
+            <a:avLst/>
+          </a:prstGeom>
+        </p:spPr>
+        <p:style>
+          <a:lnRef idx="2">
+            <a:schemeClr val="accent5"/>
+          </a:lnRef>
+          <a:fillRef idx="1">
+            <a:schemeClr val="lt1"/>
+          </a:fillRef>
+          <a:effectRef idx="0">
+            <a:schemeClr val="accent5"/>
+          </a:effectRef>
+          <a:fontRef idx="minor">
+            <a:schemeClr val="dk1"/>
+          </a:fontRef>
+        </p:style>
+        <p:txBody>
+          <a:bodyPr rtlCol="0" anchor="ctr">
+            <a:spAutoFit/>
+          </a:bodyPr>
+          <a:lstStyle/>
+          <a:p>
+            <a:pPr algn="ctr"/>
+            <a:r>
+              <a:rPr lang="en-US" altLang="ko-KR" dirty="0"/>
+              <a:t>./library/</a:t>
+            </a:r>
+            <a:endParaRPr lang="ko-KR" altLang="en-US" dirty="0"/>
+          </a:p>
+        </p:txBody>
+      </p:sp>
+      <p:sp>
+        <p:nvSpPr>
+          <p:cNvPr id="98" name="사각형: 둥근 모서리 97">
+            <a:extLst>
+              <a:ext uri="{FF2B5EF4-FFF2-40B4-BE49-F238E27FC236}">
+                <a16:creationId xmlns:a16="http://schemas.microsoft.com/office/drawing/2014/main" id="{C18F3A1D-8480-4908-A301-A7DBBF6691C0}"/>
+              </a:ext>
+            </a:extLst>
+          </p:cNvPr>
+          <p:cNvSpPr/>
+          <p:nvPr/>
+        </p:nvSpPr>
+        <p:spPr>
+          <a:xfrm>
+            <a:off x="6107575" y="3479985"/>
+            <a:ext cx="1458411" cy="408623"/>
+          </a:xfrm>
+          <a:prstGeom prst="roundRect">
+            <a:avLst/>
+          </a:prstGeom>
+        </p:spPr>
+        <p:style>
+          <a:lnRef idx="2">
+            <a:schemeClr val="accent5"/>
+          </a:lnRef>
+          <a:fillRef idx="1">
+            <a:schemeClr val="lt1"/>
+          </a:fillRef>
+          <a:effectRef idx="0">
+            <a:schemeClr val="accent5"/>
+          </a:effectRef>
+          <a:fontRef idx="minor">
+            <a:schemeClr val="dk1"/>
+          </a:fontRef>
+        </p:style>
+        <p:txBody>
+          <a:bodyPr wrap="square" rtlCol="0" anchor="ctr">
+            <a:spAutoFit/>
+          </a:bodyPr>
+          <a:lstStyle/>
+          <a:p>
+            <a:pPr algn="ctr"/>
+            <a:r>
+              <a:rPr lang="en-US" altLang="ko-KR" dirty="0"/>
+              <a:t>./database/</a:t>
+            </a:r>
+            <a:endParaRPr lang="ko-KR" altLang="en-US" dirty="0"/>
+          </a:p>
+        </p:txBody>
+      </p:sp>
+      <p:cxnSp>
+        <p:nvCxnSpPr>
+          <p:cNvPr id="100" name="연결선: 꺾임 99">
+            <a:extLst>
+              <a:ext uri="{FF2B5EF4-FFF2-40B4-BE49-F238E27FC236}">
+                <a16:creationId xmlns:a16="http://schemas.microsoft.com/office/drawing/2014/main" id="{3A90FF47-3FC8-42C8-A15C-06269410863E}"/>
+              </a:ext>
+            </a:extLst>
+          </p:cNvPr>
+          <p:cNvCxnSpPr>
+            <a:stCxn id="65" idx="2"/>
+            <a:endCxn id="97" idx="1"/>
+          </p:cNvCxnSpPr>
+          <p:nvPr/>
+        </p:nvCxnSpPr>
+        <p:spPr>
+          <a:xfrm rot="16200000" flipH="1">
+            <a:off x="5138075" y="985801"/>
+            <a:ext cx="1331330" cy="583384"/>
+          </a:xfrm>
+          <a:prstGeom prst="bentConnector2">
+            <a:avLst/>
+          </a:prstGeom>
+        </p:spPr>
+        <p:style>
+          <a:lnRef idx="1">
+            <a:schemeClr val="accent1"/>
+          </a:lnRef>
+          <a:fillRef idx="0">
+            <a:schemeClr val="accent1"/>
+          </a:fillRef>
+          <a:effectRef idx="0">
+            <a:schemeClr val="accent1"/>
+          </a:effectRef>
+          <a:fontRef idx="minor">
+            <a:schemeClr val="tx1"/>
+          </a:fontRef>
+        </p:style>
+      </p:cxnSp>
+      <p:cxnSp>
+        <p:nvCxnSpPr>
+          <p:cNvPr id="102" name="연결선: 꺾임 101">
+            <a:extLst>
+              <a:ext uri="{FF2B5EF4-FFF2-40B4-BE49-F238E27FC236}">
+                <a16:creationId xmlns:a16="http://schemas.microsoft.com/office/drawing/2014/main" id="{5C78AD86-A1FE-40C9-BC95-17A1730D503A}"/>
+              </a:ext>
+            </a:extLst>
+          </p:cNvPr>
+          <p:cNvCxnSpPr>
+            <a:stCxn id="65" idx="2"/>
+            <a:endCxn id="98" idx="1"/>
+          </p:cNvCxnSpPr>
+          <p:nvPr/>
+        </p:nvCxnSpPr>
+        <p:spPr>
+          <a:xfrm rot="16200000" flipH="1">
+            <a:off x="4273577" y="1850298"/>
+            <a:ext cx="3072469" cy="595527"/>
+          </a:xfrm>
+          <a:prstGeom prst="bentConnector2">
+            <a:avLst/>
+          </a:prstGeom>
+        </p:spPr>
+        <p:style>
+          <a:lnRef idx="1">
+            <a:schemeClr val="accent1"/>
+          </a:lnRef>
+          <a:fillRef idx="0">
+            <a:schemeClr val="accent1"/>
+          </a:fillRef>
+          <a:effectRef idx="0">
+            <a:schemeClr val="accent1"/>
+          </a:effectRef>
+          <a:fontRef idx="minor">
+            <a:schemeClr val="tx1"/>
+          </a:fontRef>
+        </p:style>
+      </p:cxnSp>
+      <p:cxnSp>
+        <p:nvCxnSpPr>
+          <p:cNvPr id="110" name="연결선: 꺾임 109">
+            <a:extLst>
+              <a:ext uri="{FF2B5EF4-FFF2-40B4-BE49-F238E27FC236}">
+                <a16:creationId xmlns:a16="http://schemas.microsoft.com/office/drawing/2014/main" id="{A2CC0C93-24D3-489D-8001-775258DF829A}"/>
+              </a:ext>
+            </a:extLst>
+          </p:cNvPr>
+          <p:cNvCxnSpPr>
+            <a:stCxn id="97" idx="2"/>
+            <a:endCxn id="105" idx="1"/>
+          </p:cNvCxnSpPr>
+          <p:nvPr/>
+        </p:nvCxnSpPr>
+        <p:spPr>
+          <a:xfrm rot="16200000" flipH="1">
+            <a:off x="6632973" y="2215101"/>
+            <a:ext cx="297355" cy="162089"/>
+          </a:xfrm>
+          <a:prstGeom prst="bentConnector2">
+            <a:avLst/>
+          </a:prstGeom>
+        </p:spPr>
+        <p:style>
+          <a:lnRef idx="1">
+            <a:schemeClr val="accent1"/>
+          </a:lnRef>
+          <a:fillRef idx="0">
+            <a:schemeClr val="accent1"/>
+          </a:fillRef>
+          <a:effectRef idx="0">
+            <a:schemeClr val="accent1"/>
+          </a:effectRef>
+          <a:fontRef idx="minor">
+            <a:schemeClr val="tx1"/>
+          </a:fontRef>
+        </p:style>
+      </p:cxnSp>
+      <p:cxnSp>
+        <p:nvCxnSpPr>
+          <p:cNvPr id="112" name="연결선: 꺾임 111">
+            <a:extLst>
+              <a:ext uri="{FF2B5EF4-FFF2-40B4-BE49-F238E27FC236}">
+                <a16:creationId xmlns:a16="http://schemas.microsoft.com/office/drawing/2014/main" id="{B372838D-C985-47AA-879C-6FDE71FEB887}"/>
+              </a:ext>
+            </a:extLst>
+          </p:cNvPr>
+          <p:cNvCxnSpPr>
+            <a:stCxn id="97" idx="2"/>
+            <a:endCxn id="106" idx="1"/>
+          </p:cNvCxnSpPr>
+          <p:nvPr/>
+        </p:nvCxnSpPr>
+        <p:spPr>
+          <a:xfrm rot="16200000" flipH="1">
+            <a:off x="6361323" y="2486751"/>
+            <a:ext cx="836752" cy="158187"/>
+          </a:xfrm>
+          <a:prstGeom prst="bentConnector2">
+            <a:avLst/>
+          </a:prstGeom>
+        </p:spPr>
+        <p:style>
+          <a:lnRef idx="1">
+            <a:schemeClr val="accent1"/>
+          </a:lnRef>
+          <a:fillRef idx="0">
+            <a:schemeClr val="accent1"/>
+          </a:fillRef>
+          <a:effectRef idx="0">
+            <a:schemeClr val="accent1"/>
+          </a:effectRef>
+          <a:fontRef idx="minor">
+            <a:schemeClr val="tx1"/>
+          </a:fontRef>
+        </p:style>
+      </p:cxnSp>
+      <p:cxnSp>
+        <p:nvCxnSpPr>
+          <p:cNvPr id="114" name="연결선: 꺾임 113">
+            <a:extLst>
+              <a:ext uri="{FF2B5EF4-FFF2-40B4-BE49-F238E27FC236}">
+                <a16:creationId xmlns:a16="http://schemas.microsoft.com/office/drawing/2014/main" id="{F41C8742-42B6-4B9D-845A-D5F0C5C0D10F}"/>
+              </a:ext>
+            </a:extLst>
+          </p:cNvPr>
+          <p:cNvCxnSpPr>
+            <a:stCxn id="9" idx="2"/>
+            <a:endCxn id="11" idx="1"/>
+          </p:cNvCxnSpPr>
+          <p:nvPr/>
+        </p:nvCxnSpPr>
+        <p:spPr>
+          <a:xfrm rot="16200000" flipH="1">
+            <a:off x="2106555" y="2181440"/>
+            <a:ext cx="297786" cy="229848"/>
+          </a:xfrm>
+          <a:prstGeom prst="bentConnector2">
+            <a:avLst/>
+          </a:prstGeom>
+        </p:spPr>
+        <p:style>
+          <a:lnRef idx="1">
+            <a:schemeClr val="accent1"/>
+          </a:lnRef>
+          <a:fillRef idx="0">
+            <a:schemeClr val="accent1"/>
+          </a:fillRef>
+          <a:effectRef idx="0">
+            <a:schemeClr val="accent1"/>
+          </a:effectRef>
+          <a:fontRef idx="minor">
+            <a:schemeClr val="tx1"/>
+          </a:fontRef>
+        </p:style>
+      </p:cxnSp>
+      <p:cxnSp>
+        <p:nvCxnSpPr>
+          <p:cNvPr id="116" name="연결선: 꺾임 115">
+            <a:extLst>
+              <a:ext uri="{FF2B5EF4-FFF2-40B4-BE49-F238E27FC236}">
+                <a16:creationId xmlns:a16="http://schemas.microsoft.com/office/drawing/2014/main" id="{2A90D09B-3BF0-4D5A-9719-6985543367F3}"/>
+              </a:ext>
+            </a:extLst>
+          </p:cNvPr>
+          <p:cNvCxnSpPr>
+            <a:stCxn id="9" idx="2"/>
+            <a:endCxn id="12" idx="1"/>
+          </p:cNvCxnSpPr>
+          <p:nvPr/>
+        </p:nvCxnSpPr>
+        <p:spPr>
+          <a:xfrm rot="16200000" flipH="1">
+            <a:off x="1839746" y="2448249"/>
+            <a:ext cx="831405" cy="229848"/>
+          </a:xfrm>
+          <a:prstGeom prst="bentConnector2">
+            <a:avLst/>
+          </a:prstGeom>
+        </p:spPr>
+        <p:style>
+          <a:lnRef idx="1">
+            <a:schemeClr val="accent1"/>
+          </a:lnRef>
+          <a:fillRef idx="0">
+            <a:schemeClr val="accent1"/>
+          </a:fillRef>
+          <a:effectRef idx="0">
+            <a:schemeClr val="accent1"/>
+          </a:effectRef>
+          <a:fontRef idx="minor">
+            <a:schemeClr val="tx1"/>
+          </a:fontRef>
+        </p:style>
+      </p:cxnSp>
+      <p:cxnSp>
+        <p:nvCxnSpPr>
+          <p:cNvPr id="124" name="연결선: 꺾임 123">
+            <a:extLst>
+              <a:ext uri="{FF2B5EF4-FFF2-40B4-BE49-F238E27FC236}">
+                <a16:creationId xmlns:a16="http://schemas.microsoft.com/office/drawing/2014/main" id="{28A19448-E4B3-4A6A-87B2-C0023F09B249}"/>
+              </a:ext>
+            </a:extLst>
+          </p:cNvPr>
+          <p:cNvCxnSpPr>
+            <a:stCxn id="97" idx="3"/>
+            <a:endCxn id="87" idx="2"/>
+          </p:cNvCxnSpPr>
+          <p:nvPr/>
+        </p:nvCxnSpPr>
+        <p:spPr>
+          <a:xfrm flipH="1" flipV="1">
+            <a:off x="6712749" y="1124717"/>
+            <a:ext cx="593030" cy="818441"/>
+          </a:xfrm>
+          <a:prstGeom prst="bentConnector4">
+            <a:avLst>
+              <a:gd name="adj1" fmla="val -38548"/>
+              <a:gd name="adj2" fmla="val 62482"/>
+            </a:avLst>
+          </a:prstGeom>
+          <a:ln>
+            <a:tailEnd type="triangle"/>
+          </a:ln>
+        </p:spPr>
+        <p:style>
+          <a:lnRef idx="1">
+            <a:schemeClr val="accent1"/>
+          </a:lnRef>
+          <a:fillRef idx="0">
+            <a:schemeClr val="accent1"/>
+          </a:fillRef>
+          <a:effectRef idx="0">
+            <a:schemeClr val="accent1"/>
+          </a:effectRef>
+          <a:fontRef idx="minor">
+            <a:schemeClr val="tx1"/>
+          </a:fontRef>
+        </p:style>
+      </p:cxnSp>
+      <p:cxnSp>
+        <p:nvCxnSpPr>
+          <p:cNvPr id="126" name="연결선: 꺾임 125">
+            <a:extLst>
+              <a:ext uri="{FF2B5EF4-FFF2-40B4-BE49-F238E27FC236}">
+                <a16:creationId xmlns:a16="http://schemas.microsoft.com/office/drawing/2014/main" id="{AE364A41-9A3B-455F-8FCD-871FC2CBD89B}"/>
+              </a:ext>
+            </a:extLst>
+          </p:cNvPr>
+          <p:cNvCxnSpPr>
+            <a:stCxn id="98" idx="3"/>
+            <a:endCxn id="87" idx="2"/>
+          </p:cNvCxnSpPr>
+          <p:nvPr/>
+        </p:nvCxnSpPr>
+        <p:spPr>
+          <a:xfrm flipH="1" flipV="1">
+            <a:off x="6712749" y="1124717"/>
+            <a:ext cx="853237" cy="2559580"/>
+          </a:xfrm>
+          <a:prstGeom prst="bentConnector4">
+            <a:avLst>
+              <a:gd name="adj1" fmla="val -26792"/>
+              <a:gd name="adj2" fmla="val 83837"/>
+            </a:avLst>
+          </a:prstGeom>
+          <a:ln>
+            <a:tailEnd type="triangle"/>
+          </a:ln>
+        </p:spPr>
+        <p:style>
+          <a:lnRef idx="1">
+            <a:schemeClr val="accent1"/>
+          </a:lnRef>
+          <a:fillRef idx="0">
+            <a:schemeClr val="accent1"/>
+          </a:fillRef>
+          <a:effectRef idx="0">
+            <a:schemeClr val="accent1"/>
+          </a:effectRef>
+          <a:fontRef idx="minor">
+            <a:schemeClr val="tx1"/>
+          </a:fontRef>
+        </p:style>
+      </p:cxnSp>
+      <p:sp>
+        <p:nvSpPr>
+          <p:cNvPr id="105" name="사각형: 둥근 모서리 104">
+            <a:extLst>
+              <a:ext uri="{FF2B5EF4-FFF2-40B4-BE49-F238E27FC236}">
+                <a16:creationId xmlns:a16="http://schemas.microsoft.com/office/drawing/2014/main" id="{2A254CB2-5519-4E8D-810C-B6D8433811FF}"/>
+              </a:ext>
+            </a:extLst>
+          </p:cNvPr>
+          <p:cNvSpPr/>
+          <p:nvPr/>
+        </p:nvSpPr>
+        <p:spPr>
+          <a:xfrm>
+            <a:off x="6862695" y="2240512"/>
+            <a:ext cx="1210347" cy="408623"/>
+          </a:xfrm>
+          <a:prstGeom prst="roundRect">
+            <a:avLst/>
+          </a:prstGeom>
+        </p:spPr>
+        <p:style>
+          <a:lnRef idx="2">
+            <a:schemeClr val="accent5"/>
+          </a:lnRef>
+          <a:fillRef idx="1">
+            <a:schemeClr val="lt1"/>
+          </a:fillRef>
+          <a:effectRef idx="0">
+            <a:schemeClr val="accent5"/>
+          </a:effectRef>
+          <a:fontRef idx="minor">
+            <a:schemeClr val="dk1"/>
+          </a:fontRef>
+        </p:style>
+        <p:txBody>
+          <a:bodyPr wrap="square" rtlCol="0" anchor="ctr">
+            <a:spAutoFit/>
+          </a:bodyPr>
+          <a:lstStyle/>
+          <a:p>
+            <a:pPr algn="ctr"/>
+            <a:r>
+              <a:rPr lang="en-US" altLang="ko-KR" dirty="0"/>
+              <a:t>./scan.js</a:t>
+            </a:r>
+            <a:endParaRPr lang="ko-KR" altLang="en-US" dirty="0"/>
+          </a:p>
+        </p:txBody>
+      </p:sp>
+      <p:sp>
+        <p:nvSpPr>
+          <p:cNvPr id="106" name="사각형: 둥근 모서리 105">
+            <a:extLst>
+              <a:ext uri="{FF2B5EF4-FFF2-40B4-BE49-F238E27FC236}">
+                <a16:creationId xmlns:a16="http://schemas.microsoft.com/office/drawing/2014/main" id="{FCE41191-DB0B-4B79-87FC-4432F7A74491}"/>
+              </a:ext>
+            </a:extLst>
+          </p:cNvPr>
+          <p:cNvSpPr/>
+          <p:nvPr/>
+        </p:nvSpPr>
+        <p:spPr>
+          <a:xfrm>
+            <a:off x="6858793" y="2779909"/>
+            <a:ext cx="1210347" cy="408623"/>
+          </a:xfrm>
+          <a:prstGeom prst="roundRect">
+            <a:avLst/>
+          </a:prstGeom>
+        </p:spPr>
+        <p:style>
+          <a:lnRef idx="2">
+            <a:schemeClr val="accent5"/>
+          </a:lnRef>
+          <a:fillRef idx="1">
+            <a:schemeClr val="lt1"/>
+          </a:fillRef>
+          <a:effectRef idx="0">
+            <a:schemeClr val="accent5"/>
+          </a:effectRef>
+          <a:fontRef idx="minor">
+            <a:schemeClr val="dk1"/>
+          </a:fontRef>
+        </p:style>
+        <p:txBody>
+          <a:bodyPr wrap="square" rtlCol="0" anchor="ctr">
+            <a:spAutoFit/>
+          </a:bodyPr>
+          <a:lstStyle/>
+          <a:p>
+            <a:pPr algn="ctr"/>
+            <a:r>
+              <a:rPr lang="en-US" altLang="ko-KR" dirty="0"/>
+              <a:t>./meta.js</a:t>
+            </a:r>
+            <a:endParaRPr lang="ko-KR" altLang="en-US" dirty="0"/>
+          </a:p>
+        </p:txBody>
+      </p:sp>
+      <p:cxnSp>
+        <p:nvCxnSpPr>
+          <p:cNvPr id="152" name="직선 화살표 연결선 151">
+            <a:extLst>
+              <a:ext uri="{FF2B5EF4-FFF2-40B4-BE49-F238E27FC236}">
+                <a16:creationId xmlns:a16="http://schemas.microsoft.com/office/drawing/2014/main" id="{5A6C973F-1654-4A20-B8E2-09365C1F035E}"/>
+              </a:ext>
+            </a:extLst>
+          </p:cNvPr>
+          <p:cNvCxnSpPr>
+            <a:stCxn id="105" idx="3"/>
+            <a:endCxn id="129" idx="1"/>
+          </p:cNvCxnSpPr>
+          <p:nvPr/>
+        </p:nvCxnSpPr>
+        <p:spPr>
+          <a:xfrm flipV="1">
+            <a:off x="8073042" y="2441089"/>
+            <a:ext cx="1156348" cy="3735"/>
+          </a:xfrm>
+          <a:prstGeom prst="straightConnector1">
+            <a:avLst/>
+          </a:prstGeom>
+          <a:ln>
+            <a:headEnd type="triangle"/>
+            <a:tailEnd type="triangle"/>
+          </a:ln>
+        </p:spPr>
+        <p:style>
+          <a:lnRef idx="1">
+            <a:schemeClr val="accent1"/>
+          </a:lnRef>
+          <a:fillRef idx="0">
+            <a:schemeClr val="accent1"/>
+          </a:fillRef>
+          <a:effectRef idx="0">
+            <a:schemeClr val="accent1"/>
+          </a:effectRef>
+          <a:fontRef idx="minor">
+            <a:schemeClr val="tx1"/>
+          </a:fontRef>
+        </p:style>
+      </p:cxnSp>
+      <p:cxnSp>
+        <p:nvCxnSpPr>
+          <p:cNvPr id="154" name="직선 화살표 연결선 153">
+            <a:extLst>
+              <a:ext uri="{FF2B5EF4-FFF2-40B4-BE49-F238E27FC236}">
+                <a16:creationId xmlns:a16="http://schemas.microsoft.com/office/drawing/2014/main" id="{44801219-56CD-410C-845F-DEFFA7CAD31E}"/>
+              </a:ext>
+            </a:extLst>
+          </p:cNvPr>
+          <p:cNvCxnSpPr>
+            <a:cxnSpLocks/>
+            <a:stCxn id="106" idx="3"/>
+            <a:endCxn id="130" idx="1"/>
+          </p:cNvCxnSpPr>
+          <p:nvPr/>
+        </p:nvCxnSpPr>
+        <p:spPr>
+          <a:xfrm flipV="1">
+            <a:off x="8069140" y="2978875"/>
+            <a:ext cx="1160250" cy="5346"/>
+          </a:xfrm>
+          <a:prstGeom prst="straightConnector1">
+            <a:avLst/>
+          </a:prstGeom>
+          <a:ln>
+            <a:headEnd type="triangle"/>
+            <a:tailEnd type="triangle"/>
+          </a:ln>
+        </p:spPr>
+        <p:style>
+          <a:lnRef idx="1">
+            <a:schemeClr val="accent1"/>
+          </a:lnRef>
+          <a:fillRef idx="0">
+            <a:schemeClr val="accent1"/>
+          </a:fillRef>
+          <a:effectRef idx="0">
+            <a:schemeClr val="accent1"/>
+          </a:effectRef>
+          <a:fontRef idx="minor">
+            <a:schemeClr val="tx1"/>
+          </a:fontRef>
+        </p:style>
+      </p:cxnSp>
+      <p:grpSp>
+        <p:nvGrpSpPr>
+          <p:cNvPr id="160" name="그룹 159">
+            <a:extLst>
+              <a:ext uri="{FF2B5EF4-FFF2-40B4-BE49-F238E27FC236}">
+                <a16:creationId xmlns:a16="http://schemas.microsoft.com/office/drawing/2014/main" id="{A4A6A2F0-E0E7-4C5F-820A-665126BE9D06}"/>
+              </a:ext>
+            </a:extLst>
+          </p:cNvPr>
+          <p:cNvGrpSpPr/>
+          <p:nvPr/>
+        </p:nvGrpSpPr>
+        <p:grpSpPr>
+          <a:xfrm>
+            <a:off x="9136792" y="1782517"/>
+            <a:ext cx="1369671" cy="1600813"/>
+            <a:chOff x="9136792" y="1782517"/>
+            <a:chExt cx="1369671" cy="1600813"/>
+          </a:xfrm>
+        </p:grpSpPr>
+        <p:grpSp>
+          <p:nvGrpSpPr>
+            <p:cNvPr id="133" name="그룹 132">
+              <a:extLst>
+                <a:ext uri="{FF2B5EF4-FFF2-40B4-BE49-F238E27FC236}">
+                  <a16:creationId xmlns:a16="http://schemas.microsoft.com/office/drawing/2014/main" id="{EA5FAC5B-E289-49BA-97EB-B744E3AC389A}"/>
+                </a:ext>
+              </a:extLst>
+            </p:cNvPr>
+            <p:cNvGrpSpPr/>
+            <p:nvPr/>
+          </p:nvGrpSpPr>
+          <p:grpSpPr>
+            <a:xfrm>
+              <a:off x="9136792" y="2104825"/>
+              <a:ext cx="1369671" cy="1278505"/>
+              <a:chOff x="8762035" y="2043657"/>
+              <a:chExt cx="1369671" cy="1278505"/>
+            </a:xfrm>
+          </p:grpSpPr>
+          <p:sp>
+            <p:nvSpPr>
+              <p:cNvPr id="131" name="직사각형 130">
+                <a:extLst>
+                  <a:ext uri="{FF2B5EF4-FFF2-40B4-BE49-F238E27FC236}">
+                    <a16:creationId xmlns:a16="http://schemas.microsoft.com/office/drawing/2014/main" id="{879F586D-5E27-4C49-A08C-C24B016E2D59}"/>
+                  </a:ext>
+                </a:extLst>
+              </p:cNvPr>
+              <p:cNvSpPr/>
+              <p:nvPr/>
+            </p:nvSpPr>
+            <p:spPr>
+              <a:xfrm>
+                <a:off x="8762035" y="2043657"/>
+                <a:ext cx="1369671" cy="1278505"/>
+              </a:xfrm>
+              <a:prstGeom prst="rect">
+                <a:avLst/>
+              </a:prstGeom>
+            </p:spPr>
+            <p:style>
+              <a:lnRef idx="2">
+                <a:schemeClr val="accent5"/>
+              </a:lnRef>
+              <a:fillRef idx="1">
+                <a:schemeClr val="lt1"/>
+              </a:fillRef>
+              <a:effectRef idx="0">
+                <a:schemeClr val="accent5"/>
+              </a:effectRef>
+              <a:fontRef idx="minor">
+                <a:schemeClr val="dk1"/>
+              </a:fontRef>
+            </p:style>
+            <p:txBody>
+              <a:bodyPr rtlCol="0" anchor="ctr">
+                <a:spAutoFit/>
+              </a:bodyPr>
+              <a:lstStyle/>
+              <a:p>
+                <a:pPr algn="ctr"/>
+                <a:endParaRPr lang="ko-KR" altLang="en-US" dirty="0"/>
+              </a:p>
+            </p:txBody>
+          </p:sp>
+          <p:sp>
+            <p:nvSpPr>
+              <p:cNvPr id="129" name="사각형: 둥근 모서리 128">
+                <a:extLst>
+                  <a:ext uri="{FF2B5EF4-FFF2-40B4-BE49-F238E27FC236}">
+                    <a16:creationId xmlns:a16="http://schemas.microsoft.com/office/drawing/2014/main" id="{55ABE3AB-7D54-4116-8587-2BAECFC1A62A}"/>
+                  </a:ext>
+                </a:extLst>
+              </p:cNvPr>
+              <p:cNvSpPr/>
+              <p:nvPr/>
+            </p:nvSpPr>
+            <p:spPr>
+              <a:xfrm>
+                <a:off x="8854633" y="2175609"/>
+                <a:ext cx="1208418" cy="408623"/>
+              </a:xfrm>
+              <a:prstGeom prst="roundRect">
+                <a:avLst/>
+              </a:prstGeom>
+            </p:spPr>
+            <p:style>
+              <a:lnRef idx="2">
+                <a:schemeClr val="accent5"/>
+              </a:lnRef>
+              <a:fillRef idx="1">
+                <a:schemeClr val="lt1"/>
+              </a:fillRef>
+              <a:effectRef idx="0">
+                <a:schemeClr val="accent5"/>
+              </a:effectRef>
+              <a:fontRef idx="minor">
+                <a:schemeClr val="dk1"/>
+              </a:fontRef>
+            </p:style>
+            <p:txBody>
+              <a:bodyPr rtlCol="0" anchor="ctr">
+                <a:spAutoFit/>
+              </a:bodyPr>
+              <a:lstStyle/>
+              <a:p>
+                <a:pPr algn="ctr"/>
+                <a:r>
+                  <a:rPr lang="en-US" altLang="ko-KR" dirty="0"/>
+                  <a:t>./scanner</a:t>
+                </a:r>
+                <a:endParaRPr lang="ko-KR" altLang="en-US" dirty="0"/>
+              </a:p>
+            </p:txBody>
+          </p:sp>
+          <p:sp>
+            <p:nvSpPr>
+              <p:cNvPr id="130" name="사각형: 둥근 모서리 129">
+                <a:extLst>
+                  <a:ext uri="{FF2B5EF4-FFF2-40B4-BE49-F238E27FC236}">
+                    <a16:creationId xmlns:a16="http://schemas.microsoft.com/office/drawing/2014/main" id="{5BF62A1A-F002-43CA-87F4-FCB2C70C93EA}"/>
+                  </a:ext>
+                </a:extLst>
+              </p:cNvPr>
+              <p:cNvSpPr/>
+              <p:nvPr/>
+            </p:nvSpPr>
+            <p:spPr>
+              <a:xfrm>
+                <a:off x="8854633" y="2713395"/>
+                <a:ext cx="1208418" cy="408623"/>
+              </a:xfrm>
+              <a:prstGeom prst="roundRect">
+                <a:avLst/>
+              </a:prstGeom>
+            </p:spPr>
+            <p:style>
+              <a:lnRef idx="2">
+                <a:schemeClr val="accent5"/>
+              </a:lnRef>
+              <a:fillRef idx="1">
+                <a:schemeClr val="lt1"/>
+              </a:fillRef>
+              <a:effectRef idx="0">
+                <a:schemeClr val="accent5"/>
+              </a:effectRef>
+              <a:fontRef idx="minor">
+                <a:schemeClr val="dk1"/>
+              </a:fontRef>
+            </p:style>
+            <p:txBody>
+              <a:bodyPr wrap="square" rtlCol="0" anchor="ctr">
+                <a:spAutoFit/>
+              </a:bodyPr>
+              <a:lstStyle/>
+              <a:p>
+                <a:pPr algn="ctr"/>
+                <a:r>
+                  <a:rPr lang="en-US" altLang="ko-KR" dirty="0"/>
+                  <a:t>./agent</a:t>
+                </a:r>
+                <a:endParaRPr lang="ko-KR" altLang="en-US" dirty="0"/>
+              </a:p>
+            </p:txBody>
+          </p:sp>
+        </p:grpSp>
+        <p:sp>
+          <p:nvSpPr>
+            <p:cNvPr id="159" name="직사각형 158">
+              <a:extLst>
+                <a:ext uri="{FF2B5EF4-FFF2-40B4-BE49-F238E27FC236}">
+                  <a16:creationId xmlns:a16="http://schemas.microsoft.com/office/drawing/2014/main" id="{4E503B6D-4FAC-49F1-88C3-4CB0F4816F3C}"/>
+                </a:ext>
+              </a:extLst>
+            </p:cNvPr>
+            <p:cNvSpPr/>
+            <p:nvPr/>
+          </p:nvSpPr>
+          <p:spPr>
+            <a:xfrm>
+              <a:off x="9237390" y="1782517"/>
+              <a:ext cx="1200418" cy="369332"/>
+            </a:xfrm>
+            <a:prstGeom prst="rect">
+              <a:avLst/>
+            </a:prstGeom>
+          </p:spPr>
+          <p:style>
+            <a:lnRef idx="2">
+              <a:schemeClr val="accent5"/>
+            </a:lnRef>
+            <a:fillRef idx="1">
+              <a:schemeClr val="lt1"/>
+            </a:fillRef>
+            <a:effectRef idx="0">
+              <a:schemeClr val="accent5"/>
+            </a:effectRef>
+            <a:fontRef idx="minor">
+              <a:schemeClr val="dk1"/>
+            </a:fontRef>
+          </p:style>
+          <p:txBody>
+            <a:bodyPr wrap="square" rtlCol="0" anchor="ctr">
+              <a:spAutoFit/>
+            </a:bodyPr>
+            <a:lstStyle/>
+            <a:p>
+              <a:pPr algn="ctr"/>
+              <a:r>
+                <a:rPr lang="en-US" altLang="ko-KR" dirty="0"/>
+                <a:t>./plugins/</a:t>
+              </a:r>
+              <a:endParaRPr lang="ko-KR" altLang="en-US" dirty="0"/>
+            </a:p>
+          </p:txBody>
+        </p:sp>
+      </p:grpSp>
+    </p:spTree>
+    <p:extLst>
+      <p:ext uri="{BB962C8B-B14F-4D97-AF65-F5344CB8AC3E}">
+        <p14:creationId xmlns:p14="http://schemas.microsoft.com/office/powerpoint/2010/main" val="2084620128"/>
       </p:ext>
     </p:extLst>
   </p:cSld>

</xml_diff>

<commit_message>
add save and reload queue function `not tested`
</commit_message>
<xml_diff>
--- a/bookshelf.index.pptx
+++ b/bookshelf.index.pptx
@@ -7217,7 +7217,7 @@
         </p:nvSpPr>
         <p:spPr>
           <a:xfrm>
-            <a:off x="208343" y="214662"/>
+            <a:off x="150470" y="191513"/>
             <a:ext cx="1817225" cy="369332"/>
           </a:xfrm>
           <a:prstGeom prst="rect">
@@ -7275,7 +7275,7 @@
         </p:nvSpPr>
         <p:spPr>
           <a:xfrm>
-            <a:off x="1655180" y="771466"/>
+            <a:off x="1597307" y="748317"/>
             <a:ext cx="1817225" cy="408623"/>
           </a:xfrm>
           <a:prstGeom prst="roundRect">
@@ -7325,8 +7325,8 @@
         </p:nvSpPr>
         <p:spPr>
           <a:xfrm>
-            <a:off x="4375231" y="652611"/>
-            <a:ext cx="2314936" cy="646331"/>
+            <a:off x="4317357" y="490963"/>
+            <a:ext cx="2708475" cy="923330"/>
           </a:xfrm>
           <a:prstGeom prst="rect">
             <a:avLst/>
@@ -7362,7 +7362,14 @@
             <a:pPr algn="ctr"/>
             <a:r>
               <a:rPr lang="en-US" altLang="ko-KR" dirty="0"/>
-              <a:t>tables</a:t>
+              <a:t>Tables,</a:t>
+            </a:r>
+          </a:p>
+          <a:p>
+            <a:pPr algn="ctr"/>
+            <a:r>
+              <a:rPr lang="en-US" altLang="ko-KR" dirty="0"/>
+              <a:t>Export database pointer</a:t>
             </a:r>
             <a:endParaRPr lang="ko-KR" altLang="en-US" dirty="0"/>
           </a:p>
@@ -7378,6 +7385,7 @@
             </a:extLst>
           </p:cNvPr>
           <p:cNvCxnSpPr>
+            <a:cxnSpLocks/>
             <a:stCxn id="7" idx="3"/>
             <a:endCxn id="8" idx="1"/>
           </p:cNvCxnSpPr>
@@ -7385,8 +7393,8 @@
         </p:nvCxnSpPr>
         <p:spPr>
           <a:xfrm flipV="1">
-            <a:off x="3472405" y="975777"/>
-            <a:ext cx="902826" cy="1"/>
+            <a:off x="3414532" y="952628"/>
+            <a:ext cx="902825" cy="1"/>
           </a:xfrm>
           <a:prstGeom prst="straightConnector1">
             <a:avLst/>
@@ -7410,56 +7418,6 @@
           </a:fontRef>
         </p:style>
       </p:cxnSp>
-      <p:sp>
-        <p:nvSpPr>
-          <p:cNvPr id="11" name="사각형: 둥근 모서리 10">
-            <a:extLst>
-              <a:ext uri="{FF2B5EF4-FFF2-40B4-BE49-F238E27FC236}">
-                <a16:creationId xmlns:a16="http://schemas.microsoft.com/office/drawing/2014/main" id="{264FE73A-FD27-448A-8F7B-6C505ECF708F}"/>
-              </a:ext>
-            </a:extLst>
-          </p:cNvPr>
-          <p:cNvSpPr/>
-          <p:nvPr/>
-        </p:nvSpPr>
-        <p:spPr>
-          <a:xfrm>
-            <a:off x="3923818" y="3224688"/>
-            <a:ext cx="4664599" cy="408623"/>
-          </a:xfrm>
-          <a:prstGeom prst="roundRect">
-            <a:avLst/>
-          </a:prstGeom>
-        </p:spPr>
-        <p:style>
-          <a:lnRef idx="2">
-            <a:schemeClr val="accent5"/>
-          </a:lnRef>
-          <a:fillRef idx="1">
-            <a:schemeClr val="lt1"/>
-          </a:fillRef>
-          <a:effectRef idx="0">
-            <a:schemeClr val="accent5"/>
-          </a:effectRef>
-          <a:fontRef idx="minor">
-            <a:schemeClr val="dk1"/>
-          </a:fontRef>
-        </p:style>
-        <p:txBody>
-          <a:bodyPr wrap="square" rtlCol="0" anchor="ctr">
-            <a:spAutoFit/>
-          </a:bodyPr>
-          <a:lstStyle/>
-          <a:p>
-            <a:pPr algn="ctr"/>
-            <a:r>
-              <a:rPr lang="ko-KR" altLang="en-US"/>
-              <a:t>나머지 쿼리는 필요할 때마다 추가</a:t>
-            </a:r>
-            <a:endParaRPr lang="ko-KR" altLang="en-US" dirty="0"/>
-          </a:p>
-        </p:txBody>
-      </p:sp>
     </p:spTree>
     <p:extLst>
       <p:ext uri="{BB962C8B-B14F-4D97-AF65-F5344CB8AC3E}">
@@ -7978,7 +7936,7 @@
         <p:spPr>
           <a:xfrm>
             <a:off x="2370372" y="2240945"/>
-            <a:ext cx="1226916" cy="408623"/>
+            <a:ext cx="1470272" cy="408623"/>
           </a:xfrm>
           <a:prstGeom prst="roundRect">
             <a:avLst/>
@@ -8007,7 +7965,7 @@
             <a:pPr algn="ctr"/>
             <a:r>
               <a:rPr lang="en-US" altLang="ko-KR" dirty="0"/>
-              <a:t>./scan.js</a:t>
+              <a:t>./scanner.js</a:t>
             </a:r>
             <a:endParaRPr lang="ko-KR" altLang="en-US" dirty="0"/>
           </a:p>
@@ -8028,7 +7986,7 @@
         <p:spPr>
           <a:xfrm>
             <a:off x="2370372" y="2774564"/>
-            <a:ext cx="1235201" cy="408623"/>
+            <a:ext cx="1470272" cy="408623"/>
           </a:xfrm>
           <a:prstGeom prst="roundRect">
             <a:avLst/>
@@ -8057,7 +8015,7 @@
             <a:pPr algn="ctr"/>
             <a:r>
               <a:rPr lang="en-US" altLang="ko-KR" dirty="0"/>
-              <a:t>./meta.js</a:t>
+              <a:t>./agnet.js</a:t>
             </a:r>
             <a:endParaRPr lang="ko-KR" altLang="en-US" dirty="0"/>
           </a:p>
@@ -8382,6 +8340,7 @@
             </a:extLst>
           </p:cNvPr>
           <p:cNvCxnSpPr>
+            <a:cxnSpLocks/>
             <a:stCxn id="97" idx="2"/>
             <a:endCxn id="105" idx="1"/>
           </p:cNvCxnSpPr>
@@ -8421,6 +8380,7 @@
             </a:extLst>
           </p:cNvPr>
           <p:cNvCxnSpPr>
+            <a:cxnSpLocks/>
             <a:stCxn id="97" idx="2"/>
             <a:endCxn id="106" idx="1"/>
           </p:cNvCxnSpPr>
@@ -8460,6 +8420,7 @@
             </a:extLst>
           </p:cNvPr>
           <p:cNvCxnSpPr>
+            <a:cxnSpLocks/>
             <a:stCxn id="9" idx="2"/>
             <a:endCxn id="11" idx="1"/>
           </p:cNvCxnSpPr>
@@ -8499,6 +8460,7 @@
             </a:extLst>
           </p:cNvPr>
           <p:cNvCxnSpPr>
+            <a:cxnSpLocks/>
             <a:stCxn id="9" idx="2"/>
             <a:endCxn id="12" idx="1"/>
           </p:cNvCxnSpPr>
@@ -8633,7 +8595,7 @@
         <p:spPr>
           <a:xfrm>
             <a:off x="6862695" y="2240512"/>
-            <a:ext cx="1210347" cy="408623"/>
+            <a:ext cx="1510736" cy="408623"/>
           </a:xfrm>
           <a:prstGeom prst="roundRect">
             <a:avLst/>
@@ -8662,7 +8624,7 @@
             <a:pPr algn="ctr"/>
             <a:r>
               <a:rPr lang="en-US" altLang="ko-KR" dirty="0"/>
-              <a:t>./scan.js</a:t>
+              <a:t>./scanner.js</a:t>
             </a:r>
             <a:endParaRPr lang="ko-KR" altLang="en-US" dirty="0"/>
           </a:p>
@@ -8683,7 +8645,7 @@
         <p:spPr>
           <a:xfrm>
             <a:off x="6858793" y="2779909"/>
-            <a:ext cx="1210347" cy="408623"/>
+            <a:ext cx="1510736" cy="408623"/>
           </a:xfrm>
           <a:prstGeom prst="roundRect">
             <a:avLst/>
@@ -8712,7 +8674,7 @@
             <a:pPr algn="ctr"/>
             <a:r>
               <a:rPr lang="en-US" altLang="ko-KR" dirty="0"/>
-              <a:t>./meta.js</a:t>
+              <a:t>./agent.js</a:t>
             </a:r>
             <a:endParaRPr lang="ko-KR" altLang="en-US" dirty="0"/>
           </a:p>
@@ -8728,6 +8690,7 @@
             </a:extLst>
           </p:cNvPr>
           <p:cNvCxnSpPr>
+            <a:cxnSpLocks/>
             <a:stCxn id="105" idx="3"/>
             <a:endCxn id="129" idx="1"/>
           </p:cNvCxnSpPr>
@@ -8735,8 +8698,8 @@
         </p:nvCxnSpPr>
         <p:spPr>
           <a:xfrm flipV="1">
-            <a:off x="8073042" y="2441089"/>
-            <a:ext cx="1156348" cy="3735"/>
+            <a:off x="8373431" y="2441089"/>
+            <a:ext cx="855959" cy="3735"/>
           </a:xfrm>
           <a:prstGeom prst="straightConnector1">
             <a:avLst/>
@@ -8779,8 +8742,8 @@
         </p:nvCxnSpPr>
         <p:spPr>
           <a:xfrm flipV="1">
-            <a:off x="8069140" y="2978875"/>
-            <a:ext cx="1160250" cy="5346"/>
+            <a:off x="8369529" y="2978875"/>
+            <a:ext cx="859861" cy="5346"/>
           </a:xfrm>
           <a:prstGeom prst="straightConnector1">
             <a:avLst/>

</xml_diff>

<commit_message>
work queue implement. TODO: processor
</commit_message>
<xml_diff>
--- a/bookshelf.index.pptx
+++ b/bookshelf.index.pptx
@@ -275,7 +275,7 @@
           <a:p>
             <a:fld id="{3D0AB2D5-C843-415B-A96C-AFAFFAABBECD}" type="datetimeFigureOut">
               <a:rPr lang="ko-KR" altLang="en-US" smtClean="0"/>
-              <a:t>2021-03-19</a:t>
+              <a:t>2021-03-23</a:t>
             </a:fld>
             <a:endParaRPr lang="ko-KR" altLang="en-US"/>
           </a:p>
@@ -473,7 +473,7 @@
           <a:p>
             <a:fld id="{3D0AB2D5-C843-415B-A96C-AFAFFAABBECD}" type="datetimeFigureOut">
               <a:rPr lang="ko-KR" altLang="en-US" smtClean="0"/>
-              <a:t>2021-03-19</a:t>
+              <a:t>2021-03-23</a:t>
             </a:fld>
             <a:endParaRPr lang="ko-KR" altLang="en-US"/>
           </a:p>
@@ -681,7 +681,7 @@
           <a:p>
             <a:fld id="{3D0AB2D5-C843-415B-A96C-AFAFFAABBECD}" type="datetimeFigureOut">
               <a:rPr lang="ko-KR" altLang="en-US" smtClean="0"/>
-              <a:t>2021-03-19</a:t>
+              <a:t>2021-03-23</a:t>
             </a:fld>
             <a:endParaRPr lang="ko-KR" altLang="en-US"/>
           </a:p>
@@ -879,7 +879,7 @@
           <a:p>
             <a:fld id="{3D0AB2D5-C843-415B-A96C-AFAFFAABBECD}" type="datetimeFigureOut">
               <a:rPr lang="ko-KR" altLang="en-US" smtClean="0"/>
-              <a:t>2021-03-19</a:t>
+              <a:t>2021-03-23</a:t>
             </a:fld>
             <a:endParaRPr lang="ko-KR" altLang="en-US"/>
           </a:p>
@@ -1154,7 +1154,7 @@
           <a:p>
             <a:fld id="{3D0AB2D5-C843-415B-A96C-AFAFFAABBECD}" type="datetimeFigureOut">
               <a:rPr lang="ko-KR" altLang="en-US" smtClean="0"/>
-              <a:t>2021-03-19</a:t>
+              <a:t>2021-03-23</a:t>
             </a:fld>
             <a:endParaRPr lang="ko-KR" altLang="en-US"/>
           </a:p>
@@ -1419,7 +1419,7 @@
           <a:p>
             <a:fld id="{3D0AB2D5-C843-415B-A96C-AFAFFAABBECD}" type="datetimeFigureOut">
               <a:rPr lang="ko-KR" altLang="en-US" smtClean="0"/>
-              <a:t>2021-03-19</a:t>
+              <a:t>2021-03-23</a:t>
             </a:fld>
             <a:endParaRPr lang="ko-KR" altLang="en-US"/>
           </a:p>
@@ -1831,7 +1831,7 @@
           <a:p>
             <a:fld id="{3D0AB2D5-C843-415B-A96C-AFAFFAABBECD}" type="datetimeFigureOut">
               <a:rPr lang="ko-KR" altLang="en-US" smtClean="0"/>
-              <a:t>2021-03-19</a:t>
+              <a:t>2021-03-23</a:t>
             </a:fld>
             <a:endParaRPr lang="ko-KR" altLang="en-US"/>
           </a:p>
@@ -1972,7 +1972,7 @@
           <a:p>
             <a:fld id="{3D0AB2D5-C843-415B-A96C-AFAFFAABBECD}" type="datetimeFigureOut">
               <a:rPr lang="ko-KR" altLang="en-US" smtClean="0"/>
-              <a:t>2021-03-19</a:t>
+              <a:t>2021-03-23</a:t>
             </a:fld>
             <a:endParaRPr lang="ko-KR" altLang="en-US"/>
           </a:p>
@@ -2085,7 +2085,7 @@
           <a:p>
             <a:fld id="{3D0AB2D5-C843-415B-A96C-AFAFFAABBECD}" type="datetimeFigureOut">
               <a:rPr lang="ko-KR" altLang="en-US" smtClean="0"/>
-              <a:t>2021-03-19</a:t>
+              <a:t>2021-03-23</a:t>
             </a:fld>
             <a:endParaRPr lang="ko-KR" altLang="en-US"/>
           </a:p>
@@ -2396,7 +2396,7 @@
           <a:p>
             <a:fld id="{3D0AB2D5-C843-415B-A96C-AFAFFAABBECD}" type="datetimeFigureOut">
               <a:rPr lang="ko-KR" altLang="en-US" smtClean="0"/>
-              <a:t>2021-03-19</a:t>
+              <a:t>2021-03-23</a:t>
             </a:fld>
             <a:endParaRPr lang="ko-KR" altLang="en-US"/>
           </a:p>
@@ -2684,7 +2684,7 @@
           <a:p>
             <a:fld id="{3D0AB2D5-C843-415B-A96C-AFAFFAABBECD}" type="datetimeFigureOut">
               <a:rPr lang="ko-KR" altLang="en-US" smtClean="0"/>
-              <a:t>2021-03-19</a:t>
+              <a:t>2021-03-23</a:t>
             </a:fld>
             <a:endParaRPr lang="ko-KR" altLang="en-US"/>
           </a:p>
@@ -2925,7 +2925,7 @@
           <a:p>
             <a:fld id="{3D0AB2D5-C843-415B-A96C-AFAFFAABBECD}" type="datetimeFigureOut">
               <a:rPr lang="ko-KR" altLang="en-US" smtClean="0"/>
-              <a:t>2021-03-19</a:t>
+              <a:t>2021-03-23</a:t>
             </a:fld>
             <a:endParaRPr lang="ko-KR" altLang="en-US"/>
           </a:p>
@@ -3696,245 +3696,6 @@
           </a:p>
         </p:txBody>
       </p:sp>
-      <p:cxnSp>
-        <p:nvCxnSpPr>
-          <p:cNvPr id="19" name="연결선: 꺾임 18">
-            <a:extLst>
-              <a:ext uri="{FF2B5EF4-FFF2-40B4-BE49-F238E27FC236}">
-                <a16:creationId xmlns:a16="http://schemas.microsoft.com/office/drawing/2014/main" id="{A261ABBC-3001-4E61-9D27-62CB35A29D2C}"/>
-              </a:ext>
-            </a:extLst>
-          </p:cNvPr>
-          <p:cNvCxnSpPr>
-            <a:stCxn id="4" idx="2"/>
-            <a:endCxn id="10" idx="1"/>
-          </p:cNvCxnSpPr>
-          <p:nvPr/>
-        </p:nvCxnSpPr>
-        <p:spPr>
-          <a:xfrm rot="16200000" flipH="1">
-            <a:off x="698418" y="3016356"/>
-            <a:ext cx="4101139" cy="462986"/>
-          </a:xfrm>
-          <a:prstGeom prst="bentConnector2">
-            <a:avLst/>
-          </a:prstGeom>
-        </p:spPr>
-        <p:style>
-          <a:lnRef idx="1">
-            <a:schemeClr val="accent1"/>
-          </a:lnRef>
-          <a:fillRef idx="0">
-            <a:schemeClr val="accent1"/>
-          </a:fillRef>
-          <a:effectRef idx="0">
-            <a:schemeClr val="accent1"/>
-          </a:effectRef>
-          <a:fontRef idx="minor">
-            <a:schemeClr val="tx1"/>
-          </a:fontRef>
-        </p:style>
-      </p:cxnSp>
-      <p:cxnSp>
-        <p:nvCxnSpPr>
-          <p:cNvPr id="20" name="연결선: 꺾임 19">
-            <a:extLst>
-              <a:ext uri="{FF2B5EF4-FFF2-40B4-BE49-F238E27FC236}">
-                <a16:creationId xmlns:a16="http://schemas.microsoft.com/office/drawing/2014/main" id="{D69EF7E5-6AA2-4305-A049-655D5FE03A6D}"/>
-              </a:ext>
-            </a:extLst>
-          </p:cNvPr>
-          <p:cNvCxnSpPr>
-            <a:cxnSpLocks/>
-            <a:stCxn id="4" idx="2"/>
-            <a:endCxn id="9" idx="1"/>
-          </p:cNvCxnSpPr>
-          <p:nvPr/>
-        </p:nvCxnSpPr>
-        <p:spPr>
-          <a:xfrm rot="16200000" flipH="1">
-            <a:off x="1045661" y="2669113"/>
-            <a:ext cx="3406652" cy="462986"/>
-          </a:xfrm>
-          <a:prstGeom prst="bentConnector2">
-            <a:avLst/>
-          </a:prstGeom>
-        </p:spPr>
-        <p:style>
-          <a:lnRef idx="1">
-            <a:schemeClr val="accent1"/>
-          </a:lnRef>
-          <a:fillRef idx="0">
-            <a:schemeClr val="accent1"/>
-          </a:fillRef>
-          <a:effectRef idx="0">
-            <a:schemeClr val="accent1"/>
-          </a:effectRef>
-          <a:fontRef idx="minor">
-            <a:schemeClr val="tx1"/>
-          </a:fontRef>
-        </p:style>
-      </p:cxnSp>
-      <p:cxnSp>
-        <p:nvCxnSpPr>
-          <p:cNvPr id="23" name="연결선: 꺾임 22">
-            <a:extLst>
-              <a:ext uri="{FF2B5EF4-FFF2-40B4-BE49-F238E27FC236}">
-                <a16:creationId xmlns:a16="http://schemas.microsoft.com/office/drawing/2014/main" id="{A96361CD-1EF1-4DD0-84F2-28D0C5874F18}"/>
-              </a:ext>
-            </a:extLst>
-          </p:cNvPr>
-          <p:cNvCxnSpPr>
-            <a:cxnSpLocks/>
-            <a:stCxn id="4" idx="2"/>
-            <a:endCxn id="8" idx="1"/>
-          </p:cNvCxnSpPr>
-          <p:nvPr/>
-        </p:nvCxnSpPr>
-        <p:spPr>
-          <a:xfrm rot="16200000" flipH="1">
-            <a:off x="1392905" y="2321869"/>
-            <a:ext cx="2712165" cy="462986"/>
-          </a:xfrm>
-          <a:prstGeom prst="bentConnector2">
-            <a:avLst/>
-          </a:prstGeom>
-        </p:spPr>
-        <p:style>
-          <a:lnRef idx="1">
-            <a:schemeClr val="accent1"/>
-          </a:lnRef>
-          <a:fillRef idx="0">
-            <a:schemeClr val="accent1"/>
-          </a:fillRef>
-          <a:effectRef idx="0">
-            <a:schemeClr val="accent1"/>
-          </a:effectRef>
-          <a:fontRef idx="minor">
-            <a:schemeClr val="tx1"/>
-          </a:fontRef>
-        </p:style>
-      </p:cxnSp>
-      <p:cxnSp>
-        <p:nvCxnSpPr>
-          <p:cNvPr id="26" name="연결선: 꺾임 25">
-            <a:extLst>
-              <a:ext uri="{FF2B5EF4-FFF2-40B4-BE49-F238E27FC236}">
-                <a16:creationId xmlns:a16="http://schemas.microsoft.com/office/drawing/2014/main" id="{7E39E22D-D91C-4F07-BB10-D9A955E7A0B0}"/>
-              </a:ext>
-            </a:extLst>
-          </p:cNvPr>
-          <p:cNvCxnSpPr>
-            <a:cxnSpLocks/>
-            <a:stCxn id="4" idx="2"/>
-            <a:endCxn id="7" idx="1"/>
-          </p:cNvCxnSpPr>
-          <p:nvPr/>
-        </p:nvCxnSpPr>
-        <p:spPr>
-          <a:xfrm rot="16200000" flipH="1">
-            <a:off x="1734361" y="1980412"/>
-            <a:ext cx="2017678" cy="451413"/>
-          </a:xfrm>
-          <a:prstGeom prst="bentConnector2">
-            <a:avLst/>
-          </a:prstGeom>
-        </p:spPr>
-        <p:style>
-          <a:lnRef idx="1">
-            <a:schemeClr val="accent1"/>
-          </a:lnRef>
-          <a:fillRef idx="0">
-            <a:schemeClr val="accent1"/>
-          </a:fillRef>
-          <a:effectRef idx="0">
-            <a:schemeClr val="accent1"/>
-          </a:effectRef>
-          <a:fontRef idx="minor">
-            <a:schemeClr val="tx1"/>
-          </a:fontRef>
-        </p:style>
-      </p:cxnSp>
-      <p:cxnSp>
-        <p:nvCxnSpPr>
-          <p:cNvPr id="29" name="연결선: 꺾임 28">
-            <a:extLst>
-              <a:ext uri="{FF2B5EF4-FFF2-40B4-BE49-F238E27FC236}">
-                <a16:creationId xmlns:a16="http://schemas.microsoft.com/office/drawing/2014/main" id="{262CD060-B231-4FF0-9E3E-E98BBEBD2E43}"/>
-              </a:ext>
-            </a:extLst>
-          </p:cNvPr>
-          <p:cNvCxnSpPr>
-            <a:cxnSpLocks/>
-            <a:stCxn id="4" idx="2"/>
-            <a:endCxn id="6" idx="1"/>
-          </p:cNvCxnSpPr>
-          <p:nvPr/>
-        </p:nvCxnSpPr>
-        <p:spPr>
-          <a:xfrm rot="16200000" flipH="1">
-            <a:off x="2093177" y="1621597"/>
-            <a:ext cx="1311620" cy="462986"/>
-          </a:xfrm>
-          <a:prstGeom prst="bentConnector2">
-            <a:avLst/>
-          </a:prstGeom>
-        </p:spPr>
-        <p:style>
-          <a:lnRef idx="1">
-            <a:schemeClr val="accent1"/>
-          </a:lnRef>
-          <a:fillRef idx="0">
-            <a:schemeClr val="accent1"/>
-          </a:fillRef>
-          <a:effectRef idx="0">
-            <a:schemeClr val="accent1"/>
-          </a:effectRef>
-          <a:fontRef idx="minor">
-            <a:schemeClr val="tx1"/>
-          </a:fontRef>
-        </p:style>
-      </p:cxnSp>
-      <p:cxnSp>
-        <p:nvCxnSpPr>
-          <p:cNvPr id="32" name="연결선: 꺾임 31">
-            <a:extLst>
-              <a:ext uri="{FF2B5EF4-FFF2-40B4-BE49-F238E27FC236}">
-                <a16:creationId xmlns:a16="http://schemas.microsoft.com/office/drawing/2014/main" id="{6FC53A09-87C6-45A7-97A2-AC052A3ACD12}"/>
-              </a:ext>
-            </a:extLst>
-          </p:cNvPr>
-          <p:cNvCxnSpPr>
-            <a:cxnSpLocks/>
-            <a:stCxn id="4" idx="2"/>
-            <a:endCxn id="5" idx="1"/>
-          </p:cNvCxnSpPr>
-          <p:nvPr/>
-        </p:nvCxnSpPr>
-        <p:spPr>
-          <a:xfrm rot="16200000" flipH="1">
-            <a:off x="2441122" y="1273651"/>
-            <a:ext cx="604156" cy="451413"/>
-          </a:xfrm>
-          <a:prstGeom prst="bentConnector2">
-            <a:avLst/>
-          </a:prstGeom>
-        </p:spPr>
-        <p:style>
-          <a:lnRef idx="1">
-            <a:schemeClr val="accent1"/>
-          </a:lnRef>
-          <a:fillRef idx="0">
-            <a:schemeClr val="accent1"/>
-          </a:fillRef>
-          <a:effectRef idx="0">
-            <a:schemeClr val="accent1"/>
-          </a:effectRef>
-          <a:fontRef idx="minor">
-            <a:schemeClr val="tx1"/>
-          </a:fontRef>
-        </p:style>
-      </p:cxnSp>
       <p:sp>
         <p:nvSpPr>
           <p:cNvPr id="38" name="TextBox 37">
@@ -4353,7 +4114,7 @@
         </p:nvSpPr>
         <p:spPr>
           <a:xfrm>
-            <a:off x="3612340" y="4076337"/>
+            <a:off x="3122117" y="3641025"/>
             <a:ext cx="756213" cy="408623"/>
           </a:xfrm>
           <a:prstGeom prst="roundRect">
@@ -4406,8 +4167,8 @@
         </p:nvSpPr>
         <p:spPr>
           <a:xfrm>
-            <a:off x="1715137" y="5767716"/>
-            <a:ext cx="902825" cy="369332"/>
+            <a:off x="868822" y="3539774"/>
+            <a:ext cx="1126714" cy="646331"/>
           </a:xfrm>
           <a:prstGeom prst="rect">
             <a:avLst/>
@@ -4436,7 +4197,14 @@
             <a:pPr algn="ctr"/>
             <a:r>
               <a:rPr lang="en-US" altLang="ko-KR" dirty="0"/>
-              <a:t>react</a:t>
+              <a:t>Web UI</a:t>
+            </a:r>
+          </a:p>
+          <a:p>
+            <a:pPr algn="ctr"/>
+            <a:r>
+              <a:rPr lang="en-US" altLang="ko-KR" dirty="0"/>
+              <a:t>(react)</a:t>
             </a:r>
             <a:endParaRPr lang="ko-KR" altLang="en-US" dirty="0"/>
           </a:p>
@@ -4513,48 +4281,6 @@
             <a:ext cx="0" cy="278541"/>
           </a:xfrm>
           <a:prstGeom prst="straightConnector1">
-            <a:avLst/>
-          </a:prstGeom>
-          <a:ln>
-            <a:tailEnd type="triangle"/>
-          </a:ln>
-        </p:spPr>
-        <p:style>
-          <a:lnRef idx="1">
-            <a:schemeClr val="accent1"/>
-          </a:lnRef>
-          <a:fillRef idx="0">
-            <a:schemeClr val="accent1"/>
-          </a:fillRef>
-          <a:effectRef idx="0">
-            <a:schemeClr val="accent1"/>
-          </a:effectRef>
-          <a:fontRef idx="minor">
-            <a:schemeClr val="tx1"/>
-          </a:fontRef>
-        </p:style>
-      </p:cxnSp>
-      <p:cxnSp>
-        <p:nvCxnSpPr>
-          <p:cNvPr id="54" name="연결선: 꺾임 53">
-            <a:extLst>
-              <a:ext uri="{FF2B5EF4-FFF2-40B4-BE49-F238E27FC236}">
-                <a16:creationId xmlns:a16="http://schemas.microsoft.com/office/drawing/2014/main" id="{E2A2624A-4FF6-4550-BF5D-88D7DCC5B9A9}"/>
-              </a:ext>
-            </a:extLst>
-          </p:cNvPr>
-          <p:cNvCxnSpPr>
-            <a:stCxn id="46" idx="2"/>
-            <a:endCxn id="11" idx="1"/>
-          </p:cNvCxnSpPr>
-          <p:nvPr/>
-        </p:nvCxnSpPr>
-        <p:spPr>
-          <a:xfrm rot="16200000" flipH="1">
-            <a:off x="2410935" y="3079243"/>
-            <a:ext cx="1564689" cy="838121"/>
-          </a:xfrm>
-          <a:prstGeom prst="bentConnector2">
             <a:avLst/>
           </a:prstGeom>
           <a:ln>
@@ -5565,51 +5291,6 @@
           </p:txBody>
         </p:sp>
       </p:grpSp>
-      <p:cxnSp>
-        <p:nvCxnSpPr>
-          <p:cNvPr id="169" name="연결선: 꺾임 168">
-            <a:extLst>
-              <a:ext uri="{FF2B5EF4-FFF2-40B4-BE49-F238E27FC236}">
-                <a16:creationId xmlns:a16="http://schemas.microsoft.com/office/drawing/2014/main" id="{CDB11825-180E-4499-9118-F84BC84C493B}"/>
-              </a:ext>
-            </a:extLst>
-          </p:cNvPr>
-          <p:cNvCxnSpPr>
-            <a:stCxn id="46" idx="2"/>
-            <a:endCxn id="45" idx="1"/>
-          </p:cNvCxnSpPr>
-          <p:nvPr/>
-        </p:nvCxnSpPr>
-        <p:spPr>
-          <a:xfrm rot="5400000">
-            <a:off x="626467" y="3804630"/>
-            <a:ext cx="3236422" cy="1059082"/>
-          </a:xfrm>
-          <a:prstGeom prst="bentConnector4">
-            <a:avLst>
-              <a:gd name="adj1" fmla="val 47147"/>
-              <a:gd name="adj2" fmla="val 121585"/>
-            </a:avLst>
-          </a:prstGeom>
-          <a:ln>
-            <a:tailEnd type="triangle"/>
-          </a:ln>
-        </p:spPr>
-        <p:style>
-          <a:lnRef idx="1">
-            <a:schemeClr val="accent1"/>
-          </a:lnRef>
-          <a:fillRef idx="0">
-            <a:schemeClr val="accent1"/>
-          </a:fillRef>
-          <a:effectRef idx="0">
-            <a:schemeClr val="accent1"/>
-          </a:effectRef>
-          <a:fontRef idx="minor">
-            <a:schemeClr val="tx1"/>
-          </a:fontRef>
-        </p:style>
-      </p:cxnSp>
       <p:sp>
         <p:nvSpPr>
           <p:cNvPr id="187" name="사각형: 둥근 모서리 186">
@@ -5854,92 +5535,6 @@
       </p:cxnSp>
       <p:cxnSp>
         <p:nvCxnSpPr>
-          <p:cNvPr id="212" name="직선 화살표 연결선 211">
-            <a:extLst>
-              <a:ext uri="{FF2B5EF4-FFF2-40B4-BE49-F238E27FC236}">
-                <a16:creationId xmlns:a16="http://schemas.microsoft.com/office/drawing/2014/main" id="{3B57F6AA-46C8-4FD1-90A2-593D664D6653}"/>
-              </a:ext>
-            </a:extLst>
-          </p:cNvPr>
-          <p:cNvCxnSpPr>
-            <a:stCxn id="45" idx="0"/>
-            <a:endCxn id="11" idx="2"/>
-          </p:cNvCxnSpPr>
-          <p:nvPr/>
-        </p:nvCxnSpPr>
-        <p:spPr>
-          <a:xfrm flipV="1">
-            <a:off x="2166550" y="4484960"/>
-            <a:ext cx="1823897" cy="1282756"/>
-          </a:xfrm>
-          <a:prstGeom prst="straightConnector1">
-            <a:avLst/>
-          </a:prstGeom>
-          <a:ln>
-            <a:headEnd type="triangle"/>
-            <a:tailEnd type="triangle"/>
-          </a:ln>
-        </p:spPr>
-        <p:style>
-          <a:lnRef idx="1">
-            <a:schemeClr val="accent1"/>
-          </a:lnRef>
-          <a:fillRef idx="0">
-            <a:schemeClr val="accent1"/>
-          </a:fillRef>
-          <a:effectRef idx="0">
-            <a:schemeClr val="accent1"/>
-          </a:effectRef>
-          <a:fontRef idx="minor">
-            <a:schemeClr val="tx1"/>
-          </a:fontRef>
-        </p:style>
-      </p:cxnSp>
-      <p:cxnSp>
-        <p:nvCxnSpPr>
-          <p:cNvPr id="218" name="직선 화살표 연결선 217">
-            <a:extLst>
-              <a:ext uri="{FF2B5EF4-FFF2-40B4-BE49-F238E27FC236}">
-                <a16:creationId xmlns:a16="http://schemas.microsoft.com/office/drawing/2014/main" id="{614F41A6-E7EE-499F-BF27-6C1098CA4C40}"/>
-              </a:ext>
-            </a:extLst>
-          </p:cNvPr>
-          <p:cNvCxnSpPr>
-            <a:stCxn id="11" idx="3"/>
-            <a:endCxn id="192" idx="1"/>
-          </p:cNvCxnSpPr>
-          <p:nvPr/>
-        </p:nvCxnSpPr>
-        <p:spPr>
-          <a:xfrm flipV="1">
-            <a:off x="4368553" y="1271316"/>
-            <a:ext cx="1172518" cy="3009333"/>
-          </a:xfrm>
-          <a:prstGeom prst="straightConnector1">
-            <a:avLst/>
-          </a:prstGeom>
-          <a:ln>
-            <a:headEnd type="triangle"/>
-            <a:tailEnd type="triangle"/>
-          </a:ln>
-        </p:spPr>
-        <p:style>
-          <a:lnRef idx="1">
-            <a:schemeClr val="accent1"/>
-          </a:lnRef>
-          <a:fillRef idx="0">
-            <a:schemeClr val="accent1"/>
-          </a:fillRef>
-          <a:effectRef idx="0">
-            <a:schemeClr val="accent1"/>
-          </a:effectRef>
-          <a:fontRef idx="minor">
-            <a:schemeClr val="tx1"/>
-          </a:fontRef>
-        </p:style>
-      </p:cxnSp>
-      <p:cxnSp>
-        <p:nvCxnSpPr>
           <p:cNvPr id="225" name="직선 화살표 연결선 224">
             <a:extLst>
               <a:ext uri="{FF2B5EF4-FFF2-40B4-BE49-F238E27FC236}">
@@ -6008,6 +5603,178 @@
             </a:avLst>
           </a:prstGeom>
           <a:ln>
+            <a:tailEnd type="triangle"/>
+          </a:ln>
+        </p:spPr>
+        <p:style>
+          <a:lnRef idx="1">
+            <a:schemeClr val="accent1"/>
+          </a:lnRef>
+          <a:fillRef idx="0">
+            <a:schemeClr val="accent1"/>
+          </a:fillRef>
+          <a:effectRef idx="0">
+            <a:schemeClr val="accent1"/>
+          </a:effectRef>
+          <a:fontRef idx="minor">
+            <a:schemeClr val="tx1"/>
+          </a:fontRef>
+        </p:style>
+      </p:cxnSp>
+      <p:cxnSp>
+        <p:nvCxnSpPr>
+          <p:cNvPr id="16" name="연결선: 꺾임 15">
+            <a:extLst>
+              <a:ext uri="{FF2B5EF4-FFF2-40B4-BE49-F238E27FC236}">
+                <a16:creationId xmlns:a16="http://schemas.microsoft.com/office/drawing/2014/main" id="{56DFDE49-D5F2-45B7-B9BE-E1361C5020B0}"/>
+              </a:ext>
+            </a:extLst>
+          </p:cNvPr>
+          <p:cNvCxnSpPr>
+            <a:cxnSpLocks/>
+            <a:stCxn id="46" idx="2"/>
+            <a:endCxn id="45" idx="0"/>
+          </p:cNvCxnSpPr>
+          <p:nvPr/>
+        </p:nvCxnSpPr>
+        <p:spPr>
+          <a:xfrm rot="5400000">
+            <a:off x="1691292" y="2456847"/>
+            <a:ext cx="823814" cy="1342040"/>
+          </a:xfrm>
+          <a:prstGeom prst="bentConnector3">
+            <a:avLst/>
+          </a:prstGeom>
+          <a:ln>
+            <a:tailEnd type="triangle"/>
+          </a:ln>
+        </p:spPr>
+        <p:style>
+          <a:lnRef idx="1">
+            <a:schemeClr val="accent1"/>
+          </a:lnRef>
+          <a:fillRef idx="0">
+            <a:schemeClr val="accent1"/>
+          </a:fillRef>
+          <a:effectRef idx="0">
+            <a:schemeClr val="accent1"/>
+          </a:effectRef>
+          <a:fontRef idx="minor">
+            <a:schemeClr val="tx1"/>
+          </a:fontRef>
+        </p:style>
+      </p:cxnSp>
+      <p:cxnSp>
+        <p:nvCxnSpPr>
+          <p:cNvPr id="18" name="연결선: 꺾임 17">
+            <a:extLst>
+              <a:ext uri="{FF2B5EF4-FFF2-40B4-BE49-F238E27FC236}">
+                <a16:creationId xmlns:a16="http://schemas.microsoft.com/office/drawing/2014/main" id="{5C2C64A5-0BB9-4C07-9E56-9522856943AC}"/>
+              </a:ext>
+            </a:extLst>
+          </p:cNvPr>
+          <p:cNvCxnSpPr>
+            <a:stCxn id="46" idx="2"/>
+            <a:endCxn id="11" idx="0"/>
+          </p:cNvCxnSpPr>
+          <p:nvPr/>
+        </p:nvCxnSpPr>
+        <p:spPr>
+          <a:xfrm rot="16200000" flipH="1">
+            <a:off x="2674689" y="2815489"/>
+            <a:ext cx="925065" cy="726005"/>
+          </a:xfrm>
+          <a:prstGeom prst="bentConnector3">
+            <a:avLst/>
+          </a:prstGeom>
+          <a:ln>
+            <a:tailEnd type="triangle"/>
+          </a:ln>
+        </p:spPr>
+        <p:style>
+          <a:lnRef idx="1">
+            <a:schemeClr val="accent1"/>
+          </a:lnRef>
+          <a:fillRef idx="0">
+            <a:schemeClr val="accent1"/>
+          </a:fillRef>
+          <a:effectRef idx="0">
+            <a:schemeClr val="accent1"/>
+          </a:effectRef>
+          <a:fontRef idx="minor">
+            <a:schemeClr val="tx1"/>
+          </a:fontRef>
+        </p:style>
+      </p:cxnSp>
+      <p:cxnSp>
+        <p:nvCxnSpPr>
+          <p:cNvPr id="22" name="직선 화살표 연결선 21">
+            <a:extLst>
+              <a:ext uri="{FF2B5EF4-FFF2-40B4-BE49-F238E27FC236}">
+                <a16:creationId xmlns:a16="http://schemas.microsoft.com/office/drawing/2014/main" id="{829E7548-C794-4A35-AF9B-F0ABA2762B79}"/>
+              </a:ext>
+            </a:extLst>
+          </p:cNvPr>
+          <p:cNvCxnSpPr>
+            <a:cxnSpLocks/>
+            <a:stCxn id="45" idx="3"/>
+            <a:endCxn id="11" idx="1"/>
+          </p:cNvCxnSpPr>
+          <p:nvPr/>
+        </p:nvCxnSpPr>
+        <p:spPr>
+          <a:xfrm flipV="1">
+            <a:off x="1995536" y="3845337"/>
+            <a:ext cx="1126581" cy="17603"/>
+          </a:xfrm>
+          <a:prstGeom prst="straightConnector1">
+            <a:avLst/>
+          </a:prstGeom>
+          <a:ln>
+            <a:headEnd type="triangle"/>
+            <a:tailEnd type="triangle"/>
+          </a:ln>
+        </p:spPr>
+        <p:style>
+          <a:lnRef idx="1">
+            <a:schemeClr val="accent1"/>
+          </a:lnRef>
+          <a:fillRef idx="0">
+            <a:schemeClr val="accent1"/>
+          </a:fillRef>
+          <a:effectRef idx="0">
+            <a:schemeClr val="accent1"/>
+          </a:effectRef>
+          <a:fontRef idx="minor">
+            <a:schemeClr val="tx1"/>
+          </a:fontRef>
+        </p:style>
+      </p:cxnSp>
+      <p:cxnSp>
+        <p:nvCxnSpPr>
+          <p:cNvPr id="224" name="연결선: 꺾임 223">
+            <a:extLst>
+              <a:ext uri="{FF2B5EF4-FFF2-40B4-BE49-F238E27FC236}">
+                <a16:creationId xmlns:a16="http://schemas.microsoft.com/office/drawing/2014/main" id="{4924D7D2-07D7-4A54-8EEE-871D090B03A9}"/>
+              </a:ext>
+            </a:extLst>
+          </p:cNvPr>
+          <p:cNvCxnSpPr>
+            <a:stCxn id="11" idx="3"/>
+            <a:endCxn id="192" idx="1"/>
+          </p:cNvCxnSpPr>
+          <p:nvPr/>
+        </p:nvCxnSpPr>
+        <p:spPr>
+          <a:xfrm flipV="1">
+            <a:off x="3878330" y="1271316"/>
+            <a:ext cx="1662741" cy="2574021"/>
+          </a:xfrm>
+          <a:prstGeom prst="bentConnector3">
+            <a:avLst/>
+          </a:prstGeom>
+          <a:ln>
+            <a:headEnd type="triangle"/>
             <a:tailEnd type="triangle"/>
           </a:ln>
         </p:spPr>

</xml_diff>

<commit_message>
Add git commit rules
</commit_message>
<xml_diff>
--- a/bookshelf.index.pptx
+++ b/bookshelf.index.pptx
@@ -11,6 +11,7 @@
     <p:sldId id="260" r:id="rId5"/>
     <p:sldId id="261" r:id="rId6"/>
     <p:sldId id="262" r:id="rId7"/>
+    <p:sldId id="263" r:id="rId8"/>
   </p:sldIdLst>
   <p:sldSz cx="12192000" cy="6858000"/>
   <p:notesSz cx="6858000" cy="9144000"/>
@@ -10489,6 +10490,191 @@
     <p:extLst>
       <p:ext uri="{BB962C8B-B14F-4D97-AF65-F5344CB8AC3E}">
         <p14:creationId xmlns:p14="http://schemas.microsoft.com/office/powerpoint/2010/main" val="3403130779"/>
+      </p:ext>
+    </p:extLst>
+  </p:cSld>
+  <p:clrMapOvr>
+    <a:masterClrMapping/>
+  </p:clrMapOvr>
+</p:sld>
+</file>
+
+<file path=ppt/slides/slide7.xml><?xml version="1.0" encoding="utf-8"?>
+<p:sld xmlns:a="http://schemas.openxmlformats.org/drawingml/2006/main" xmlns:r="http://schemas.openxmlformats.org/officeDocument/2006/relationships" xmlns:p="http://schemas.openxmlformats.org/presentationml/2006/main">
+  <p:cSld>
+    <p:spTree>
+      <p:nvGrpSpPr>
+        <p:cNvPr id="1" name=""/>
+        <p:cNvGrpSpPr/>
+        <p:nvPr/>
+      </p:nvGrpSpPr>
+      <p:grpSpPr>
+        <a:xfrm>
+          <a:off x="0" y="0"/>
+          <a:ext cx="0" cy="0"/>
+          <a:chOff x="0" y="0"/>
+          <a:chExt cx="0" cy="0"/>
+        </a:xfrm>
+      </p:grpSpPr>
+      <p:sp>
+        <p:nvSpPr>
+          <p:cNvPr id="4" name="TextBox 3">
+            <a:extLst>
+              <a:ext uri="{FF2B5EF4-FFF2-40B4-BE49-F238E27FC236}">
+                <a16:creationId xmlns:a16="http://schemas.microsoft.com/office/drawing/2014/main" id="{179D70D0-4870-4B5C-B17D-EA53EC1C2611}"/>
+              </a:ext>
+            </a:extLst>
+          </p:cNvPr>
+          <p:cNvSpPr txBox="1"/>
+          <p:nvPr/>
+        </p:nvSpPr>
+        <p:spPr>
+          <a:xfrm>
+            <a:off x="208344" y="162046"/>
+            <a:ext cx="6433171" cy="646331"/>
+          </a:xfrm>
+          <a:prstGeom prst="rect">
+            <a:avLst/>
+          </a:prstGeom>
+          <a:noFill/>
+        </p:spPr>
+        <p:txBody>
+          <a:bodyPr wrap="none" rtlCol="0">
+            <a:spAutoFit/>
+          </a:bodyPr>
+          <a:lstStyle/>
+          <a:p>
+            <a:r>
+              <a:rPr lang="en-US" altLang="ko-KR" dirty="0"/>
+              <a:t>Git commit rules</a:t>
+            </a:r>
+          </a:p>
+          <a:p>
+            <a:r>
+              <a:rPr lang="en-US" altLang="ko-KR" dirty="0"/>
+              <a:t>https://blog.ull.im/engineering/2019/03/10/logs-on-git.html</a:t>
+            </a:r>
+          </a:p>
+        </p:txBody>
+      </p:sp>
+      <p:sp>
+        <p:nvSpPr>
+          <p:cNvPr id="5" name="TextBox 4">
+            <a:extLst>
+              <a:ext uri="{FF2B5EF4-FFF2-40B4-BE49-F238E27FC236}">
+                <a16:creationId xmlns:a16="http://schemas.microsoft.com/office/drawing/2014/main" id="{66B550A6-2325-4F5C-8D3D-E9AF0EE7CFD1}"/>
+              </a:ext>
+            </a:extLst>
+          </p:cNvPr>
+          <p:cNvSpPr txBox="1"/>
+          <p:nvPr/>
+        </p:nvSpPr>
+        <p:spPr>
+          <a:xfrm>
+            <a:off x="208344" y="1898908"/>
+            <a:ext cx="4876335" cy="923330"/>
+          </a:xfrm>
+          <a:prstGeom prst="rect">
+            <a:avLst/>
+          </a:prstGeom>
+          <a:noFill/>
+        </p:spPr>
+        <p:txBody>
+          <a:bodyPr wrap="none" rtlCol="0">
+            <a:spAutoFit/>
+          </a:bodyPr>
+          <a:lstStyle/>
+          <a:p>
+            <a:r>
+              <a:rPr lang="en-US" altLang="ko-KR" dirty="0"/>
+              <a:t>Fix</a:t>
+            </a:r>
+            <a:r>
+              <a:rPr lang="ko-KR" altLang="en-US" dirty="0"/>
+              <a:t> </a:t>
+            </a:r>
+            <a:r>
+              <a:rPr lang="en-US" altLang="ko-KR" dirty="0"/>
+              <a:t>A</a:t>
+            </a:r>
+            <a:r>
+              <a:rPr lang="ko-KR" altLang="en-US" dirty="0"/>
+              <a:t> </a:t>
+            </a:r>
+            <a:r>
+              <a:rPr lang="en-US" altLang="ko-KR" dirty="0"/>
+              <a:t>[in B] [which/that C] [to (be)/so that D]</a:t>
+            </a:r>
+          </a:p>
+          <a:p>
+            <a:endParaRPr lang="en-US" altLang="ko-KR" dirty="0"/>
+          </a:p>
+          <a:p>
+            <a:r>
+              <a:rPr lang="en-US" altLang="ko-KR" dirty="0"/>
+              <a:t>Fix issue/error/crash [where/when A]</a:t>
+            </a:r>
+            <a:endParaRPr lang="ko-KR" altLang="en-US" dirty="0"/>
+          </a:p>
+        </p:txBody>
+      </p:sp>
+      <p:sp>
+        <p:nvSpPr>
+          <p:cNvPr id="7" name="TextBox 6">
+            <a:extLst>
+              <a:ext uri="{FF2B5EF4-FFF2-40B4-BE49-F238E27FC236}">
+                <a16:creationId xmlns:a16="http://schemas.microsoft.com/office/drawing/2014/main" id="{0F00DBFF-48CD-4490-9FB2-3A50184A51E4}"/>
+              </a:ext>
+            </a:extLst>
+          </p:cNvPr>
+          <p:cNvSpPr txBox="1"/>
+          <p:nvPr/>
+        </p:nvSpPr>
+        <p:spPr>
+          <a:xfrm>
+            <a:off x="208344" y="3727575"/>
+            <a:ext cx="10767371" cy="1477328"/>
+          </a:xfrm>
+          <a:prstGeom prst="rect">
+            <a:avLst/>
+          </a:prstGeom>
+          <a:noFill/>
+        </p:spPr>
+        <p:txBody>
+          <a:bodyPr wrap="none" rtlCol="0">
+            <a:spAutoFit/>
+          </a:bodyPr>
+          <a:lstStyle/>
+          <a:p>
+            <a:r>
+              <a:rPr lang="en-US" altLang="ko-KR" dirty="0"/>
+              <a:t>Add A [for/to B] || Remove A [from B] || Use A [for/to/in/instead of B] || Update A to B || Make A B ||</a:t>
+            </a:r>
+          </a:p>
+          <a:p>
+            <a:endParaRPr lang="en-US" altLang="ko-KR" dirty="0"/>
+          </a:p>
+          <a:p>
+            <a:r>
+              <a:rPr lang="en-US" altLang="ko-KR" dirty="0"/>
+              <a:t>Refactor/Simplify/Improve/Implement/Revise/Correct/Ensure/Prevent/Avoid A ||</a:t>
+            </a:r>
+          </a:p>
+          <a:p>
+            <a:endParaRPr lang="en-US" altLang="ko-KR" dirty="0"/>
+          </a:p>
+          <a:p>
+            <a:r>
+              <a:rPr lang="en-US" altLang="ko-KR" dirty="0"/>
+              <a:t>Move A to/into B || Rename A to B || Allow A to B || Verify A || Set A to B || Pass A to B</a:t>
+            </a:r>
+          </a:p>
+        </p:txBody>
+      </p:sp>
+    </p:spTree>
+    <p:extLst>
+      <p:ext uri="{BB962C8B-B14F-4D97-AF65-F5344CB8AC3E}">
+        <p14:creationId xmlns:p14="http://schemas.microsoft.com/office/powerpoint/2010/main" val="3276750450"/>
       </p:ext>
     </p:extLst>
   </p:cSld>

</xml_diff>

<commit_message>
Add more comments to `Add to library` diagram in bookshelf.index.pptx
</commit_message>
<xml_diff>
--- a/bookshelf.index.pptx
+++ b/bookshelf.index.pptx
@@ -120,7 +120,7 @@
 
 <file path=ppt/commentAuthors.xml><?xml version="1.0" encoding="utf-8"?>
 <p:cmAuthorLst xmlns:a="http://schemas.openxmlformats.org/drawingml/2006/main" xmlns:r="http://schemas.openxmlformats.org/officeDocument/2006/relationships" xmlns:p="http://schemas.openxmlformats.org/presentationml/2006/main">
-  <p:cmAuthor id="1" name="김석희[ 학부휴학 / 컴퓨터학과 ]" initials="김학/컴]" lastIdx="2" clrIdx="0">
+  <p:cmAuthor id="1" name="김석희[ 학부휴학 / 컴퓨터학과 ]" initials="김학/컴]" lastIdx="3" clrIdx="0">
     <p:extLst>
       <p:ext uri="{19B8F6BF-5375-455C-9EA6-DF929625EA0E}">
         <p15:presenceInfo xmlns:p15="http://schemas.microsoft.com/office/powerpoint/2012/main" userId="김석희[ 학부휴학 / 컴퓨터학과 ]" providerId="None"/>
@@ -8807,52 +8807,6 @@
       </p:grpSpPr>
       <p:sp>
         <p:nvSpPr>
-          <p:cNvPr id="114" name="직사각형 113">
-            <a:extLst>
-              <a:ext uri="{FF2B5EF4-FFF2-40B4-BE49-F238E27FC236}">
-                <a16:creationId xmlns:a16="http://schemas.microsoft.com/office/drawing/2014/main" id="{71725750-D98D-4C93-BE95-CEAC793D47BA}"/>
-              </a:ext>
-            </a:extLst>
-          </p:cNvPr>
-          <p:cNvSpPr/>
-          <p:nvPr/>
-        </p:nvSpPr>
-        <p:spPr>
-          <a:xfrm>
-            <a:off x="793697" y="3228489"/>
-            <a:ext cx="2534856" cy="2570921"/>
-          </a:xfrm>
-          <a:prstGeom prst="rect">
-            <a:avLst/>
-          </a:prstGeom>
-        </p:spPr>
-        <p:style>
-          <a:lnRef idx="2">
-            <a:schemeClr val="accent5"/>
-          </a:lnRef>
-          <a:fillRef idx="1">
-            <a:schemeClr val="lt1"/>
-          </a:fillRef>
-          <a:effectRef idx="0">
-            <a:schemeClr val="accent5"/>
-          </a:effectRef>
-          <a:fontRef idx="minor">
-            <a:schemeClr val="dk1"/>
-          </a:fontRef>
-        </p:style>
-        <p:txBody>
-          <a:bodyPr rtlCol="0" anchor="ctr">
-            <a:spAutoFit/>
-          </a:bodyPr>
-          <a:lstStyle/>
-          <a:p>
-            <a:pPr algn="ctr"/>
-            <a:endParaRPr lang="ko-KR" altLang="en-US" dirty="0"/>
-          </a:p>
-        </p:txBody>
-      </p:sp>
-      <p:sp>
-        <p:nvSpPr>
           <p:cNvPr id="4" name="직사각형 3">
             <a:extLst>
               <a:ext uri="{FF2B5EF4-FFF2-40B4-BE49-F238E27FC236}">
@@ -8917,62 +8871,12 @@
           </a:p>
         </p:txBody>
       </p:sp>
-      <p:sp>
-        <p:nvSpPr>
-          <p:cNvPr id="5" name="직사각형 4">
-            <a:extLst>
-              <a:ext uri="{FF2B5EF4-FFF2-40B4-BE49-F238E27FC236}">
-                <a16:creationId xmlns:a16="http://schemas.microsoft.com/office/drawing/2014/main" id="{006BBC62-13D3-446C-8A8B-D4341B391813}"/>
-              </a:ext>
-            </a:extLst>
-          </p:cNvPr>
-          <p:cNvSpPr/>
-          <p:nvPr/>
-        </p:nvSpPr>
-        <p:spPr>
-          <a:xfrm>
-            <a:off x="6072849" y="1246869"/>
-            <a:ext cx="1377387" cy="646331"/>
-          </a:xfrm>
-          <a:prstGeom prst="rect">
-            <a:avLst/>
-          </a:prstGeom>
-        </p:spPr>
-        <p:style>
-          <a:lnRef idx="2">
-            <a:schemeClr val="accent5"/>
-          </a:lnRef>
-          <a:fillRef idx="1">
-            <a:schemeClr val="lt1"/>
-          </a:fillRef>
-          <a:effectRef idx="0">
-            <a:schemeClr val="accent5"/>
-          </a:effectRef>
-          <a:fontRef idx="minor">
-            <a:schemeClr val="dk1"/>
-          </a:fontRef>
-        </p:style>
-        <p:txBody>
-          <a:bodyPr wrap="square" rtlCol="0" anchor="ctr">
-            <a:spAutoFit/>
-          </a:bodyPr>
-          <a:lstStyle/>
-          <a:p>
-            <a:pPr algn="ctr"/>
-            <a:r>
-              <a:rPr lang="en-US" altLang="ko-KR" dirty="0"/>
-              <a:t>Scanning directory</a:t>
-            </a:r>
-            <a:endParaRPr lang="ko-KR" altLang="en-US" dirty="0"/>
-          </a:p>
-        </p:txBody>
-      </p:sp>
       <p:grpSp>
         <p:nvGrpSpPr>
-          <p:cNvPr id="17" name="그룹 16">
-            <a:extLst>
-              <a:ext uri="{FF2B5EF4-FFF2-40B4-BE49-F238E27FC236}">
-                <a16:creationId xmlns:a16="http://schemas.microsoft.com/office/drawing/2014/main" id="{8A528157-9719-4521-84F2-0D2E784E15B0}"/>
+          <p:cNvPr id="183" name="그룹 182">
+            <a:extLst>
+              <a:ext uri="{FF2B5EF4-FFF2-40B4-BE49-F238E27FC236}">
+                <a16:creationId xmlns:a16="http://schemas.microsoft.com/office/drawing/2014/main" id="{759EA060-EA77-4A4F-A01C-45CC84B7B663}"/>
               </a:ext>
             </a:extLst>
           </p:cNvPr>
@@ -8981,18 +8885,121 @@
         </p:nvGrpSpPr>
         <p:grpSpPr>
           <a:xfrm>
-            <a:off x="5789268" y="2390724"/>
-            <a:ext cx="1944547" cy="1435261"/>
-            <a:chOff x="4573926" y="1796098"/>
-            <a:chExt cx="1944547" cy="1435261"/>
+            <a:off x="3244860" y="1373424"/>
+            <a:ext cx="3356658" cy="3844747"/>
+            <a:chOff x="416689" y="2257251"/>
+            <a:chExt cx="3356658" cy="3844747"/>
           </a:xfrm>
         </p:grpSpPr>
+        <p:grpSp>
+          <p:nvGrpSpPr>
+            <p:cNvPr id="182" name="그룹 181">
+              <a:extLst>
+                <a:ext uri="{FF2B5EF4-FFF2-40B4-BE49-F238E27FC236}">
+                  <a16:creationId xmlns:a16="http://schemas.microsoft.com/office/drawing/2014/main" id="{E790C6B2-51FA-41CF-A555-E3D9BF53A52C}"/>
+                </a:ext>
+              </a:extLst>
+            </p:cNvPr>
+            <p:cNvGrpSpPr/>
+            <p:nvPr/>
+          </p:nvGrpSpPr>
+          <p:grpSpPr>
+            <a:xfrm>
+              <a:off x="416689" y="2257251"/>
+              <a:ext cx="3356658" cy="3844747"/>
+              <a:chOff x="416689" y="2257251"/>
+              <a:chExt cx="3356658" cy="3844747"/>
+            </a:xfrm>
+          </p:grpSpPr>
+          <p:sp>
+            <p:nvSpPr>
+              <p:cNvPr id="180" name="직사각형 179">
+                <a:extLst>
+                  <a:ext uri="{FF2B5EF4-FFF2-40B4-BE49-F238E27FC236}">
+                    <a16:creationId xmlns:a16="http://schemas.microsoft.com/office/drawing/2014/main" id="{43733FDD-3A3B-478B-9838-25DC5783AED5}"/>
+                  </a:ext>
+                </a:extLst>
+              </p:cNvPr>
+              <p:cNvSpPr/>
+              <p:nvPr/>
+            </p:nvSpPr>
+            <p:spPr>
+              <a:xfrm>
+                <a:off x="416689" y="2638389"/>
+                <a:ext cx="3356658" cy="3463609"/>
+              </a:xfrm>
+              <a:prstGeom prst="rect">
+                <a:avLst/>
+              </a:prstGeom>
+            </p:spPr>
+            <p:style>
+              <a:lnRef idx="2">
+                <a:schemeClr val="accent5"/>
+              </a:lnRef>
+              <a:fillRef idx="1">
+                <a:schemeClr val="lt1"/>
+              </a:fillRef>
+              <a:effectRef idx="0">
+                <a:schemeClr val="accent5"/>
+              </a:effectRef>
+              <a:fontRef idx="minor">
+                <a:schemeClr val="dk1"/>
+              </a:fontRef>
+            </p:style>
+            <p:txBody>
+              <a:bodyPr rtlCol="0" anchor="ctr">
+                <a:spAutoFit/>
+              </a:bodyPr>
+              <a:lstStyle/>
+              <a:p>
+                <a:pPr algn="ctr"/>
+                <a:endParaRPr lang="ko-KR" altLang="en-US" dirty="0"/>
+              </a:p>
+            </p:txBody>
+          </p:sp>
+          <p:sp>
+            <p:nvSpPr>
+              <p:cNvPr id="181" name="TextBox 180">
+                <a:extLst>
+                  <a:ext uri="{FF2B5EF4-FFF2-40B4-BE49-F238E27FC236}">
+                    <a16:creationId xmlns:a16="http://schemas.microsoft.com/office/drawing/2014/main" id="{EF05D0BF-10E0-4968-A5C3-5188B626EC3A}"/>
+                  </a:ext>
+                </a:extLst>
+              </p:cNvPr>
+              <p:cNvSpPr txBox="1"/>
+              <p:nvPr/>
+            </p:nvSpPr>
+            <p:spPr>
+              <a:xfrm>
+                <a:off x="1178995" y="2257251"/>
+                <a:ext cx="1813253" cy="369332"/>
+              </a:xfrm>
+              <a:prstGeom prst="rect">
+                <a:avLst/>
+              </a:prstGeom>
+              <a:noFill/>
+            </p:spPr>
+            <p:txBody>
+              <a:bodyPr wrap="none" rtlCol="0">
+                <a:spAutoFit/>
+              </a:bodyPr>
+              <a:lstStyle/>
+              <a:p>
+                <a:r>
+                  <a:rPr lang="en-US" altLang="ko-KR" dirty="0" err="1"/>
+                  <a:t>databaseQueue</a:t>
+                </a:r>
+                <a:endParaRPr lang="ko-KR" altLang="en-US" dirty="0"/>
+              </a:p>
+            </p:txBody>
+          </p:sp>
+        </p:grpSp>
         <p:sp>
           <p:nvSpPr>
-            <p:cNvPr id="16" name="직사각형 15">
+            <p:cNvPr id="114" name="직사각형 113">
               <a:extLst>
                 <a:ext uri="{FF2B5EF4-FFF2-40B4-BE49-F238E27FC236}">
-                  <a16:creationId xmlns:a16="http://schemas.microsoft.com/office/drawing/2014/main" id="{3589F15A-BCC1-42A1-8240-BFEEEBBA608E}"/>
+                  <a16:creationId xmlns:a16="http://schemas.microsoft.com/office/drawing/2014/main" id="{71725750-D98D-4C93-BE95-CEAC793D47BA}"/>
                 </a:ext>
               </a:extLst>
             </p:cNvPr>
@@ -9001,8 +9008,8 @@
           </p:nvSpPr>
           <p:spPr>
             <a:xfrm>
-              <a:off x="4573926" y="1796098"/>
-              <a:ext cx="1944547" cy="1435261"/>
+              <a:off x="793697" y="3228489"/>
+              <a:ext cx="2534856" cy="2570921"/>
             </a:xfrm>
             <a:prstGeom prst="rect">
               <a:avLst/>
@@ -9035,10 +9042,10 @@
         </p:sp>
         <p:sp>
           <p:nvSpPr>
-            <p:cNvPr id="11" name="직사각형 10">
+            <p:cNvPr id="20" name="직사각형 19">
               <a:extLst>
                 <a:ext uri="{FF2B5EF4-FFF2-40B4-BE49-F238E27FC236}">
-                  <a16:creationId xmlns:a16="http://schemas.microsoft.com/office/drawing/2014/main" id="{965B9A4B-8EF7-482D-AC5F-4F1E78DB6F5B}"/>
+                  <a16:creationId xmlns:a16="http://schemas.microsoft.com/office/drawing/2014/main" id="{79FA3108-14E1-491A-BDA6-BB8D52081E82}"/>
                 </a:ext>
               </a:extLst>
             </p:cNvPr>
@@ -9047,8 +9054,8 @@
           </p:nvSpPr>
           <p:spPr>
             <a:xfrm>
-              <a:off x="4784201" y="2024263"/>
-              <a:ext cx="914400" cy="369332"/>
+              <a:off x="1754396" y="3043823"/>
+              <a:ext cx="659757" cy="369332"/>
             </a:xfrm>
             <a:prstGeom prst="rect">
               <a:avLst/>
@@ -9069,7 +9076,7 @@
             </a:fontRef>
           </p:style>
           <p:txBody>
-            <a:bodyPr rtlCol="0" anchor="ctr">
+            <a:bodyPr wrap="square" rtlCol="0" anchor="ctr">
               <a:spAutoFit/>
             </a:bodyPr>
             <a:lstStyle/>
@@ -9077,18 +9084,538 @@
               <a:pPr algn="ctr"/>
               <a:r>
                 <a:rPr lang="en-US" altLang="ko-KR" dirty="0"/>
-                <a:t>target</a:t>
+                <a:t>DB</a:t>
               </a:r>
               <a:endParaRPr lang="ko-KR" altLang="en-US" dirty="0"/>
             </a:p>
           </p:txBody>
         </p:sp>
+        <p:grpSp>
+          <p:nvGrpSpPr>
+            <p:cNvPr id="61" name="그룹 60">
+              <a:extLst>
+                <a:ext uri="{FF2B5EF4-FFF2-40B4-BE49-F238E27FC236}">
+                  <a16:creationId xmlns:a16="http://schemas.microsoft.com/office/drawing/2014/main" id="{4B5DB649-B2A5-4415-B7A2-B4DC250D009C}"/>
+                </a:ext>
+              </a:extLst>
+            </p:cNvPr>
+            <p:cNvGrpSpPr/>
+            <p:nvPr/>
+          </p:nvGrpSpPr>
+          <p:grpSpPr>
+            <a:xfrm>
+              <a:off x="1123575" y="4170420"/>
+              <a:ext cx="1944547" cy="1435261"/>
+              <a:chOff x="1655179" y="2937748"/>
+              <a:chExt cx="1944547" cy="1435261"/>
+            </a:xfrm>
+          </p:grpSpPr>
+          <p:sp>
+            <p:nvSpPr>
+              <p:cNvPr id="60" name="직사각형 59">
+                <a:extLst>
+                  <a:ext uri="{FF2B5EF4-FFF2-40B4-BE49-F238E27FC236}">
+                    <a16:creationId xmlns:a16="http://schemas.microsoft.com/office/drawing/2014/main" id="{597E4BF8-39A9-45EC-9B48-038F7F76BEAC}"/>
+                  </a:ext>
+                </a:extLst>
+              </p:cNvPr>
+              <p:cNvSpPr/>
+              <p:nvPr/>
+            </p:nvSpPr>
+            <p:spPr>
+              <a:xfrm>
+                <a:off x="1655179" y="2937748"/>
+                <a:ext cx="1944547" cy="1435261"/>
+              </a:xfrm>
+              <a:prstGeom prst="rect">
+                <a:avLst/>
+              </a:prstGeom>
+            </p:spPr>
+            <p:style>
+              <a:lnRef idx="2">
+                <a:schemeClr val="accent5"/>
+              </a:lnRef>
+              <a:fillRef idx="1">
+                <a:schemeClr val="lt1"/>
+              </a:fillRef>
+              <a:effectRef idx="0">
+                <a:schemeClr val="accent5"/>
+              </a:effectRef>
+              <a:fontRef idx="minor">
+                <a:schemeClr val="dk1"/>
+              </a:fontRef>
+            </p:style>
+            <p:txBody>
+              <a:bodyPr rtlCol="0" anchor="ctr">
+                <a:spAutoFit/>
+              </a:bodyPr>
+              <a:lstStyle/>
+              <a:p>
+                <a:pPr algn="ctr"/>
+                <a:endParaRPr lang="ko-KR" altLang="en-US" dirty="0"/>
+              </a:p>
+            </p:txBody>
+          </p:sp>
+          <p:sp>
+            <p:nvSpPr>
+              <p:cNvPr id="55" name="직사각형 54">
+                <a:extLst>
+                  <a:ext uri="{FF2B5EF4-FFF2-40B4-BE49-F238E27FC236}">
+                    <a16:creationId xmlns:a16="http://schemas.microsoft.com/office/drawing/2014/main" id="{8A272652-5480-41E9-A3C8-49759884E0EC}"/>
+                  </a:ext>
+                </a:extLst>
+              </p:cNvPr>
+              <p:cNvSpPr/>
+              <p:nvPr/>
+            </p:nvSpPr>
+            <p:spPr>
+              <a:xfrm>
+                <a:off x="1869311" y="3120435"/>
+                <a:ext cx="914400" cy="369332"/>
+              </a:xfrm>
+              <a:prstGeom prst="rect">
+                <a:avLst/>
+              </a:prstGeom>
+            </p:spPr>
+            <p:style>
+              <a:lnRef idx="2">
+                <a:schemeClr val="accent5"/>
+              </a:lnRef>
+              <a:fillRef idx="1">
+                <a:schemeClr val="lt1"/>
+              </a:fillRef>
+              <a:effectRef idx="0">
+                <a:schemeClr val="accent5"/>
+              </a:effectRef>
+              <a:fontRef idx="minor">
+                <a:schemeClr val="dk1"/>
+              </a:fontRef>
+            </p:style>
+            <p:txBody>
+              <a:bodyPr rtlCol="0" anchor="ctr">
+                <a:spAutoFit/>
+              </a:bodyPr>
+              <a:lstStyle/>
+              <a:p>
+                <a:pPr algn="ctr"/>
+                <a:r>
+                  <a:rPr lang="en-US" altLang="ko-KR" dirty="0"/>
+                  <a:t>book</a:t>
+                </a:r>
+                <a:endParaRPr lang="ko-KR" altLang="en-US" dirty="0"/>
+              </a:p>
+            </p:txBody>
+          </p:sp>
+          <p:sp>
+            <p:nvSpPr>
+              <p:cNvPr id="56" name="직사각형 55">
+                <a:extLst>
+                  <a:ext uri="{FF2B5EF4-FFF2-40B4-BE49-F238E27FC236}">
+                    <a16:creationId xmlns:a16="http://schemas.microsoft.com/office/drawing/2014/main" id="{93C4B91F-53ED-4506-B9F4-C2674592A4F4}"/>
+                  </a:ext>
+                </a:extLst>
+              </p:cNvPr>
+              <p:cNvSpPr/>
+              <p:nvPr/>
+            </p:nvSpPr>
+            <p:spPr>
+              <a:xfrm>
+                <a:off x="2021711" y="3272835"/>
+                <a:ext cx="914400" cy="369332"/>
+              </a:xfrm>
+              <a:prstGeom prst="rect">
+                <a:avLst/>
+              </a:prstGeom>
+            </p:spPr>
+            <p:style>
+              <a:lnRef idx="2">
+                <a:schemeClr val="accent5"/>
+              </a:lnRef>
+              <a:fillRef idx="1">
+                <a:schemeClr val="lt1"/>
+              </a:fillRef>
+              <a:effectRef idx="0">
+                <a:schemeClr val="accent5"/>
+              </a:effectRef>
+              <a:fontRef idx="minor">
+                <a:schemeClr val="dk1"/>
+              </a:fontRef>
+            </p:style>
+            <p:txBody>
+              <a:bodyPr rtlCol="0" anchor="ctr">
+                <a:spAutoFit/>
+              </a:bodyPr>
+              <a:lstStyle/>
+              <a:p>
+                <a:pPr algn="ctr"/>
+                <a:r>
+                  <a:rPr lang="en-US" altLang="ko-KR" dirty="0"/>
+                  <a:t>book</a:t>
+                </a:r>
+                <a:endParaRPr lang="ko-KR" altLang="en-US" dirty="0"/>
+              </a:p>
+            </p:txBody>
+          </p:sp>
+          <p:sp>
+            <p:nvSpPr>
+              <p:cNvPr id="57" name="직사각형 56">
+                <a:extLst>
+                  <a:ext uri="{FF2B5EF4-FFF2-40B4-BE49-F238E27FC236}">
+                    <a16:creationId xmlns:a16="http://schemas.microsoft.com/office/drawing/2014/main" id="{46E8CE0B-EED4-4A6D-B8ED-1670841EF432}"/>
+                  </a:ext>
+                </a:extLst>
+              </p:cNvPr>
+              <p:cNvSpPr/>
+              <p:nvPr/>
+            </p:nvSpPr>
+            <p:spPr>
+              <a:xfrm>
+                <a:off x="2174111" y="3425235"/>
+                <a:ext cx="914400" cy="369332"/>
+              </a:xfrm>
+              <a:prstGeom prst="rect">
+                <a:avLst/>
+              </a:prstGeom>
+            </p:spPr>
+            <p:style>
+              <a:lnRef idx="2">
+                <a:schemeClr val="accent5"/>
+              </a:lnRef>
+              <a:fillRef idx="1">
+                <a:schemeClr val="lt1"/>
+              </a:fillRef>
+              <a:effectRef idx="0">
+                <a:schemeClr val="accent5"/>
+              </a:effectRef>
+              <a:fontRef idx="minor">
+                <a:schemeClr val="dk1"/>
+              </a:fontRef>
+            </p:style>
+            <p:txBody>
+              <a:bodyPr rtlCol="0" anchor="ctr">
+                <a:spAutoFit/>
+              </a:bodyPr>
+              <a:lstStyle/>
+              <a:p>
+                <a:pPr algn="ctr"/>
+                <a:r>
+                  <a:rPr lang="en-US" altLang="ko-KR" dirty="0"/>
+                  <a:t>book</a:t>
+                </a:r>
+                <a:endParaRPr lang="ko-KR" altLang="en-US" dirty="0"/>
+              </a:p>
+            </p:txBody>
+          </p:sp>
+          <p:sp>
+            <p:nvSpPr>
+              <p:cNvPr id="58" name="직사각형 57">
+                <a:extLst>
+                  <a:ext uri="{FF2B5EF4-FFF2-40B4-BE49-F238E27FC236}">
+                    <a16:creationId xmlns:a16="http://schemas.microsoft.com/office/drawing/2014/main" id="{C5C70AAD-5077-49E9-A89C-B446C4DD3F62}"/>
+                  </a:ext>
+                </a:extLst>
+              </p:cNvPr>
+              <p:cNvSpPr/>
+              <p:nvPr/>
+            </p:nvSpPr>
+            <p:spPr>
+              <a:xfrm>
+                <a:off x="2326511" y="3577635"/>
+                <a:ext cx="914400" cy="369332"/>
+              </a:xfrm>
+              <a:prstGeom prst="rect">
+                <a:avLst/>
+              </a:prstGeom>
+            </p:spPr>
+            <p:style>
+              <a:lnRef idx="2">
+                <a:schemeClr val="accent5"/>
+              </a:lnRef>
+              <a:fillRef idx="1">
+                <a:schemeClr val="lt1"/>
+              </a:fillRef>
+              <a:effectRef idx="0">
+                <a:schemeClr val="accent5"/>
+              </a:effectRef>
+              <a:fontRef idx="minor">
+                <a:schemeClr val="dk1"/>
+              </a:fontRef>
+            </p:style>
+            <p:txBody>
+              <a:bodyPr rtlCol="0" anchor="ctr">
+                <a:spAutoFit/>
+              </a:bodyPr>
+              <a:lstStyle/>
+              <a:p>
+                <a:pPr algn="ctr"/>
+                <a:r>
+                  <a:rPr lang="en-US" altLang="ko-KR" dirty="0"/>
+                  <a:t>book</a:t>
+                </a:r>
+                <a:endParaRPr lang="ko-KR" altLang="en-US" dirty="0"/>
+              </a:p>
+            </p:txBody>
+          </p:sp>
+          <p:sp>
+            <p:nvSpPr>
+              <p:cNvPr id="59" name="직사각형 58">
+                <a:extLst>
+                  <a:ext uri="{FF2B5EF4-FFF2-40B4-BE49-F238E27FC236}">
+                    <a16:creationId xmlns:a16="http://schemas.microsoft.com/office/drawing/2014/main" id="{2857BF45-300F-49CB-A407-7BAED4CEF049}"/>
+                  </a:ext>
+                </a:extLst>
+              </p:cNvPr>
+              <p:cNvSpPr/>
+              <p:nvPr/>
+            </p:nvSpPr>
+            <p:spPr>
+              <a:xfrm>
+                <a:off x="2478911" y="3730035"/>
+                <a:ext cx="914400" cy="369332"/>
+              </a:xfrm>
+              <a:prstGeom prst="rect">
+                <a:avLst/>
+              </a:prstGeom>
+            </p:spPr>
+            <p:style>
+              <a:lnRef idx="2">
+                <a:schemeClr val="accent5"/>
+              </a:lnRef>
+              <a:fillRef idx="1">
+                <a:schemeClr val="lt1"/>
+              </a:fillRef>
+              <a:effectRef idx="0">
+                <a:schemeClr val="accent5"/>
+              </a:effectRef>
+              <a:fontRef idx="minor">
+                <a:schemeClr val="dk1"/>
+              </a:fontRef>
+            </p:style>
+            <p:txBody>
+              <a:bodyPr rtlCol="0" anchor="ctr">
+                <a:spAutoFit/>
+              </a:bodyPr>
+              <a:lstStyle/>
+              <a:p>
+                <a:pPr algn="ctr"/>
+                <a:r>
+                  <a:rPr lang="en-US" altLang="ko-KR" dirty="0"/>
+                  <a:t>book</a:t>
+                </a:r>
+                <a:endParaRPr lang="ko-KR" altLang="en-US" dirty="0"/>
+              </a:p>
+            </p:txBody>
+          </p:sp>
+        </p:grpSp>
+        <p:cxnSp>
+          <p:nvCxnSpPr>
+            <p:cNvPr id="63" name="직선 연결선 62">
+              <a:extLst>
+                <a:ext uri="{FF2B5EF4-FFF2-40B4-BE49-F238E27FC236}">
+                  <a16:creationId xmlns:a16="http://schemas.microsoft.com/office/drawing/2014/main" id="{B34CAE05-9AE6-41E6-92D5-EA9B3B2B7FA3}"/>
+                </a:ext>
+              </a:extLst>
+            </p:cNvPr>
+            <p:cNvCxnSpPr>
+              <a:stCxn id="20" idx="2"/>
+              <a:endCxn id="60" idx="0"/>
+            </p:cNvCxnSpPr>
+            <p:nvPr/>
+          </p:nvCxnSpPr>
+          <p:spPr>
+            <a:xfrm>
+              <a:off x="2084275" y="3413155"/>
+              <a:ext cx="11574" cy="757265"/>
+            </a:xfrm>
+            <a:prstGeom prst="line">
+              <a:avLst/>
+            </a:prstGeom>
+          </p:spPr>
+          <p:style>
+            <a:lnRef idx="1">
+              <a:schemeClr val="accent1"/>
+            </a:lnRef>
+            <a:fillRef idx="0">
+              <a:schemeClr val="accent1"/>
+            </a:fillRef>
+            <a:effectRef idx="0">
+              <a:schemeClr val="accent1"/>
+            </a:effectRef>
+            <a:fontRef idx="minor">
+              <a:schemeClr val="tx1"/>
+            </a:fontRef>
+          </p:style>
+        </p:cxnSp>
         <p:sp>
           <p:nvSpPr>
-            <p:cNvPr id="12" name="직사각형 11">
+            <p:cNvPr id="135" name="TextBox 134">
               <a:extLst>
                 <a:ext uri="{FF2B5EF4-FFF2-40B4-BE49-F238E27FC236}">
-                  <a16:creationId xmlns:a16="http://schemas.microsoft.com/office/drawing/2014/main" id="{EE582520-ACA6-44A3-8D79-804CA5BBCFF9}"/>
+                  <a16:creationId xmlns:a16="http://schemas.microsoft.com/office/drawing/2014/main" id="{4BC97766-A138-445C-8BCF-4275007881B5}"/>
+                </a:ext>
+              </a:extLst>
+            </p:cNvPr>
+            <p:cNvSpPr txBox="1"/>
+            <p:nvPr/>
+          </p:nvSpPr>
+          <p:spPr>
+            <a:xfrm>
+              <a:off x="939121" y="3911156"/>
+              <a:ext cx="2313454" cy="369332"/>
+            </a:xfrm>
+            <a:prstGeom prst="rect">
+              <a:avLst/>
+            </a:prstGeom>
+            <a:noFill/>
+          </p:spPr>
+          <p:txBody>
+            <a:bodyPr wrap="none" rtlCol="0">
+              <a:spAutoFit/>
+            </a:bodyPr>
+            <a:lstStyle/>
+            <a:p>
+              <a:r>
+                <a:rPr lang="en-US" altLang="ko-KR" dirty="0" err="1"/>
+                <a:t>metadataStatus</a:t>
+              </a:r>
+              <a:r>
+                <a:rPr lang="en-US" altLang="ko-KR" dirty="0"/>
+                <a:t>: null</a:t>
+              </a:r>
+              <a:endParaRPr lang="ko-KR" altLang="en-US" dirty="0"/>
+            </a:p>
+          </p:txBody>
+        </p:sp>
+      </p:grpSp>
+      <p:grpSp>
+        <p:nvGrpSpPr>
+          <p:cNvPr id="184" name="그룹 183">
+            <a:extLst>
+              <a:ext uri="{FF2B5EF4-FFF2-40B4-BE49-F238E27FC236}">
+                <a16:creationId xmlns:a16="http://schemas.microsoft.com/office/drawing/2014/main" id="{ADE459B5-7B66-435B-96CE-067AC725276D}"/>
+              </a:ext>
+            </a:extLst>
+          </p:cNvPr>
+          <p:cNvGrpSpPr/>
+          <p:nvPr/>
+        </p:nvGrpSpPr>
+        <p:grpSpPr>
+          <a:xfrm>
+            <a:off x="7444452" y="661477"/>
+            <a:ext cx="4509436" cy="3788368"/>
+            <a:chOff x="7444452" y="661477"/>
+            <a:chExt cx="4509436" cy="3788368"/>
+          </a:xfrm>
+        </p:grpSpPr>
+        <p:grpSp>
+          <p:nvGrpSpPr>
+            <p:cNvPr id="172" name="그룹 171">
+              <a:extLst>
+                <a:ext uri="{FF2B5EF4-FFF2-40B4-BE49-F238E27FC236}">
+                  <a16:creationId xmlns:a16="http://schemas.microsoft.com/office/drawing/2014/main" id="{FF67A921-1408-41A3-B4FB-A0F075E3B260}"/>
+                </a:ext>
+              </a:extLst>
+            </p:cNvPr>
+            <p:cNvGrpSpPr/>
+            <p:nvPr/>
+          </p:nvGrpSpPr>
+          <p:grpSpPr>
+            <a:xfrm>
+              <a:off x="7444452" y="661477"/>
+              <a:ext cx="4509436" cy="3788368"/>
+              <a:chOff x="6743443" y="416730"/>
+              <a:chExt cx="4509436" cy="3788368"/>
+            </a:xfrm>
+          </p:grpSpPr>
+          <p:sp>
+            <p:nvSpPr>
+              <p:cNvPr id="170" name="직사각형 169">
+                <a:extLst>
+                  <a:ext uri="{FF2B5EF4-FFF2-40B4-BE49-F238E27FC236}">
+                    <a16:creationId xmlns:a16="http://schemas.microsoft.com/office/drawing/2014/main" id="{2B4F45C2-3A09-4CB7-BE8F-92C77F548B20}"/>
+                  </a:ext>
+                </a:extLst>
+              </p:cNvPr>
+              <p:cNvSpPr/>
+              <p:nvPr/>
+            </p:nvSpPr>
+            <p:spPr>
+              <a:xfrm>
+                <a:off x="6743443" y="823867"/>
+                <a:ext cx="4509436" cy="3381231"/>
+              </a:xfrm>
+              <a:prstGeom prst="rect">
+                <a:avLst/>
+              </a:prstGeom>
+            </p:spPr>
+            <p:style>
+              <a:lnRef idx="2">
+                <a:schemeClr val="accent5"/>
+              </a:lnRef>
+              <a:fillRef idx="1">
+                <a:schemeClr val="lt1"/>
+              </a:fillRef>
+              <a:effectRef idx="0">
+                <a:schemeClr val="accent5"/>
+              </a:effectRef>
+              <a:fontRef idx="minor">
+                <a:schemeClr val="dk1"/>
+              </a:fontRef>
+            </p:style>
+            <p:txBody>
+              <a:bodyPr wrap="square" rtlCol="0" anchor="ctr">
+                <a:spAutoFit/>
+              </a:bodyPr>
+              <a:lstStyle/>
+              <a:p>
+                <a:pPr algn="ctr"/>
+                <a:endParaRPr lang="ko-KR" altLang="en-US" dirty="0"/>
+              </a:p>
+            </p:txBody>
+          </p:sp>
+          <p:sp>
+            <p:nvSpPr>
+              <p:cNvPr id="171" name="TextBox 170">
+                <a:extLst>
+                  <a:ext uri="{FF2B5EF4-FFF2-40B4-BE49-F238E27FC236}">
+                    <a16:creationId xmlns:a16="http://schemas.microsoft.com/office/drawing/2014/main" id="{0F366283-9B0D-4108-9CF5-23C5A7B7885C}"/>
+                  </a:ext>
+                </a:extLst>
+              </p:cNvPr>
+              <p:cNvSpPr txBox="1"/>
+              <p:nvPr/>
+            </p:nvSpPr>
+            <p:spPr>
+              <a:xfrm>
+                <a:off x="8329547" y="416730"/>
+                <a:ext cx="1337226" cy="369332"/>
+              </a:xfrm>
+              <a:prstGeom prst="rect">
+                <a:avLst/>
+              </a:prstGeom>
+              <a:noFill/>
+            </p:spPr>
+            <p:txBody>
+              <a:bodyPr wrap="none" rtlCol="0">
+                <a:spAutoFit/>
+              </a:bodyPr>
+              <a:lstStyle/>
+              <a:p>
+                <a:r>
+                  <a:rPr lang="en-US" altLang="ko-KR" dirty="0" err="1"/>
+                  <a:t>scanQueue</a:t>
+                </a:r>
+                <a:endParaRPr lang="ko-KR" altLang="en-US" dirty="0"/>
+              </a:p>
+            </p:txBody>
+          </p:sp>
+        </p:grpSp>
+        <p:sp>
+          <p:nvSpPr>
+            <p:cNvPr id="5" name="직사각형 4">
+              <a:extLst>
+                <a:ext uri="{FF2B5EF4-FFF2-40B4-BE49-F238E27FC236}">
+                  <a16:creationId xmlns:a16="http://schemas.microsoft.com/office/drawing/2014/main" id="{006BBC62-13D3-446C-8A8B-D4341B391813}"/>
                 </a:ext>
               </a:extLst>
             </p:cNvPr>
@@ -9097,8 +9624,8 @@
           </p:nvSpPr>
           <p:spPr>
             <a:xfrm>
-              <a:off x="4936601" y="2176663"/>
-              <a:ext cx="914400" cy="369332"/>
+              <a:off x="9007492" y="2080157"/>
+              <a:ext cx="1377387" cy="369332"/>
             </a:xfrm>
             <a:prstGeom prst="rect">
               <a:avLst/>
@@ -9119,7 +9646,7 @@
             </a:fontRef>
           </p:style>
           <p:txBody>
-            <a:bodyPr rtlCol="0" anchor="ctr">
+            <a:bodyPr wrap="square" rtlCol="0" anchor="ctr">
               <a:spAutoFit/>
             </a:bodyPr>
             <a:lstStyle/>
@@ -9127,18 +9654,556 @@
               <a:pPr algn="ctr"/>
               <a:r>
                 <a:rPr lang="en-US" altLang="ko-KR" dirty="0"/>
-                <a:t>target</a:t>
+                <a:t>Scanner</a:t>
               </a:r>
               <a:endParaRPr lang="ko-KR" altLang="en-US" dirty="0"/>
             </a:p>
           </p:txBody>
         </p:sp>
+        <p:grpSp>
+          <p:nvGrpSpPr>
+            <p:cNvPr id="17" name="그룹 16">
+              <a:extLst>
+                <a:ext uri="{FF2B5EF4-FFF2-40B4-BE49-F238E27FC236}">
+                  <a16:creationId xmlns:a16="http://schemas.microsoft.com/office/drawing/2014/main" id="{8A528157-9719-4521-84F2-0D2E784E15B0}"/>
+                </a:ext>
+              </a:extLst>
+            </p:cNvPr>
+            <p:cNvGrpSpPr/>
+            <p:nvPr/>
+          </p:nvGrpSpPr>
+          <p:grpSpPr>
+            <a:xfrm>
+              <a:off x="8723914" y="2699082"/>
+              <a:ext cx="1944547" cy="1435261"/>
+              <a:chOff x="4866961" y="1774538"/>
+              <a:chExt cx="1944547" cy="1435261"/>
+            </a:xfrm>
+          </p:grpSpPr>
+          <p:sp>
+            <p:nvSpPr>
+              <p:cNvPr id="16" name="직사각형 15">
+                <a:extLst>
+                  <a:ext uri="{FF2B5EF4-FFF2-40B4-BE49-F238E27FC236}">
+                    <a16:creationId xmlns:a16="http://schemas.microsoft.com/office/drawing/2014/main" id="{3589F15A-BCC1-42A1-8240-BFEEEBBA608E}"/>
+                  </a:ext>
+                </a:extLst>
+              </p:cNvPr>
+              <p:cNvSpPr/>
+              <p:nvPr/>
+            </p:nvSpPr>
+            <p:spPr>
+              <a:xfrm>
+                <a:off x="4866961" y="1774538"/>
+                <a:ext cx="1944547" cy="1435261"/>
+              </a:xfrm>
+              <a:prstGeom prst="rect">
+                <a:avLst/>
+              </a:prstGeom>
+            </p:spPr>
+            <p:style>
+              <a:lnRef idx="2">
+                <a:schemeClr val="accent5"/>
+              </a:lnRef>
+              <a:fillRef idx="1">
+                <a:schemeClr val="lt1"/>
+              </a:fillRef>
+              <a:effectRef idx="0">
+                <a:schemeClr val="accent5"/>
+              </a:effectRef>
+              <a:fontRef idx="minor">
+                <a:schemeClr val="dk1"/>
+              </a:fontRef>
+            </p:style>
+            <p:txBody>
+              <a:bodyPr rtlCol="0" anchor="ctr">
+                <a:spAutoFit/>
+              </a:bodyPr>
+              <a:lstStyle/>
+              <a:p>
+                <a:pPr algn="ctr"/>
+                <a:endParaRPr lang="ko-KR" altLang="en-US" dirty="0"/>
+              </a:p>
+            </p:txBody>
+          </p:sp>
+          <p:sp>
+            <p:nvSpPr>
+              <p:cNvPr id="11" name="직사각형 10">
+                <a:extLst>
+                  <a:ext uri="{FF2B5EF4-FFF2-40B4-BE49-F238E27FC236}">
+                    <a16:creationId xmlns:a16="http://schemas.microsoft.com/office/drawing/2014/main" id="{965B9A4B-8EF7-482D-AC5F-4F1E78DB6F5B}"/>
+                  </a:ext>
+                </a:extLst>
+              </p:cNvPr>
+              <p:cNvSpPr/>
+              <p:nvPr/>
+            </p:nvSpPr>
+            <p:spPr>
+              <a:xfrm>
+                <a:off x="5162114" y="2002702"/>
+                <a:ext cx="914400" cy="369332"/>
+              </a:xfrm>
+              <a:prstGeom prst="rect">
+                <a:avLst/>
+              </a:prstGeom>
+            </p:spPr>
+            <p:style>
+              <a:lnRef idx="2">
+                <a:schemeClr val="accent5"/>
+              </a:lnRef>
+              <a:fillRef idx="1">
+                <a:schemeClr val="lt1"/>
+              </a:fillRef>
+              <a:effectRef idx="0">
+                <a:schemeClr val="accent5"/>
+              </a:effectRef>
+              <a:fontRef idx="minor">
+                <a:schemeClr val="dk1"/>
+              </a:fontRef>
+            </p:style>
+            <p:txBody>
+              <a:bodyPr rtlCol="0" anchor="ctr">
+                <a:spAutoFit/>
+              </a:bodyPr>
+              <a:lstStyle/>
+              <a:p>
+                <a:pPr algn="ctr"/>
+                <a:r>
+                  <a:rPr lang="en-US" altLang="ko-KR" dirty="0"/>
+                  <a:t>book</a:t>
+                </a:r>
+                <a:endParaRPr lang="ko-KR" altLang="en-US" dirty="0"/>
+              </a:p>
+            </p:txBody>
+          </p:sp>
+          <p:sp>
+            <p:nvSpPr>
+              <p:cNvPr id="12" name="직사각형 11">
+                <a:extLst>
+                  <a:ext uri="{FF2B5EF4-FFF2-40B4-BE49-F238E27FC236}">
+                    <a16:creationId xmlns:a16="http://schemas.microsoft.com/office/drawing/2014/main" id="{EE582520-ACA6-44A3-8D79-804CA5BBCFF9}"/>
+                  </a:ext>
+                </a:extLst>
+              </p:cNvPr>
+              <p:cNvSpPr/>
+              <p:nvPr/>
+            </p:nvSpPr>
+            <p:spPr>
+              <a:xfrm>
+                <a:off x="5314514" y="2155102"/>
+                <a:ext cx="914400" cy="369332"/>
+              </a:xfrm>
+              <a:prstGeom prst="rect">
+                <a:avLst/>
+              </a:prstGeom>
+            </p:spPr>
+            <p:style>
+              <a:lnRef idx="2">
+                <a:schemeClr val="accent5"/>
+              </a:lnRef>
+              <a:fillRef idx="1">
+                <a:schemeClr val="lt1"/>
+              </a:fillRef>
+              <a:effectRef idx="0">
+                <a:schemeClr val="accent5"/>
+              </a:effectRef>
+              <a:fontRef idx="minor">
+                <a:schemeClr val="dk1"/>
+              </a:fontRef>
+            </p:style>
+            <p:txBody>
+              <a:bodyPr rtlCol="0" anchor="ctr">
+                <a:spAutoFit/>
+              </a:bodyPr>
+              <a:lstStyle/>
+              <a:p>
+                <a:pPr algn="ctr"/>
+                <a:r>
+                  <a:rPr lang="en-US" altLang="ko-KR" dirty="0"/>
+                  <a:t>book</a:t>
+                </a:r>
+                <a:endParaRPr lang="ko-KR" altLang="en-US" dirty="0"/>
+              </a:p>
+            </p:txBody>
+          </p:sp>
+          <p:sp>
+            <p:nvSpPr>
+              <p:cNvPr id="13" name="직사각형 12">
+                <a:extLst>
+                  <a:ext uri="{FF2B5EF4-FFF2-40B4-BE49-F238E27FC236}">
+                    <a16:creationId xmlns:a16="http://schemas.microsoft.com/office/drawing/2014/main" id="{25CAE2C5-A5DC-46D5-A304-CA0DEB37C83C}"/>
+                  </a:ext>
+                </a:extLst>
+              </p:cNvPr>
+              <p:cNvSpPr/>
+              <p:nvPr/>
+            </p:nvSpPr>
+            <p:spPr>
+              <a:xfrm>
+                <a:off x="5466914" y="2307502"/>
+                <a:ext cx="914400" cy="369332"/>
+              </a:xfrm>
+              <a:prstGeom prst="rect">
+                <a:avLst/>
+              </a:prstGeom>
+            </p:spPr>
+            <p:style>
+              <a:lnRef idx="2">
+                <a:schemeClr val="accent5"/>
+              </a:lnRef>
+              <a:fillRef idx="1">
+                <a:schemeClr val="lt1"/>
+              </a:fillRef>
+              <a:effectRef idx="0">
+                <a:schemeClr val="accent5"/>
+              </a:effectRef>
+              <a:fontRef idx="minor">
+                <a:schemeClr val="dk1"/>
+              </a:fontRef>
+            </p:style>
+            <p:txBody>
+              <a:bodyPr rtlCol="0" anchor="ctr">
+                <a:spAutoFit/>
+              </a:bodyPr>
+              <a:lstStyle/>
+              <a:p>
+                <a:pPr algn="ctr"/>
+                <a:r>
+                  <a:rPr lang="en-US" altLang="ko-KR" dirty="0"/>
+                  <a:t>book</a:t>
+                </a:r>
+                <a:endParaRPr lang="ko-KR" altLang="en-US" dirty="0"/>
+              </a:p>
+            </p:txBody>
+          </p:sp>
+          <p:sp>
+            <p:nvSpPr>
+              <p:cNvPr id="14" name="직사각형 13">
+                <a:extLst>
+                  <a:ext uri="{FF2B5EF4-FFF2-40B4-BE49-F238E27FC236}">
+                    <a16:creationId xmlns:a16="http://schemas.microsoft.com/office/drawing/2014/main" id="{0C08E45A-F43A-4A8E-9901-24325ECC2039}"/>
+                  </a:ext>
+                </a:extLst>
+              </p:cNvPr>
+              <p:cNvSpPr/>
+              <p:nvPr/>
+            </p:nvSpPr>
+            <p:spPr>
+              <a:xfrm>
+                <a:off x="5619314" y="2459902"/>
+                <a:ext cx="914400" cy="369332"/>
+              </a:xfrm>
+              <a:prstGeom prst="rect">
+                <a:avLst/>
+              </a:prstGeom>
+            </p:spPr>
+            <p:style>
+              <a:lnRef idx="2">
+                <a:schemeClr val="accent5"/>
+              </a:lnRef>
+              <a:fillRef idx="1">
+                <a:schemeClr val="lt1"/>
+              </a:fillRef>
+              <a:effectRef idx="0">
+                <a:schemeClr val="accent5"/>
+              </a:effectRef>
+              <a:fontRef idx="minor">
+                <a:schemeClr val="dk1"/>
+              </a:fontRef>
+            </p:style>
+            <p:txBody>
+              <a:bodyPr rtlCol="0" anchor="ctr">
+                <a:spAutoFit/>
+              </a:bodyPr>
+              <a:lstStyle/>
+              <a:p>
+                <a:pPr algn="ctr"/>
+                <a:r>
+                  <a:rPr lang="en-US" altLang="ko-KR" dirty="0"/>
+                  <a:t>book</a:t>
+                </a:r>
+                <a:endParaRPr lang="ko-KR" altLang="en-US" dirty="0"/>
+              </a:p>
+            </p:txBody>
+          </p:sp>
+          <p:sp>
+            <p:nvSpPr>
+              <p:cNvPr id="15" name="직사각형 14">
+                <a:extLst>
+                  <a:ext uri="{FF2B5EF4-FFF2-40B4-BE49-F238E27FC236}">
+                    <a16:creationId xmlns:a16="http://schemas.microsoft.com/office/drawing/2014/main" id="{D0C10869-F181-4FC1-B902-981E5B6738D6}"/>
+                  </a:ext>
+                </a:extLst>
+              </p:cNvPr>
+              <p:cNvSpPr/>
+              <p:nvPr/>
+            </p:nvSpPr>
+            <p:spPr>
+              <a:xfrm>
+                <a:off x="5771714" y="2612302"/>
+                <a:ext cx="914400" cy="369332"/>
+              </a:xfrm>
+              <a:prstGeom prst="rect">
+                <a:avLst/>
+              </a:prstGeom>
+            </p:spPr>
+            <p:style>
+              <a:lnRef idx="2">
+                <a:schemeClr val="accent5"/>
+              </a:lnRef>
+              <a:fillRef idx="1">
+                <a:schemeClr val="lt1"/>
+              </a:fillRef>
+              <a:effectRef idx="0">
+                <a:schemeClr val="accent5"/>
+              </a:effectRef>
+              <a:fontRef idx="minor">
+                <a:schemeClr val="dk1"/>
+              </a:fontRef>
+            </p:style>
+            <p:txBody>
+              <a:bodyPr rtlCol="0" anchor="ctr">
+                <a:spAutoFit/>
+              </a:bodyPr>
+              <a:lstStyle/>
+              <a:p>
+                <a:pPr algn="ctr"/>
+                <a:r>
+                  <a:rPr lang="en-US" altLang="ko-KR" dirty="0"/>
+                  <a:t>book</a:t>
+                </a:r>
+                <a:endParaRPr lang="ko-KR" altLang="en-US" dirty="0"/>
+              </a:p>
+            </p:txBody>
+          </p:sp>
+        </p:grpSp>
+        <p:cxnSp>
+          <p:nvCxnSpPr>
+            <p:cNvPr id="19" name="직선 화살표 연결선 18">
+              <a:extLst>
+                <a:ext uri="{FF2B5EF4-FFF2-40B4-BE49-F238E27FC236}">
+                  <a16:creationId xmlns:a16="http://schemas.microsoft.com/office/drawing/2014/main" id="{A1E02E12-79A5-446B-A1BE-08B345CB5038}"/>
+                </a:ext>
+              </a:extLst>
+            </p:cNvPr>
+            <p:cNvCxnSpPr>
+              <a:stCxn id="5" idx="2"/>
+              <a:endCxn id="16" idx="0"/>
+            </p:cNvCxnSpPr>
+            <p:nvPr/>
+          </p:nvCxnSpPr>
+          <p:spPr>
+            <a:xfrm>
+              <a:off x="9696186" y="2449489"/>
+              <a:ext cx="2" cy="249593"/>
+            </a:xfrm>
+            <a:prstGeom prst="straightConnector1">
+              <a:avLst/>
+            </a:prstGeom>
+            <a:ln>
+              <a:tailEnd type="triangle"/>
+            </a:ln>
+          </p:spPr>
+          <p:style>
+            <a:lnRef idx="1">
+              <a:schemeClr val="accent1"/>
+            </a:lnRef>
+            <a:fillRef idx="0">
+              <a:schemeClr val="accent1"/>
+            </a:fillRef>
+            <a:effectRef idx="0">
+              <a:schemeClr val="accent1"/>
+            </a:effectRef>
+            <a:fontRef idx="minor">
+              <a:schemeClr val="tx1"/>
+            </a:fontRef>
+          </p:style>
+        </p:cxnSp>
         <p:sp>
           <p:nvSpPr>
-            <p:cNvPr id="13" name="직사각형 12">
+            <p:cNvPr id="142" name="TextBox 141">
               <a:extLst>
                 <a:ext uri="{FF2B5EF4-FFF2-40B4-BE49-F238E27FC236}">
-                  <a16:creationId xmlns:a16="http://schemas.microsoft.com/office/drawing/2014/main" id="{25CAE2C5-A5DC-46D5-A304-CA0DEB37C83C}"/>
+                  <a16:creationId xmlns:a16="http://schemas.microsoft.com/office/drawing/2014/main" id="{08E05330-C6CB-4702-998F-B07FAA345521}"/>
+                </a:ext>
+              </a:extLst>
+            </p:cNvPr>
+            <p:cNvSpPr txBox="1"/>
+            <p:nvPr/>
+          </p:nvSpPr>
+          <p:spPr>
+            <a:xfrm>
+              <a:off x="7818403" y="1203408"/>
+              <a:ext cx="3872086" cy="646331"/>
+            </a:xfrm>
+            <a:prstGeom prst="rect">
+              <a:avLst/>
+            </a:prstGeom>
+            <a:noFill/>
+          </p:spPr>
+          <p:txBody>
+            <a:bodyPr wrap="none" rtlCol="0">
+              <a:spAutoFit/>
+            </a:bodyPr>
+            <a:lstStyle/>
+            <a:p>
+              <a:r>
+                <a:rPr lang="en-US" altLang="ko-KR" dirty="0"/>
+                <a:t>Params </a:t>
+              </a:r>
+              <a:r>
+                <a:rPr lang="en-US" altLang="ko-KR" dirty="0" err="1"/>
+                <a:t>path.string</a:t>
+              </a:r>
+              <a:r>
+                <a:rPr lang="en-US" altLang="ko-KR" dirty="0"/>
+                <a:t>, </a:t>
+              </a:r>
+              <a:r>
+                <a:rPr lang="en-US" altLang="ko-KR" dirty="0" err="1"/>
+                <a:t>scannerName</a:t>
+              </a:r>
+              <a:endParaRPr lang="en-US" altLang="ko-KR" dirty="0"/>
+            </a:p>
+            <a:p>
+              <a:r>
+                <a:rPr lang="en-US" altLang="ko-KR" dirty="0"/>
+                <a:t>Return books[{path, type, time}, …]</a:t>
+              </a:r>
+              <a:endParaRPr lang="ko-KR" altLang="en-US" dirty="0"/>
+            </a:p>
+          </p:txBody>
+        </p:sp>
+      </p:grpSp>
+      <p:grpSp>
+        <p:nvGrpSpPr>
+          <p:cNvPr id="191" name="그룹 190">
+            <a:extLst>
+              <a:ext uri="{FF2B5EF4-FFF2-40B4-BE49-F238E27FC236}">
+                <a16:creationId xmlns:a16="http://schemas.microsoft.com/office/drawing/2014/main" id="{7604B07D-929A-491B-A6E9-ABE4C877B64E}"/>
+              </a:ext>
+            </a:extLst>
+          </p:cNvPr>
+          <p:cNvGrpSpPr/>
+          <p:nvPr/>
+        </p:nvGrpSpPr>
+        <p:grpSpPr>
+          <a:xfrm>
+            <a:off x="331481" y="4513702"/>
+            <a:ext cx="2215276" cy="1948685"/>
+            <a:chOff x="6481823" y="4637310"/>
+            <a:chExt cx="2215276" cy="1948685"/>
+          </a:xfrm>
+        </p:grpSpPr>
+        <p:grpSp>
+          <p:nvGrpSpPr>
+            <p:cNvPr id="190" name="그룹 189">
+              <a:extLst>
+                <a:ext uri="{FF2B5EF4-FFF2-40B4-BE49-F238E27FC236}">
+                  <a16:creationId xmlns:a16="http://schemas.microsoft.com/office/drawing/2014/main" id="{72A035C8-3927-4AA4-BEA5-97C7C2004374}"/>
+                </a:ext>
+              </a:extLst>
+            </p:cNvPr>
+            <p:cNvGrpSpPr/>
+            <p:nvPr/>
+          </p:nvGrpSpPr>
+          <p:grpSpPr>
+            <a:xfrm>
+              <a:off x="6481823" y="4637310"/>
+              <a:ext cx="2215276" cy="1948685"/>
+              <a:chOff x="6481823" y="4637310"/>
+              <a:chExt cx="2215276" cy="1948685"/>
+            </a:xfrm>
+          </p:grpSpPr>
+          <p:sp>
+            <p:nvSpPr>
+              <p:cNvPr id="188" name="직사각형 187">
+                <a:extLst>
+                  <a:ext uri="{FF2B5EF4-FFF2-40B4-BE49-F238E27FC236}">
+                    <a16:creationId xmlns:a16="http://schemas.microsoft.com/office/drawing/2014/main" id="{E5D4C146-1ED5-4757-A9AC-6D13CE325C43}"/>
+                  </a:ext>
+                </a:extLst>
+              </p:cNvPr>
+              <p:cNvSpPr/>
+              <p:nvPr/>
+            </p:nvSpPr>
+            <p:spPr>
+              <a:xfrm>
+                <a:off x="6481823" y="4980354"/>
+                <a:ext cx="2215276" cy="1605641"/>
+              </a:xfrm>
+              <a:prstGeom prst="rect">
+                <a:avLst/>
+              </a:prstGeom>
+            </p:spPr>
+            <p:style>
+              <a:lnRef idx="2">
+                <a:schemeClr val="accent5"/>
+              </a:lnRef>
+              <a:fillRef idx="1">
+                <a:schemeClr val="lt1"/>
+              </a:fillRef>
+              <a:effectRef idx="0">
+                <a:schemeClr val="accent5"/>
+              </a:effectRef>
+              <a:fontRef idx="minor">
+                <a:schemeClr val="dk1"/>
+              </a:fontRef>
+            </p:style>
+            <p:txBody>
+              <a:bodyPr rtlCol="0" anchor="ctr">
+                <a:spAutoFit/>
+              </a:bodyPr>
+              <a:lstStyle/>
+              <a:p>
+                <a:pPr algn="ctr"/>
+                <a:endParaRPr lang="ko-KR" altLang="en-US" dirty="0"/>
+              </a:p>
+            </p:txBody>
+          </p:sp>
+          <p:sp>
+            <p:nvSpPr>
+              <p:cNvPr id="189" name="TextBox 188">
+                <a:extLst>
+                  <a:ext uri="{FF2B5EF4-FFF2-40B4-BE49-F238E27FC236}">
+                    <a16:creationId xmlns:a16="http://schemas.microsoft.com/office/drawing/2014/main" id="{90DC689B-F814-4A7F-9418-7AD41C2C69A1}"/>
+                  </a:ext>
+                </a:extLst>
+              </p:cNvPr>
+              <p:cNvSpPr txBox="1"/>
+              <p:nvPr/>
+            </p:nvSpPr>
+            <p:spPr>
+              <a:xfrm>
+                <a:off x="6959001" y="4637310"/>
+                <a:ext cx="1471878" cy="369332"/>
+              </a:xfrm>
+              <a:prstGeom prst="rect">
+                <a:avLst/>
+              </a:prstGeom>
+              <a:noFill/>
+            </p:spPr>
+            <p:txBody>
+              <a:bodyPr wrap="none" rtlCol="0">
+                <a:spAutoFit/>
+              </a:bodyPr>
+              <a:lstStyle/>
+              <a:p>
+                <a:r>
+                  <a:rPr lang="en-US" altLang="ko-KR" dirty="0" err="1"/>
+                  <a:t>agentQueue</a:t>
+                </a:r>
+                <a:endParaRPr lang="ko-KR" altLang="en-US" dirty="0"/>
+              </a:p>
+            </p:txBody>
+          </p:sp>
+        </p:grpSp>
+        <p:sp>
+          <p:nvSpPr>
+            <p:cNvPr id="68" name="직사각형 67">
+              <a:extLst>
+                <a:ext uri="{FF2B5EF4-FFF2-40B4-BE49-F238E27FC236}">
+                  <a16:creationId xmlns:a16="http://schemas.microsoft.com/office/drawing/2014/main" id="{4D5107D5-7433-4C26-AFA2-728C00F4A8A0}"/>
                 </a:ext>
               </a:extLst>
             </p:cNvPr>
@@ -9147,8 +10212,8 @@
           </p:nvSpPr>
           <p:spPr>
             <a:xfrm>
-              <a:off x="5089001" y="2329063"/>
-              <a:ext cx="914400" cy="369332"/>
+              <a:off x="6915038" y="5281554"/>
+              <a:ext cx="1375459" cy="369332"/>
             </a:xfrm>
             <a:prstGeom prst="rect">
               <a:avLst/>
@@ -9169,7 +10234,7 @@
             </a:fontRef>
           </p:style>
           <p:txBody>
-            <a:bodyPr rtlCol="0" anchor="ctr">
+            <a:bodyPr wrap="square" rtlCol="0" anchor="ctr">
               <a:spAutoFit/>
             </a:bodyPr>
             <a:lstStyle/>
@@ -9177,7 +10242,7 @@
               <a:pPr algn="ctr"/>
               <a:r>
                 <a:rPr lang="en-US" altLang="ko-KR" dirty="0"/>
-                <a:t>target</a:t>
+                <a:t>Agent</a:t>
               </a:r>
               <a:endParaRPr lang="ko-KR" altLang="en-US" dirty="0"/>
             </a:p>
@@ -9185,126 +10250,118 @@
         </p:sp>
         <p:sp>
           <p:nvSpPr>
-            <p:cNvPr id="14" name="직사각형 13">
+            <p:cNvPr id="143" name="TextBox 142">
               <a:extLst>
                 <a:ext uri="{FF2B5EF4-FFF2-40B4-BE49-F238E27FC236}">
-                  <a16:creationId xmlns:a16="http://schemas.microsoft.com/office/drawing/2014/main" id="{0C08E45A-F43A-4A8E-9901-24325ECC2039}"/>
+                  <a16:creationId xmlns:a16="http://schemas.microsoft.com/office/drawing/2014/main" id="{B35541F3-C502-48EB-9E9F-A70A26CDAF14}"/>
                 </a:ext>
               </a:extLst>
             </p:cNvPr>
-            <p:cNvSpPr/>
+            <p:cNvSpPr txBox="1"/>
             <p:nvPr/>
           </p:nvSpPr>
           <p:spPr>
             <a:xfrm>
-              <a:off x="5241401" y="2481463"/>
-              <a:ext cx="914400" cy="369332"/>
+              <a:off x="6849623" y="5776624"/>
+              <a:ext cx="1516762" cy="646331"/>
             </a:xfrm>
             <a:prstGeom prst="rect">
               <a:avLst/>
             </a:prstGeom>
+            <a:noFill/>
           </p:spPr>
-          <p:style>
-            <a:lnRef idx="2">
-              <a:schemeClr val="accent5"/>
-            </a:lnRef>
-            <a:fillRef idx="1">
-              <a:schemeClr val="lt1"/>
-            </a:fillRef>
-            <a:effectRef idx="0">
-              <a:schemeClr val="accent5"/>
-            </a:effectRef>
-            <a:fontRef idx="minor">
-              <a:schemeClr val="dk1"/>
-            </a:fontRef>
-          </p:style>
           <p:txBody>
-            <a:bodyPr rtlCol="0" anchor="ctr">
+            <a:bodyPr wrap="none" rtlCol="0">
               <a:spAutoFit/>
             </a:bodyPr>
             <a:lstStyle/>
             <a:p>
-              <a:pPr algn="ctr"/>
               <a:r>
                 <a:rPr lang="en-US" altLang="ko-KR" dirty="0"/>
-                <a:t>target</a:t>
+                <a:t>Params title?</a:t>
               </a:r>
-              <a:endParaRPr lang="ko-KR" altLang="en-US" dirty="0"/>
             </a:p>
-          </p:txBody>
-        </p:sp>
-        <p:sp>
-          <p:nvSpPr>
-            <p:cNvPr id="15" name="직사각형 14">
-              <a:extLst>
-                <a:ext uri="{FF2B5EF4-FFF2-40B4-BE49-F238E27FC236}">
-                  <a16:creationId xmlns:a16="http://schemas.microsoft.com/office/drawing/2014/main" id="{D0C10869-F181-4FC1-B902-981E5B6738D6}"/>
-                </a:ext>
-              </a:extLst>
-            </p:cNvPr>
-            <p:cNvSpPr/>
-            <p:nvPr/>
-          </p:nvSpPr>
-          <p:spPr>
-            <a:xfrm>
-              <a:off x="5393801" y="2633863"/>
-              <a:ext cx="914400" cy="369332"/>
-            </a:xfrm>
-            <a:prstGeom prst="rect">
-              <a:avLst/>
-            </a:prstGeom>
-          </p:spPr>
-          <p:style>
-            <a:lnRef idx="2">
-              <a:schemeClr val="accent5"/>
-            </a:lnRef>
-            <a:fillRef idx="1">
-              <a:schemeClr val="lt1"/>
-            </a:fillRef>
-            <a:effectRef idx="0">
-              <a:schemeClr val="accent5"/>
-            </a:effectRef>
-            <a:fontRef idx="minor">
-              <a:schemeClr val="dk1"/>
-            </a:fontRef>
-          </p:style>
-          <p:txBody>
-            <a:bodyPr rtlCol="0" anchor="ctr">
-              <a:spAutoFit/>
-            </a:bodyPr>
-            <a:lstStyle/>
             <a:p>
-              <a:pPr algn="ctr"/>
               <a:r>
                 <a:rPr lang="en-US" altLang="ko-KR" dirty="0"/>
-                <a:t>target</a:t>
+                <a:t>Return info{}</a:t>
               </a:r>
               <a:endParaRPr lang="ko-KR" altLang="en-US" dirty="0"/>
             </a:p>
           </p:txBody>
         </p:sp>
       </p:grpSp>
+      <p:sp>
+        <p:nvSpPr>
+          <p:cNvPr id="160" name="구름 159">
+            <a:extLst>
+              <a:ext uri="{FF2B5EF4-FFF2-40B4-BE49-F238E27FC236}">
+                <a16:creationId xmlns:a16="http://schemas.microsoft.com/office/drawing/2014/main" id="{23C44420-2FF6-4009-8A5C-B8203CAF5B15}"/>
+              </a:ext>
+            </a:extLst>
+          </p:cNvPr>
+          <p:cNvSpPr/>
+          <p:nvPr/>
+        </p:nvSpPr>
+        <p:spPr>
+          <a:xfrm>
+            <a:off x="2099707" y="151729"/>
+            <a:ext cx="914400" cy="562213"/>
+          </a:xfrm>
+          <a:prstGeom prst="cloud">
+            <a:avLst/>
+          </a:prstGeom>
+        </p:spPr>
+        <p:style>
+          <a:lnRef idx="2">
+            <a:schemeClr val="accent5"/>
+          </a:lnRef>
+          <a:fillRef idx="1">
+            <a:schemeClr val="lt1"/>
+          </a:fillRef>
+          <a:effectRef idx="0">
+            <a:schemeClr val="accent5"/>
+          </a:effectRef>
+          <a:fontRef idx="minor">
+            <a:schemeClr val="dk1"/>
+          </a:fontRef>
+        </p:style>
+        <p:txBody>
+          <a:bodyPr rtlCol="0" anchor="ctr">
+            <a:spAutoFit/>
+          </a:bodyPr>
+          <a:lstStyle/>
+          <a:p>
+            <a:pPr algn="ctr"/>
+            <a:r>
+              <a:rPr lang="en-US" altLang="ko-KR" dirty="0"/>
+              <a:t>API</a:t>
+            </a:r>
+            <a:endParaRPr lang="ko-KR" altLang="en-US" dirty="0"/>
+          </a:p>
+        </p:txBody>
+      </p:sp>
       <p:cxnSp>
         <p:nvCxnSpPr>
-          <p:cNvPr id="19" name="직선 화살표 연결선 18">
-            <a:extLst>
-              <a:ext uri="{FF2B5EF4-FFF2-40B4-BE49-F238E27FC236}">
-                <a16:creationId xmlns:a16="http://schemas.microsoft.com/office/drawing/2014/main" id="{A1E02E12-79A5-446B-A1BE-08B345CB5038}"/>
+          <p:cNvPr id="174" name="연결선: 꺾임 173">
+            <a:extLst>
+              <a:ext uri="{FF2B5EF4-FFF2-40B4-BE49-F238E27FC236}">
+                <a16:creationId xmlns:a16="http://schemas.microsoft.com/office/drawing/2014/main" id="{0AB06E8D-2E1E-4889-9A75-2C787F172077}"/>
               </a:ext>
             </a:extLst>
           </p:cNvPr>
           <p:cNvCxnSpPr>
-            <a:stCxn id="5" idx="2"/>
-            <a:endCxn id="16" idx="0"/>
+            <a:stCxn id="160" idx="0"/>
+            <a:endCxn id="171" idx="0"/>
           </p:cNvCxnSpPr>
           <p:nvPr/>
         </p:nvCxnSpPr>
         <p:spPr>
-          <a:xfrm flipH="1">
-            <a:off x="6761542" y="1893200"/>
-            <a:ext cx="1" cy="497524"/>
-          </a:xfrm>
-          <a:prstGeom prst="straightConnector1">
+          <a:xfrm>
+            <a:off x="3013345" y="432836"/>
+            <a:ext cx="6685824" cy="228641"/>
+          </a:xfrm>
+          <a:prstGeom prst="bentConnector2">
             <a:avLst/>
           </a:prstGeom>
           <a:ln>
@@ -9328,10 +10385,54 @@
       </p:cxnSp>
       <p:sp>
         <p:nvSpPr>
-          <p:cNvPr id="20" name="직사각형 19">
-            <a:extLst>
-              <a:ext uri="{FF2B5EF4-FFF2-40B4-BE49-F238E27FC236}">
-                <a16:creationId xmlns:a16="http://schemas.microsoft.com/office/drawing/2014/main" id="{79FA3108-14E1-491A-BDA6-BB8D52081E82}"/>
+          <p:cNvPr id="108" name="TextBox 107">
+            <a:extLst>
+              <a:ext uri="{FF2B5EF4-FFF2-40B4-BE49-F238E27FC236}">
+                <a16:creationId xmlns:a16="http://schemas.microsoft.com/office/drawing/2014/main" id="{44FC4E0B-BF55-4F7B-B87E-44E119C09C4E}"/>
+              </a:ext>
+            </a:extLst>
+          </p:cNvPr>
+          <p:cNvSpPr txBox="1"/>
+          <p:nvPr/>
+        </p:nvSpPr>
+        <p:spPr>
+          <a:xfrm>
+            <a:off x="6659400" y="5503478"/>
+            <a:ext cx="4192173" cy="369332"/>
+          </a:xfrm>
+          <a:prstGeom prst="rect">
+            <a:avLst/>
+          </a:prstGeom>
+          <a:noFill/>
+        </p:spPr>
+        <p:txBody>
+          <a:bodyPr wrap="none" rtlCol="0">
+            <a:spAutoFit/>
+          </a:bodyPr>
+          <a:lstStyle/>
+          <a:p>
+            <a:r>
+              <a:rPr lang="en-US" altLang="ko-KR" dirty="0"/>
+              <a:t>Array [{…., </a:t>
+            </a:r>
+            <a:r>
+              <a:rPr lang="en-US" altLang="ko-KR" dirty="0" err="1"/>
+              <a:t>metadataStatus</a:t>
+            </a:r>
+            <a:r>
+              <a:rPr lang="en-US" altLang="ko-KR" dirty="0"/>
+              <a:t>: null, …}, …]</a:t>
+            </a:r>
+            <a:endParaRPr lang="ko-KR" altLang="en-US" dirty="0"/>
+          </a:p>
+        </p:txBody>
+      </p:sp>
+      <p:sp>
+        <p:nvSpPr>
+          <p:cNvPr id="199" name="직사각형 198">
+            <a:extLst>
+              <a:ext uri="{FF2B5EF4-FFF2-40B4-BE49-F238E27FC236}">
+                <a16:creationId xmlns:a16="http://schemas.microsoft.com/office/drawing/2014/main" id="{071A06AF-BC55-4913-940F-49FCE691DF85}"/>
               </a:ext>
             </a:extLst>
           </p:cNvPr>
@@ -9340,8 +10441,8 @@
         </p:nvSpPr>
         <p:spPr>
           <a:xfrm>
-            <a:off x="1754396" y="3043823"/>
-            <a:ext cx="659757" cy="369332"/>
+            <a:off x="8641154" y="4661247"/>
+            <a:ext cx="2111727" cy="646331"/>
           </a:xfrm>
           <a:prstGeom prst="rect">
             <a:avLst/>
@@ -9370,7 +10471,14 @@
             <a:pPr algn="ctr"/>
             <a:r>
               <a:rPr lang="en-US" altLang="ko-KR" dirty="0"/>
-              <a:t>DB</a:t>
+              <a:t>Return value</a:t>
+            </a:r>
+          </a:p>
+          <a:p>
+            <a:pPr algn="ctr"/>
+            <a:r>
+              <a:rPr lang="en-US" altLang="ko-KR" dirty="0"/>
+              <a:t>Some function</a:t>
             </a:r>
             <a:endParaRPr lang="ko-KR" altLang="en-US" dirty="0"/>
           </a:p>
@@ -9378,23 +10486,24 @@
       </p:sp>
       <p:cxnSp>
         <p:nvCxnSpPr>
-          <p:cNvPr id="24" name="직선 화살표 연결선 23">
-            <a:extLst>
-              <a:ext uri="{FF2B5EF4-FFF2-40B4-BE49-F238E27FC236}">
-                <a16:creationId xmlns:a16="http://schemas.microsoft.com/office/drawing/2014/main" id="{69CB929B-35C5-48D7-BE81-01E5B81DB015}"/>
+          <p:cNvPr id="202" name="직선 화살표 연결선 201">
+            <a:extLst>
+              <a:ext uri="{FF2B5EF4-FFF2-40B4-BE49-F238E27FC236}">
+                <a16:creationId xmlns:a16="http://schemas.microsoft.com/office/drawing/2014/main" id="{DC0A9712-D2A3-4445-8D02-DC25B23A4456}"/>
               </a:ext>
             </a:extLst>
           </p:cNvPr>
           <p:cNvCxnSpPr>
-            <a:stCxn id="12" idx="1"/>
-            <a:endCxn id="20" idx="3"/>
+            <a:cxnSpLocks/>
+            <a:stCxn id="170" idx="2"/>
+            <a:endCxn id="199" idx="0"/>
           </p:cNvCxnSpPr>
           <p:nvPr/>
         </p:nvCxnSpPr>
         <p:spPr>
           <a:xfrm flipH="1">
-            <a:off x="2414153" y="2955955"/>
-            <a:ext cx="3737790" cy="272534"/>
+            <a:off x="9697018" y="4449845"/>
+            <a:ext cx="2152" cy="211402"/>
           </a:xfrm>
           <a:prstGeom prst="straightConnector1">
             <a:avLst/>
@@ -9420,26 +10529,31 @@
       </p:cxnSp>
       <p:cxnSp>
         <p:nvCxnSpPr>
-          <p:cNvPr id="26" name="직선 화살표 연결선 25">
-            <a:extLst>
-              <a:ext uri="{FF2B5EF4-FFF2-40B4-BE49-F238E27FC236}">
-                <a16:creationId xmlns:a16="http://schemas.microsoft.com/office/drawing/2014/main" id="{FFE6E351-AE99-413E-B3FF-93A94D7480F4}"/>
+          <p:cNvPr id="207" name="연결선: 꺾임 206">
+            <a:extLst>
+              <a:ext uri="{FF2B5EF4-FFF2-40B4-BE49-F238E27FC236}">
+                <a16:creationId xmlns:a16="http://schemas.microsoft.com/office/drawing/2014/main" id="{7A26B3F6-39CA-42B3-9FF9-8344B5541445}"/>
               </a:ext>
             </a:extLst>
           </p:cNvPr>
           <p:cNvCxnSpPr>
-            <a:stCxn id="13" idx="1"/>
-            <a:endCxn id="20" idx="3"/>
+            <a:cxnSpLocks/>
+            <a:stCxn id="199" idx="2"/>
+            <a:endCxn id="181" idx="0"/>
           </p:cNvCxnSpPr>
           <p:nvPr/>
         </p:nvCxnSpPr>
         <p:spPr>
-          <a:xfrm flipH="1">
-            <a:off x="2414153" y="3108355"/>
-            <a:ext cx="3890190" cy="120134"/>
-          </a:xfrm>
-          <a:prstGeom prst="straightConnector1">
-            <a:avLst/>
+          <a:xfrm rot="5400000" flipH="1">
+            <a:off x="5338329" y="948889"/>
+            <a:ext cx="3934154" cy="4783225"/>
+          </a:xfrm>
+          <a:prstGeom prst="bentConnector5">
+            <a:avLst>
+              <a:gd name="adj1" fmla="val -5811"/>
+              <a:gd name="adj2" fmla="val 51560"/>
+              <a:gd name="adj3" fmla="val 105811"/>
+            </a:avLst>
           </a:prstGeom>
           <a:ln>
             <a:tailEnd type="triangle"/>
@@ -9462,28 +10576,29 @@
       </p:cxnSp>
       <p:cxnSp>
         <p:nvCxnSpPr>
-          <p:cNvPr id="28" name="직선 화살표 연결선 27">
-            <a:extLst>
-              <a:ext uri="{FF2B5EF4-FFF2-40B4-BE49-F238E27FC236}">
-                <a16:creationId xmlns:a16="http://schemas.microsoft.com/office/drawing/2014/main" id="{CF7ACE2F-75B4-4A00-8770-6C1D4EC011D1}"/>
+          <p:cNvPr id="229" name="직선 화살표 연결선 228">
+            <a:extLst>
+              <a:ext uri="{FF2B5EF4-FFF2-40B4-BE49-F238E27FC236}">
+                <a16:creationId xmlns:a16="http://schemas.microsoft.com/office/drawing/2014/main" id="{9B5DA91A-84FA-4BA8-80E9-36A76A6B2A42}"/>
               </a:ext>
             </a:extLst>
           </p:cNvPr>
           <p:cNvCxnSpPr>
-            <a:stCxn id="15" idx="1"/>
-            <a:endCxn id="20" idx="3"/>
+            <a:stCxn id="181" idx="2"/>
+            <a:endCxn id="20" idx="0"/>
           </p:cNvCxnSpPr>
           <p:nvPr/>
         </p:nvCxnSpPr>
         <p:spPr>
-          <a:xfrm flipH="1" flipV="1">
-            <a:off x="2414153" y="3228489"/>
-            <a:ext cx="4194990" cy="184666"/>
+          <a:xfrm flipH="1">
+            <a:off x="4912446" y="1742756"/>
+            <a:ext cx="1347" cy="417240"/>
           </a:xfrm>
           <a:prstGeom prst="straightConnector1">
             <a:avLst/>
           </a:prstGeom>
           <a:ln>
+            <a:headEnd type="triangle"/>
             <a:tailEnd type="triangle"/>
           </a:ln>
         </p:spPr>
@@ -9504,26 +10619,25 @@
       </p:cxnSp>
       <p:cxnSp>
         <p:nvCxnSpPr>
-          <p:cNvPr id="36" name="직선 화살표 연결선 35">
-            <a:extLst>
-              <a:ext uri="{FF2B5EF4-FFF2-40B4-BE49-F238E27FC236}">
-                <a16:creationId xmlns:a16="http://schemas.microsoft.com/office/drawing/2014/main" id="{25E08699-73BF-4508-8CE3-E179DE56A687}"/>
-              </a:ext>
-            </a:extLst>
-          </p:cNvPr>
-          <p:cNvCxnSpPr>
-            <a:stCxn id="11" idx="1"/>
-            <a:endCxn id="20" idx="3"/>
-          </p:cNvCxnSpPr>
+          <p:cNvPr id="233" name="연결선: 꺾임 232">
+            <a:extLst>
+              <a:ext uri="{FF2B5EF4-FFF2-40B4-BE49-F238E27FC236}">
+                <a16:creationId xmlns:a16="http://schemas.microsoft.com/office/drawing/2014/main" id="{0FAE719C-70A4-4E6A-9E5B-F39E847EEEB7}"/>
+              </a:ext>
+            </a:extLst>
+          </p:cNvPr>
+          <p:cNvCxnSpPr/>
           <p:nvPr/>
         </p:nvCxnSpPr>
         <p:spPr>
-          <a:xfrm flipH="1">
-            <a:off x="2414153" y="2803555"/>
-            <a:ext cx="3585390" cy="424934"/>
-          </a:xfrm>
-          <a:prstGeom prst="straightConnector1">
-            <a:avLst/>
+          <a:xfrm flipV="1">
+            <a:off x="972273" y="1373424"/>
+            <a:ext cx="3193605" cy="3074788"/>
+          </a:xfrm>
+          <a:prstGeom prst="bentConnector3">
+            <a:avLst>
+              <a:gd name="adj1" fmla="val -16"/>
+            </a:avLst>
           </a:prstGeom>
           <a:ln>
             <a:tailEnd type="triangle"/>
@@ -9544,346 +10658,31 @@
           </a:fontRef>
         </p:style>
       </p:cxnSp>
-      <p:grpSp>
-        <p:nvGrpSpPr>
-          <p:cNvPr id="61" name="그룹 60">
-            <a:extLst>
-              <a:ext uri="{FF2B5EF4-FFF2-40B4-BE49-F238E27FC236}">
-                <a16:creationId xmlns:a16="http://schemas.microsoft.com/office/drawing/2014/main" id="{4B5DB649-B2A5-4415-B7A2-B4DC250D009C}"/>
-              </a:ext>
-            </a:extLst>
-          </p:cNvPr>
-          <p:cNvGrpSpPr/>
-          <p:nvPr/>
-        </p:nvGrpSpPr>
-        <p:grpSpPr>
-          <a:xfrm>
-            <a:off x="1123575" y="4170420"/>
-            <a:ext cx="1944547" cy="1435261"/>
-            <a:chOff x="1655179" y="2937748"/>
-            <a:chExt cx="1944547" cy="1435261"/>
-          </a:xfrm>
-        </p:grpSpPr>
-        <p:sp>
-          <p:nvSpPr>
-            <p:cNvPr id="60" name="직사각형 59">
-              <a:extLst>
-                <a:ext uri="{FF2B5EF4-FFF2-40B4-BE49-F238E27FC236}">
-                  <a16:creationId xmlns:a16="http://schemas.microsoft.com/office/drawing/2014/main" id="{597E4BF8-39A9-45EC-9B48-038F7F76BEAC}"/>
-                </a:ext>
-              </a:extLst>
-            </p:cNvPr>
-            <p:cNvSpPr/>
-            <p:nvPr/>
-          </p:nvSpPr>
-          <p:spPr>
-            <a:xfrm>
-              <a:off x="1655179" y="2937748"/>
-              <a:ext cx="1944547" cy="1435261"/>
-            </a:xfrm>
-            <a:prstGeom prst="rect">
-              <a:avLst/>
-            </a:prstGeom>
-          </p:spPr>
-          <p:style>
-            <a:lnRef idx="2">
-              <a:schemeClr val="accent5"/>
-            </a:lnRef>
-            <a:fillRef idx="1">
-              <a:schemeClr val="lt1"/>
-            </a:fillRef>
-            <a:effectRef idx="0">
-              <a:schemeClr val="accent5"/>
-            </a:effectRef>
-            <a:fontRef idx="minor">
-              <a:schemeClr val="dk1"/>
-            </a:fontRef>
-          </p:style>
-          <p:txBody>
-            <a:bodyPr rtlCol="0" anchor="ctr">
-              <a:spAutoFit/>
-            </a:bodyPr>
-            <a:lstStyle/>
-            <a:p>
-              <a:pPr algn="ctr"/>
-              <a:endParaRPr lang="ko-KR" altLang="en-US" dirty="0"/>
-            </a:p>
-          </p:txBody>
-        </p:sp>
-        <p:sp>
-          <p:nvSpPr>
-            <p:cNvPr id="55" name="직사각형 54">
-              <a:extLst>
-                <a:ext uri="{FF2B5EF4-FFF2-40B4-BE49-F238E27FC236}">
-                  <a16:creationId xmlns:a16="http://schemas.microsoft.com/office/drawing/2014/main" id="{8A272652-5480-41E9-A3C8-49759884E0EC}"/>
-                </a:ext>
-              </a:extLst>
-            </p:cNvPr>
-            <p:cNvSpPr/>
-            <p:nvPr/>
-          </p:nvSpPr>
-          <p:spPr>
-            <a:xfrm>
-              <a:off x="1869311" y="3120435"/>
-              <a:ext cx="914400" cy="369332"/>
-            </a:xfrm>
-            <a:prstGeom prst="rect">
-              <a:avLst/>
-            </a:prstGeom>
-          </p:spPr>
-          <p:style>
-            <a:lnRef idx="2">
-              <a:schemeClr val="accent5"/>
-            </a:lnRef>
-            <a:fillRef idx="1">
-              <a:schemeClr val="lt1"/>
-            </a:fillRef>
-            <a:effectRef idx="0">
-              <a:schemeClr val="accent5"/>
-            </a:effectRef>
-            <a:fontRef idx="minor">
-              <a:schemeClr val="dk1"/>
-            </a:fontRef>
-          </p:style>
-          <p:txBody>
-            <a:bodyPr rtlCol="0" anchor="ctr">
-              <a:spAutoFit/>
-            </a:bodyPr>
-            <a:lstStyle/>
-            <a:p>
-              <a:pPr algn="ctr"/>
-              <a:r>
-                <a:rPr lang="en-US" altLang="ko-KR" dirty="0"/>
-                <a:t>book</a:t>
-              </a:r>
-              <a:endParaRPr lang="ko-KR" altLang="en-US" dirty="0"/>
-            </a:p>
-          </p:txBody>
-        </p:sp>
-        <p:sp>
-          <p:nvSpPr>
-            <p:cNvPr id="56" name="직사각형 55">
-              <a:extLst>
-                <a:ext uri="{FF2B5EF4-FFF2-40B4-BE49-F238E27FC236}">
-                  <a16:creationId xmlns:a16="http://schemas.microsoft.com/office/drawing/2014/main" id="{93C4B91F-53ED-4506-B9F4-C2674592A4F4}"/>
-                </a:ext>
-              </a:extLst>
-            </p:cNvPr>
-            <p:cNvSpPr/>
-            <p:nvPr/>
-          </p:nvSpPr>
-          <p:spPr>
-            <a:xfrm>
-              <a:off x="2021711" y="3272835"/>
-              <a:ext cx="914400" cy="369332"/>
-            </a:xfrm>
-            <a:prstGeom prst="rect">
-              <a:avLst/>
-            </a:prstGeom>
-          </p:spPr>
-          <p:style>
-            <a:lnRef idx="2">
-              <a:schemeClr val="accent5"/>
-            </a:lnRef>
-            <a:fillRef idx="1">
-              <a:schemeClr val="lt1"/>
-            </a:fillRef>
-            <a:effectRef idx="0">
-              <a:schemeClr val="accent5"/>
-            </a:effectRef>
-            <a:fontRef idx="minor">
-              <a:schemeClr val="dk1"/>
-            </a:fontRef>
-          </p:style>
-          <p:txBody>
-            <a:bodyPr rtlCol="0" anchor="ctr">
-              <a:spAutoFit/>
-            </a:bodyPr>
-            <a:lstStyle/>
-            <a:p>
-              <a:pPr algn="ctr"/>
-              <a:r>
-                <a:rPr lang="en-US" altLang="ko-KR" dirty="0"/>
-                <a:t>book</a:t>
-              </a:r>
-              <a:endParaRPr lang="ko-KR" altLang="en-US" dirty="0"/>
-            </a:p>
-          </p:txBody>
-        </p:sp>
-        <p:sp>
-          <p:nvSpPr>
-            <p:cNvPr id="57" name="직사각형 56">
-              <a:extLst>
-                <a:ext uri="{FF2B5EF4-FFF2-40B4-BE49-F238E27FC236}">
-                  <a16:creationId xmlns:a16="http://schemas.microsoft.com/office/drawing/2014/main" id="{46E8CE0B-EED4-4A6D-B8ED-1670841EF432}"/>
-                </a:ext>
-              </a:extLst>
-            </p:cNvPr>
-            <p:cNvSpPr/>
-            <p:nvPr/>
-          </p:nvSpPr>
-          <p:spPr>
-            <a:xfrm>
-              <a:off x="2174111" y="3425235"/>
-              <a:ext cx="914400" cy="369332"/>
-            </a:xfrm>
-            <a:prstGeom prst="rect">
-              <a:avLst/>
-            </a:prstGeom>
-          </p:spPr>
-          <p:style>
-            <a:lnRef idx="2">
-              <a:schemeClr val="accent5"/>
-            </a:lnRef>
-            <a:fillRef idx="1">
-              <a:schemeClr val="lt1"/>
-            </a:fillRef>
-            <a:effectRef idx="0">
-              <a:schemeClr val="accent5"/>
-            </a:effectRef>
-            <a:fontRef idx="minor">
-              <a:schemeClr val="dk1"/>
-            </a:fontRef>
-          </p:style>
-          <p:txBody>
-            <a:bodyPr rtlCol="0" anchor="ctr">
-              <a:spAutoFit/>
-            </a:bodyPr>
-            <a:lstStyle/>
-            <a:p>
-              <a:pPr algn="ctr"/>
-              <a:r>
-                <a:rPr lang="en-US" altLang="ko-KR" dirty="0"/>
-                <a:t>book</a:t>
-              </a:r>
-              <a:endParaRPr lang="ko-KR" altLang="en-US" dirty="0"/>
-            </a:p>
-          </p:txBody>
-        </p:sp>
-        <p:sp>
-          <p:nvSpPr>
-            <p:cNvPr id="58" name="직사각형 57">
-              <a:extLst>
-                <a:ext uri="{FF2B5EF4-FFF2-40B4-BE49-F238E27FC236}">
-                  <a16:creationId xmlns:a16="http://schemas.microsoft.com/office/drawing/2014/main" id="{C5C70AAD-5077-49E9-A89C-B446C4DD3F62}"/>
-                </a:ext>
-              </a:extLst>
-            </p:cNvPr>
-            <p:cNvSpPr/>
-            <p:nvPr/>
-          </p:nvSpPr>
-          <p:spPr>
-            <a:xfrm>
-              <a:off x="2326511" y="3577635"/>
-              <a:ext cx="914400" cy="369332"/>
-            </a:xfrm>
-            <a:prstGeom prst="rect">
-              <a:avLst/>
-            </a:prstGeom>
-          </p:spPr>
-          <p:style>
-            <a:lnRef idx="2">
-              <a:schemeClr val="accent5"/>
-            </a:lnRef>
-            <a:fillRef idx="1">
-              <a:schemeClr val="lt1"/>
-            </a:fillRef>
-            <a:effectRef idx="0">
-              <a:schemeClr val="accent5"/>
-            </a:effectRef>
-            <a:fontRef idx="minor">
-              <a:schemeClr val="dk1"/>
-            </a:fontRef>
-          </p:style>
-          <p:txBody>
-            <a:bodyPr rtlCol="0" anchor="ctr">
-              <a:spAutoFit/>
-            </a:bodyPr>
-            <a:lstStyle/>
-            <a:p>
-              <a:pPr algn="ctr"/>
-              <a:r>
-                <a:rPr lang="en-US" altLang="ko-KR" dirty="0"/>
-                <a:t>book</a:t>
-              </a:r>
-              <a:endParaRPr lang="ko-KR" altLang="en-US" dirty="0"/>
-            </a:p>
-          </p:txBody>
-        </p:sp>
-        <p:sp>
-          <p:nvSpPr>
-            <p:cNvPr id="59" name="직사각형 58">
-              <a:extLst>
-                <a:ext uri="{FF2B5EF4-FFF2-40B4-BE49-F238E27FC236}">
-                  <a16:creationId xmlns:a16="http://schemas.microsoft.com/office/drawing/2014/main" id="{2857BF45-300F-49CB-A407-7BAED4CEF049}"/>
-                </a:ext>
-              </a:extLst>
-            </p:cNvPr>
-            <p:cNvSpPr/>
-            <p:nvPr/>
-          </p:nvSpPr>
-          <p:spPr>
-            <a:xfrm>
-              <a:off x="2478911" y="3730035"/>
-              <a:ext cx="914400" cy="369332"/>
-            </a:xfrm>
-            <a:prstGeom prst="rect">
-              <a:avLst/>
-            </a:prstGeom>
-          </p:spPr>
-          <p:style>
-            <a:lnRef idx="2">
-              <a:schemeClr val="accent5"/>
-            </a:lnRef>
-            <a:fillRef idx="1">
-              <a:schemeClr val="lt1"/>
-            </a:fillRef>
-            <a:effectRef idx="0">
-              <a:schemeClr val="accent5"/>
-            </a:effectRef>
-            <a:fontRef idx="minor">
-              <a:schemeClr val="dk1"/>
-            </a:fontRef>
-          </p:style>
-          <p:txBody>
-            <a:bodyPr rtlCol="0" anchor="ctr">
-              <a:spAutoFit/>
-            </a:bodyPr>
-            <a:lstStyle/>
-            <a:p>
-              <a:pPr algn="ctr"/>
-              <a:r>
-                <a:rPr lang="en-US" altLang="ko-KR" dirty="0"/>
-                <a:t>book</a:t>
-              </a:r>
-              <a:endParaRPr lang="ko-KR" altLang="en-US" dirty="0"/>
-            </a:p>
-          </p:txBody>
-        </p:sp>
-      </p:grpSp>
       <p:cxnSp>
         <p:nvCxnSpPr>
-          <p:cNvPr id="63" name="직선 연결선 62">
-            <a:extLst>
-              <a:ext uri="{FF2B5EF4-FFF2-40B4-BE49-F238E27FC236}">
-                <a16:creationId xmlns:a16="http://schemas.microsoft.com/office/drawing/2014/main" id="{B34CAE05-9AE6-41E6-92D5-EA9B3B2B7FA3}"/>
+          <p:cNvPr id="240" name="연결선: 꺾임 239">
+            <a:extLst>
+              <a:ext uri="{FF2B5EF4-FFF2-40B4-BE49-F238E27FC236}">
+                <a16:creationId xmlns:a16="http://schemas.microsoft.com/office/drawing/2014/main" id="{A3AD16C2-FC95-415A-81D0-5C83AADFB104}"/>
               </a:ext>
             </a:extLst>
           </p:cNvPr>
           <p:cNvCxnSpPr>
-            <a:stCxn id="20" idx="2"/>
-            <a:endCxn id="60" idx="0"/>
+            <a:stCxn id="181" idx="1"/>
           </p:cNvCxnSpPr>
           <p:nvPr/>
         </p:nvCxnSpPr>
         <p:spPr>
-          <a:xfrm>
-            <a:off x="2084275" y="3413155"/>
-            <a:ext cx="11574" cy="757265"/>
-          </a:xfrm>
-          <a:prstGeom prst="line">
+          <a:xfrm rot="10800000" flipV="1">
+            <a:off x="2099708" y="1558090"/>
+            <a:ext cx="1907459" cy="2890122"/>
+          </a:xfrm>
+          <a:prstGeom prst="bentConnector2">
             <a:avLst/>
           </a:prstGeom>
+          <a:ln>
+            <a:tailEnd type="triangle"/>
+          </a:ln>
         </p:spPr>
         <p:style>
           <a:lnRef idx="1">
@@ -9902,277 +10701,10 @@
       </p:cxnSp>
       <p:sp>
         <p:nvSpPr>
-          <p:cNvPr id="68" name="직사각형 67">
-            <a:extLst>
-              <a:ext uri="{FF2B5EF4-FFF2-40B4-BE49-F238E27FC236}">
-                <a16:creationId xmlns:a16="http://schemas.microsoft.com/office/drawing/2014/main" id="{4D5107D5-7433-4C26-AFA2-728C00F4A8A0}"/>
-              </a:ext>
-            </a:extLst>
-          </p:cNvPr>
-          <p:cNvSpPr/>
-          <p:nvPr/>
-        </p:nvSpPr>
-        <p:spPr>
-          <a:xfrm>
-            <a:off x="6913943" y="5077401"/>
-            <a:ext cx="1375459" cy="646331"/>
-          </a:xfrm>
-          <a:prstGeom prst="rect">
-            <a:avLst/>
-          </a:prstGeom>
-        </p:spPr>
-        <p:style>
-          <a:lnRef idx="2">
-            <a:schemeClr val="accent5"/>
-          </a:lnRef>
-          <a:fillRef idx="1">
-            <a:schemeClr val="lt1"/>
-          </a:fillRef>
-          <a:effectRef idx="0">
-            <a:schemeClr val="accent5"/>
-          </a:effectRef>
-          <a:fontRef idx="minor">
-            <a:schemeClr val="dk1"/>
-          </a:fontRef>
-        </p:style>
-        <p:txBody>
-          <a:bodyPr wrap="square" rtlCol="0" anchor="ctr">
-            <a:spAutoFit/>
-          </a:bodyPr>
-          <a:lstStyle/>
-          <a:p>
-            <a:pPr algn="ctr"/>
-            <a:r>
-              <a:rPr lang="en-US" altLang="ko-KR" dirty="0"/>
-              <a:t>Matching metadata</a:t>
-            </a:r>
-            <a:endParaRPr lang="ko-KR" altLang="en-US" dirty="0"/>
-          </a:p>
-        </p:txBody>
-      </p:sp>
-      <p:cxnSp>
-        <p:nvCxnSpPr>
-          <p:cNvPr id="70" name="직선 화살표 연결선 69">
-            <a:extLst>
-              <a:ext uri="{FF2B5EF4-FFF2-40B4-BE49-F238E27FC236}">
-                <a16:creationId xmlns:a16="http://schemas.microsoft.com/office/drawing/2014/main" id="{EB2ED1E0-2D82-48D1-A58A-826706DCC512}"/>
-              </a:ext>
-            </a:extLst>
-          </p:cNvPr>
-          <p:cNvCxnSpPr>
-            <a:stCxn id="55" idx="3"/>
-            <a:endCxn id="68" idx="1"/>
-          </p:cNvCxnSpPr>
-          <p:nvPr/>
-        </p:nvCxnSpPr>
-        <p:spPr>
-          <a:xfrm>
-            <a:off x="2252107" y="4537773"/>
-            <a:ext cx="4661836" cy="862794"/>
-          </a:xfrm>
-          <a:prstGeom prst="straightConnector1">
-            <a:avLst/>
-          </a:prstGeom>
-          <a:ln>
-            <a:headEnd type="triangle"/>
-            <a:tailEnd type="triangle"/>
-          </a:ln>
-        </p:spPr>
-        <p:style>
-          <a:lnRef idx="1">
-            <a:schemeClr val="accent1"/>
-          </a:lnRef>
-          <a:fillRef idx="0">
-            <a:schemeClr val="accent1"/>
-          </a:fillRef>
-          <a:effectRef idx="0">
-            <a:schemeClr val="accent1"/>
-          </a:effectRef>
-          <a:fontRef idx="minor">
-            <a:schemeClr val="tx1"/>
-          </a:fontRef>
-        </p:style>
-      </p:cxnSp>
-      <p:cxnSp>
-        <p:nvCxnSpPr>
-          <p:cNvPr id="72" name="직선 화살표 연결선 71">
-            <a:extLst>
-              <a:ext uri="{FF2B5EF4-FFF2-40B4-BE49-F238E27FC236}">
-                <a16:creationId xmlns:a16="http://schemas.microsoft.com/office/drawing/2014/main" id="{5D389BC8-D63E-477D-BF65-B21C21E02D4C}"/>
-              </a:ext>
-            </a:extLst>
-          </p:cNvPr>
-          <p:cNvCxnSpPr>
-            <a:stCxn id="59" idx="3"/>
-            <a:endCxn id="68" idx="1"/>
-          </p:cNvCxnSpPr>
-          <p:nvPr/>
-        </p:nvCxnSpPr>
-        <p:spPr>
-          <a:xfrm>
-            <a:off x="2861707" y="5147373"/>
-            <a:ext cx="4052236" cy="253194"/>
-          </a:xfrm>
-          <a:prstGeom prst="straightConnector1">
-            <a:avLst/>
-          </a:prstGeom>
-          <a:ln>
-            <a:headEnd type="triangle"/>
-            <a:tailEnd type="triangle"/>
-          </a:ln>
-        </p:spPr>
-        <p:style>
-          <a:lnRef idx="1">
-            <a:schemeClr val="accent1"/>
-          </a:lnRef>
-          <a:fillRef idx="0">
-            <a:schemeClr val="accent1"/>
-          </a:fillRef>
-          <a:effectRef idx="0">
-            <a:schemeClr val="accent1"/>
-          </a:effectRef>
-          <a:fontRef idx="minor">
-            <a:schemeClr val="tx1"/>
-          </a:fontRef>
-        </p:style>
-      </p:cxnSp>
-      <p:cxnSp>
-        <p:nvCxnSpPr>
-          <p:cNvPr id="74" name="직선 화살표 연결선 73">
-            <a:extLst>
-              <a:ext uri="{FF2B5EF4-FFF2-40B4-BE49-F238E27FC236}">
-                <a16:creationId xmlns:a16="http://schemas.microsoft.com/office/drawing/2014/main" id="{3BBA566F-18E7-45FE-92A8-B41E3896F141}"/>
-              </a:ext>
-            </a:extLst>
-          </p:cNvPr>
-          <p:cNvCxnSpPr>
-            <a:stCxn id="58" idx="3"/>
-            <a:endCxn id="68" idx="1"/>
-          </p:cNvCxnSpPr>
-          <p:nvPr/>
-        </p:nvCxnSpPr>
-        <p:spPr>
-          <a:xfrm>
-            <a:off x="2709307" y="4994973"/>
-            <a:ext cx="4204636" cy="405594"/>
-          </a:xfrm>
-          <a:prstGeom prst="straightConnector1">
-            <a:avLst/>
-          </a:prstGeom>
-          <a:ln>
-            <a:headEnd type="triangle"/>
-            <a:tailEnd type="triangle"/>
-          </a:ln>
-        </p:spPr>
-        <p:style>
-          <a:lnRef idx="1">
-            <a:schemeClr val="accent1"/>
-          </a:lnRef>
-          <a:fillRef idx="0">
-            <a:schemeClr val="accent1"/>
-          </a:fillRef>
-          <a:effectRef idx="0">
-            <a:schemeClr val="accent1"/>
-          </a:effectRef>
-          <a:fontRef idx="minor">
-            <a:schemeClr val="tx1"/>
-          </a:fontRef>
-        </p:style>
-      </p:cxnSp>
-      <p:cxnSp>
-        <p:nvCxnSpPr>
-          <p:cNvPr id="88" name="직선 화살표 연결선 87">
-            <a:extLst>
-              <a:ext uri="{FF2B5EF4-FFF2-40B4-BE49-F238E27FC236}">
-                <a16:creationId xmlns:a16="http://schemas.microsoft.com/office/drawing/2014/main" id="{6CADE629-5798-415B-923A-BD939B7ED910}"/>
-              </a:ext>
-            </a:extLst>
-          </p:cNvPr>
-          <p:cNvCxnSpPr>
-            <a:cxnSpLocks/>
-            <a:stCxn id="57" idx="3"/>
-            <a:endCxn id="68" idx="1"/>
-          </p:cNvCxnSpPr>
-          <p:nvPr/>
-        </p:nvCxnSpPr>
-        <p:spPr>
-          <a:xfrm>
-            <a:off x="2556907" y="4842573"/>
-            <a:ext cx="4357036" cy="557994"/>
-          </a:xfrm>
-          <a:prstGeom prst="straightConnector1">
-            <a:avLst/>
-          </a:prstGeom>
-          <a:ln>
-            <a:headEnd type="triangle"/>
-            <a:tailEnd type="triangle"/>
-          </a:ln>
-        </p:spPr>
-        <p:style>
-          <a:lnRef idx="1">
-            <a:schemeClr val="accent1"/>
-          </a:lnRef>
-          <a:fillRef idx="0">
-            <a:schemeClr val="accent1"/>
-          </a:fillRef>
-          <a:effectRef idx="0">
-            <a:schemeClr val="accent1"/>
-          </a:effectRef>
-          <a:fontRef idx="minor">
-            <a:schemeClr val="tx1"/>
-          </a:fontRef>
-        </p:style>
-      </p:cxnSp>
-      <p:cxnSp>
-        <p:nvCxnSpPr>
-          <p:cNvPr id="92" name="직선 화살표 연결선 91">
-            <a:extLst>
-              <a:ext uri="{FF2B5EF4-FFF2-40B4-BE49-F238E27FC236}">
-                <a16:creationId xmlns:a16="http://schemas.microsoft.com/office/drawing/2014/main" id="{2EDB8986-3F7F-447D-BB03-DD0AC801CC96}"/>
-              </a:ext>
-            </a:extLst>
-          </p:cNvPr>
-          <p:cNvCxnSpPr>
-            <a:cxnSpLocks/>
-            <a:stCxn id="56" idx="3"/>
-            <a:endCxn id="68" idx="1"/>
-          </p:cNvCxnSpPr>
-          <p:nvPr/>
-        </p:nvCxnSpPr>
-        <p:spPr>
-          <a:xfrm>
-            <a:off x="2404507" y="4690173"/>
-            <a:ext cx="4509436" cy="710394"/>
-          </a:xfrm>
-          <a:prstGeom prst="straightConnector1">
-            <a:avLst/>
-          </a:prstGeom>
-          <a:ln>
-            <a:headEnd type="triangle"/>
-            <a:tailEnd type="triangle"/>
-          </a:ln>
-        </p:spPr>
-        <p:style>
-          <a:lnRef idx="1">
-            <a:schemeClr val="accent1"/>
-          </a:lnRef>
-          <a:fillRef idx="0">
-            <a:schemeClr val="accent1"/>
-          </a:fillRef>
-          <a:effectRef idx="0">
-            <a:schemeClr val="accent1"/>
-          </a:effectRef>
-          <a:fontRef idx="minor">
-            <a:schemeClr val="tx1"/>
-          </a:fontRef>
-        </p:style>
-      </p:cxnSp>
-      <p:sp>
-        <p:nvSpPr>
-          <p:cNvPr id="108" name="TextBox 107">
-            <a:extLst>
-              <a:ext uri="{FF2B5EF4-FFF2-40B4-BE49-F238E27FC236}">
-                <a16:creationId xmlns:a16="http://schemas.microsoft.com/office/drawing/2014/main" id="{44FC4E0B-BF55-4F7B-B87E-44E119C09C4E}"/>
+          <p:cNvPr id="241" name="TextBox 240">
+            <a:extLst>
+              <a:ext uri="{FF2B5EF4-FFF2-40B4-BE49-F238E27FC236}">
+                <a16:creationId xmlns:a16="http://schemas.microsoft.com/office/drawing/2014/main" id="{675BF6BD-F874-49EB-B0B5-D9494393906B}"/>
               </a:ext>
             </a:extLst>
           </p:cNvPr>
@@ -10181,8 +10713,8 @@
         </p:nvSpPr>
         <p:spPr>
           <a:xfrm>
-            <a:off x="3126321" y="2587618"/>
-            <a:ext cx="2313454" cy="369332"/>
+            <a:off x="1353940" y="1449330"/>
+            <a:ext cx="2914580" cy="646331"/>
           </a:xfrm>
           <a:prstGeom prst="rect">
             <a:avLst/>
@@ -10196,12 +10728,14 @@
           <a:lstStyle/>
           <a:p>
             <a:r>
-              <a:rPr lang="en-US" altLang="ko-KR" dirty="0" err="1"/>
-              <a:t>metadataStatus</a:t>
-            </a:r>
-            <a:r>
               <a:rPr lang="en-US" altLang="ko-KR" dirty="0"/>
-              <a:t>: null</a:t>
+              <a:t>Request between interval</a:t>
+            </a:r>
+          </a:p>
+          <a:p>
+            <a:r>
+              <a:rPr lang="en-US" altLang="ko-KR" dirty="0"/>
+              <a:t>with null metadata book</a:t>
             </a:r>
             <a:endParaRPr lang="ko-KR" altLang="en-US" dirty="0"/>
           </a:p>
@@ -10209,10 +10743,10 @@
       </p:sp>
       <p:sp>
         <p:nvSpPr>
-          <p:cNvPr id="135" name="TextBox 134">
-            <a:extLst>
-              <a:ext uri="{FF2B5EF4-FFF2-40B4-BE49-F238E27FC236}">
-                <a16:creationId xmlns:a16="http://schemas.microsoft.com/office/drawing/2014/main" id="{4BC97766-A138-445C-8BCF-4275007881B5}"/>
+          <p:cNvPr id="136" name="TextBox 135">
+            <a:extLst>
+              <a:ext uri="{FF2B5EF4-FFF2-40B4-BE49-F238E27FC236}">
+                <a16:creationId xmlns:a16="http://schemas.microsoft.com/office/drawing/2014/main" id="{D5C68C87-1B82-4AB3-9766-0D6C83C02C03}"/>
               </a:ext>
             </a:extLst>
           </p:cNvPr>
@@ -10221,8 +10755,8 @@
         </p:nvSpPr>
         <p:spPr>
           <a:xfrm>
-            <a:off x="939121" y="3911156"/>
-            <a:ext cx="2313454" cy="369332"/>
+            <a:off x="50327" y="2898918"/>
+            <a:ext cx="3174267" cy="1477328"/>
           </a:xfrm>
           <a:prstGeom prst="rect">
             <a:avLst/>
@@ -10236,256 +10770,45 @@
           <a:lstStyle/>
           <a:p>
             <a:r>
+              <a:rPr lang="en-US" altLang="ko-KR" dirty="0"/>
+              <a:t>Send {…, </a:t>
+            </a:r>
+          </a:p>
+          <a:p>
+            <a:r>
               <a:rPr lang="en-US" altLang="ko-KR" dirty="0" err="1"/>
               <a:t>metadataStatus</a:t>
             </a:r>
             <a:r>
               <a:rPr lang="en-US" altLang="ko-KR" dirty="0"/>
-              <a:t>: null</a:t>
+              <a:t>: success||fail,</a:t>
+            </a:r>
+          </a:p>
+          <a:p>
+            <a:r>
+              <a:rPr lang="en-US" altLang="ko-KR" dirty="0" err="1"/>
+              <a:t>metadataTimestamp</a:t>
+            </a:r>
+            <a:r>
+              <a:rPr lang="en-US" altLang="ko-KR" dirty="0"/>
+              <a:t>: time,</a:t>
+            </a:r>
+          </a:p>
+          <a:p>
+            <a:r>
+              <a:rPr lang="en-US" altLang="ko-KR" dirty="0"/>
+              <a:t>…</a:t>
+            </a:r>
+          </a:p>
+          <a:p>
+            <a:r>
+              <a:rPr lang="en-US" altLang="ko-KR" dirty="0"/>
+              <a:t>}</a:t>
             </a:r>
             <a:endParaRPr lang="ko-KR" altLang="en-US" dirty="0"/>
           </a:p>
         </p:txBody>
       </p:sp>
-      <p:sp>
-        <p:nvSpPr>
-          <p:cNvPr id="136" name="TextBox 135">
-            <a:extLst>
-              <a:ext uri="{FF2B5EF4-FFF2-40B4-BE49-F238E27FC236}">
-                <a16:creationId xmlns:a16="http://schemas.microsoft.com/office/drawing/2014/main" id="{D5C68C87-1B82-4AB3-9766-0D6C83C02C03}"/>
-              </a:ext>
-            </a:extLst>
-          </p:cNvPr>
-          <p:cNvSpPr txBox="1"/>
-          <p:nvPr/>
-        </p:nvSpPr>
-        <p:spPr>
-          <a:xfrm>
-            <a:off x="3475164" y="4466056"/>
-            <a:ext cx="3122971" cy="646331"/>
-          </a:xfrm>
-          <a:prstGeom prst="rect">
-            <a:avLst/>
-          </a:prstGeom>
-          <a:noFill/>
-        </p:spPr>
-        <p:txBody>
-          <a:bodyPr wrap="none" rtlCol="0">
-            <a:spAutoFit/>
-          </a:bodyPr>
-          <a:lstStyle/>
-          <a:p>
-            <a:r>
-              <a:rPr lang="en-US" altLang="ko-KR" dirty="0" err="1"/>
-              <a:t>metadataStatus</a:t>
-            </a:r>
-            <a:r>
-              <a:rPr lang="en-US" altLang="ko-KR" dirty="0"/>
-              <a:t>: success||fail</a:t>
-            </a:r>
-          </a:p>
-          <a:p>
-            <a:r>
-              <a:rPr lang="en-US" altLang="ko-KR" dirty="0" err="1"/>
-              <a:t>metadataTimestamp</a:t>
-            </a:r>
-            <a:r>
-              <a:rPr lang="en-US" altLang="ko-KR" dirty="0"/>
-              <a:t>: time</a:t>
-            </a:r>
-            <a:endParaRPr lang="ko-KR" altLang="en-US" dirty="0"/>
-          </a:p>
-        </p:txBody>
-      </p:sp>
-      <p:sp>
-        <p:nvSpPr>
-          <p:cNvPr id="142" name="TextBox 141">
-            <a:extLst>
-              <a:ext uri="{FF2B5EF4-FFF2-40B4-BE49-F238E27FC236}">
-                <a16:creationId xmlns:a16="http://schemas.microsoft.com/office/drawing/2014/main" id="{08E05330-C6CB-4702-998F-B07FAA345521}"/>
-              </a:ext>
-            </a:extLst>
-          </p:cNvPr>
-          <p:cNvSpPr txBox="1"/>
-          <p:nvPr/>
-        </p:nvSpPr>
-        <p:spPr>
-          <a:xfrm>
-            <a:off x="7415245" y="1250932"/>
-            <a:ext cx="3872086" cy="646331"/>
-          </a:xfrm>
-          <a:prstGeom prst="rect">
-            <a:avLst/>
-          </a:prstGeom>
-          <a:noFill/>
-        </p:spPr>
-        <p:txBody>
-          <a:bodyPr wrap="none" rtlCol="0">
-            <a:spAutoFit/>
-          </a:bodyPr>
-          <a:lstStyle/>
-          <a:p>
-            <a:r>
-              <a:rPr lang="en-US" altLang="ko-KR" dirty="0"/>
-              <a:t>Params </a:t>
-            </a:r>
-            <a:r>
-              <a:rPr lang="en-US" altLang="ko-KR" dirty="0" err="1"/>
-              <a:t>path.string</a:t>
-            </a:r>
-            <a:r>
-              <a:rPr lang="en-US" altLang="ko-KR" dirty="0"/>
-              <a:t>, </a:t>
-            </a:r>
-            <a:r>
-              <a:rPr lang="en-US" altLang="ko-KR" dirty="0" err="1"/>
-              <a:t>scannerName</a:t>
-            </a:r>
-            <a:endParaRPr lang="en-US" altLang="ko-KR" dirty="0"/>
-          </a:p>
-          <a:p>
-            <a:r>
-              <a:rPr lang="en-US" altLang="ko-KR" dirty="0"/>
-              <a:t>Return books[{path, type, time}, …]</a:t>
-            </a:r>
-            <a:endParaRPr lang="ko-KR" altLang="en-US" dirty="0"/>
-          </a:p>
-        </p:txBody>
-      </p:sp>
-      <p:sp>
-        <p:nvSpPr>
-          <p:cNvPr id="143" name="TextBox 142">
-            <a:extLst>
-              <a:ext uri="{FF2B5EF4-FFF2-40B4-BE49-F238E27FC236}">
-                <a16:creationId xmlns:a16="http://schemas.microsoft.com/office/drawing/2014/main" id="{B35541F3-C502-48EB-9E9F-A70A26CDAF14}"/>
-              </a:ext>
-            </a:extLst>
-          </p:cNvPr>
-          <p:cNvSpPr txBox="1"/>
-          <p:nvPr/>
-        </p:nvSpPr>
-        <p:spPr>
-          <a:xfrm>
-            <a:off x="8290497" y="5087800"/>
-            <a:ext cx="1516762" cy="646331"/>
-          </a:xfrm>
-          <a:prstGeom prst="rect">
-            <a:avLst/>
-          </a:prstGeom>
-          <a:noFill/>
-        </p:spPr>
-        <p:txBody>
-          <a:bodyPr wrap="none" rtlCol="0">
-            <a:spAutoFit/>
-          </a:bodyPr>
-          <a:lstStyle/>
-          <a:p>
-            <a:r>
-              <a:rPr lang="en-US" altLang="ko-KR" dirty="0"/>
-              <a:t>Params title?</a:t>
-            </a:r>
-          </a:p>
-          <a:p>
-            <a:r>
-              <a:rPr lang="en-US" altLang="ko-KR" dirty="0"/>
-              <a:t>Return info{}</a:t>
-            </a:r>
-            <a:endParaRPr lang="ko-KR" altLang="en-US" dirty="0"/>
-          </a:p>
-        </p:txBody>
-      </p:sp>
-      <p:sp>
-        <p:nvSpPr>
-          <p:cNvPr id="160" name="구름 159">
-            <a:extLst>
-              <a:ext uri="{FF2B5EF4-FFF2-40B4-BE49-F238E27FC236}">
-                <a16:creationId xmlns:a16="http://schemas.microsoft.com/office/drawing/2014/main" id="{23C44420-2FF6-4009-8A5C-B8203CAF5B15}"/>
-              </a:ext>
-            </a:extLst>
-          </p:cNvPr>
-          <p:cNvSpPr/>
-          <p:nvPr/>
-        </p:nvSpPr>
-        <p:spPr>
-          <a:xfrm>
-            <a:off x="4811625" y="307259"/>
-            <a:ext cx="914400" cy="562213"/>
-          </a:xfrm>
-          <a:prstGeom prst="cloud">
-            <a:avLst/>
-          </a:prstGeom>
-        </p:spPr>
-        <p:style>
-          <a:lnRef idx="2">
-            <a:schemeClr val="accent5"/>
-          </a:lnRef>
-          <a:fillRef idx="1">
-            <a:schemeClr val="lt1"/>
-          </a:fillRef>
-          <a:effectRef idx="0">
-            <a:schemeClr val="accent5"/>
-          </a:effectRef>
-          <a:fontRef idx="minor">
-            <a:schemeClr val="dk1"/>
-          </a:fontRef>
-        </p:style>
-        <p:txBody>
-          <a:bodyPr rtlCol="0" anchor="ctr">
-            <a:spAutoFit/>
-          </a:bodyPr>
-          <a:lstStyle/>
-          <a:p>
-            <a:pPr algn="ctr"/>
-            <a:r>
-              <a:rPr lang="en-US" altLang="ko-KR" dirty="0"/>
-              <a:t>API</a:t>
-            </a:r>
-            <a:endParaRPr lang="ko-KR" altLang="en-US" dirty="0"/>
-          </a:p>
-        </p:txBody>
-      </p:sp>
-      <p:cxnSp>
-        <p:nvCxnSpPr>
-          <p:cNvPr id="162" name="연결선: 꺾임 161">
-            <a:extLst>
-              <a:ext uri="{FF2B5EF4-FFF2-40B4-BE49-F238E27FC236}">
-                <a16:creationId xmlns:a16="http://schemas.microsoft.com/office/drawing/2014/main" id="{12CCEC2A-A70A-4700-9218-D84BCE1772AC}"/>
-              </a:ext>
-            </a:extLst>
-          </p:cNvPr>
-          <p:cNvCxnSpPr>
-            <a:stCxn id="160" idx="0"/>
-            <a:endCxn id="5" idx="0"/>
-          </p:cNvCxnSpPr>
-          <p:nvPr/>
-        </p:nvCxnSpPr>
-        <p:spPr>
-          <a:xfrm>
-            <a:off x="5725263" y="588366"/>
-            <a:ext cx="1036280" cy="658503"/>
-          </a:xfrm>
-          <a:prstGeom prst="bentConnector2">
-            <a:avLst/>
-          </a:prstGeom>
-          <a:ln>
-            <a:tailEnd type="triangle"/>
-          </a:ln>
-        </p:spPr>
-        <p:style>
-          <a:lnRef idx="1">
-            <a:schemeClr val="accent1"/>
-          </a:lnRef>
-          <a:fillRef idx="0">
-            <a:schemeClr val="accent1"/>
-          </a:fillRef>
-          <a:effectRef idx="0">
-            <a:schemeClr val="accent1"/>
-          </a:effectRef>
-          <a:fontRef idx="minor">
-            <a:schemeClr val="tx1"/>
-          </a:fontRef>
-        </p:style>
-      </p:cxnSp>
     </p:spTree>
     <p:extLst>
       <p:ext uri="{BB962C8B-B14F-4D97-AF65-F5344CB8AC3E}">

</xml_diff>

<commit_message>
Add database initialize logic
</commit_message>
<xml_diff>
--- a/bookshelf.index.pptx
+++ b/bookshelf.index.pptx
@@ -5,13 +5,15 @@
     <p:sldMasterId id="2147483648" r:id="rId1"/>
   </p:sldMasterIdLst>
   <p:sldIdLst>
-    <p:sldId id="258" r:id="rId2"/>
-    <p:sldId id="257" r:id="rId3"/>
-    <p:sldId id="259" r:id="rId4"/>
-    <p:sldId id="260" r:id="rId5"/>
-    <p:sldId id="261" r:id="rId6"/>
-    <p:sldId id="262" r:id="rId7"/>
-    <p:sldId id="263" r:id="rId8"/>
+    <p:sldId id="263" r:id="rId2"/>
+    <p:sldId id="258" r:id="rId3"/>
+    <p:sldId id="257" r:id="rId4"/>
+    <p:sldId id="259" r:id="rId5"/>
+    <p:sldId id="264" r:id="rId6"/>
+    <p:sldId id="265" r:id="rId7"/>
+    <p:sldId id="260" r:id="rId8"/>
+    <p:sldId id="261" r:id="rId9"/>
+    <p:sldId id="262" r:id="rId10"/>
   </p:sldIdLst>
   <p:sldSz cx="12192000" cy="6858000"/>
   <p:notesSz cx="6858000" cy="9144000"/>
@@ -277,7 +279,7 @@
           <a:p>
             <a:fld id="{3D0AB2D5-C843-415B-A96C-AFAFFAABBECD}" type="datetimeFigureOut">
               <a:rPr lang="ko-KR" altLang="en-US" smtClean="0"/>
-              <a:t>2021-03-24</a:t>
+              <a:t>2021-03-25</a:t>
             </a:fld>
             <a:endParaRPr lang="ko-KR" altLang="en-US"/>
           </a:p>
@@ -475,7 +477,7 @@
           <a:p>
             <a:fld id="{3D0AB2D5-C843-415B-A96C-AFAFFAABBECD}" type="datetimeFigureOut">
               <a:rPr lang="ko-KR" altLang="en-US" smtClean="0"/>
-              <a:t>2021-03-24</a:t>
+              <a:t>2021-03-25</a:t>
             </a:fld>
             <a:endParaRPr lang="ko-KR" altLang="en-US"/>
           </a:p>
@@ -683,7 +685,7 @@
           <a:p>
             <a:fld id="{3D0AB2D5-C843-415B-A96C-AFAFFAABBECD}" type="datetimeFigureOut">
               <a:rPr lang="ko-KR" altLang="en-US" smtClean="0"/>
-              <a:t>2021-03-24</a:t>
+              <a:t>2021-03-25</a:t>
             </a:fld>
             <a:endParaRPr lang="ko-KR" altLang="en-US"/>
           </a:p>
@@ -881,7 +883,7 @@
           <a:p>
             <a:fld id="{3D0AB2D5-C843-415B-A96C-AFAFFAABBECD}" type="datetimeFigureOut">
               <a:rPr lang="ko-KR" altLang="en-US" smtClean="0"/>
-              <a:t>2021-03-24</a:t>
+              <a:t>2021-03-25</a:t>
             </a:fld>
             <a:endParaRPr lang="ko-KR" altLang="en-US"/>
           </a:p>
@@ -1156,7 +1158,7 @@
           <a:p>
             <a:fld id="{3D0AB2D5-C843-415B-A96C-AFAFFAABBECD}" type="datetimeFigureOut">
               <a:rPr lang="ko-KR" altLang="en-US" smtClean="0"/>
-              <a:t>2021-03-24</a:t>
+              <a:t>2021-03-25</a:t>
             </a:fld>
             <a:endParaRPr lang="ko-KR" altLang="en-US"/>
           </a:p>
@@ -1421,7 +1423,7 @@
           <a:p>
             <a:fld id="{3D0AB2D5-C843-415B-A96C-AFAFFAABBECD}" type="datetimeFigureOut">
               <a:rPr lang="ko-KR" altLang="en-US" smtClean="0"/>
-              <a:t>2021-03-24</a:t>
+              <a:t>2021-03-25</a:t>
             </a:fld>
             <a:endParaRPr lang="ko-KR" altLang="en-US"/>
           </a:p>
@@ -1833,7 +1835,7 @@
           <a:p>
             <a:fld id="{3D0AB2D5-C843-415B-A96C-AFAFFAABBECD}" type="datetimeFigureOut">
               <a:rPr lang="ko-KR" altLang="en-US" smtClean="0"/>
-              <a:t>2021-03-24</a:t>
+              <a:t>2021-03-25</a:t>
             </a:fld>
             <a:endParaRPr lang="ko-KR" altLang="en-US"/>
           </a:p>
@@ -1974,7 +1976,7 @@
           <a:p>
             <a:fld id="{3D0AB2D5-C843-415B-A96C-AFAFFAABBECD}" type="datetimeFigureOut">
               <a:rPr lang="ko-KR" altLang="en-US" smtClean="0"/>
-              <a:t>2021-03-24</a:t>
+              <a:t>2021-03-25</a:t>
             </a:fld>
             <a:endParaRPr lang="ko-KR" altLang="en-US"/>
           </a:p>
@@ -2087,7 +2089,7 @@
           <a:p>
             <a:fld id="{3D0AB2D5-C843-415B-A96C-AFAFFAABBECD}" type="datetimeFigureOut">
               <a:rPr lang="ko-KR" altLang="en-US" smtClean="0"/>
-              <a:t>2021-03-24</a:t>
+              <a:t>2021-03-25</a:t>
             </a:fld>
             <a:endParaRPr lang="ko-KR" altLang="en-US"/>
           </a:p>
@@ -2398,7 +2400,7 @@
           <a:p>
             <a:fld id="{3D0AB2D5-C843-415B-A96C-AFAFFAABBECD}" type="datetimeFigureOut">
               <a:rPr lang="ko-KR" altLang="en-US" smtClean="0"/>
-              <a:t>2021-03-24</a:t>
+              <a:t>2021-03-25</a:t>
             </a:fld>
             <a:endParaRPr lang="ko-KR" altLang="en-US"/>
           </a:p>
@@ -2686,7 +2688,7 @@
           <a:p>
             <a:fld id="{3D0AB2D5-C843-415B-A96C-AFAFFAABBECD}" type="datetimeFigureOut">
               <a:rPr lang="ko-KR" altLang="en-US" smtClean="0"/>
-              <a:t>2021-03-24</a:t>
+              <a:t>2021-03-25</a:t>
             </a:fld>
             <a:endParaRPr lang="ko-KR" altLang="en-US"/>
           </a:p>
@@ -2927,7 +2929,7 @@
           <a:p>
             <a:fld id="{3D0AB2D5-C843-415B-A96C-AFAFFAABBECD}" type="datetimeFigureOut">
               <a:rPr lang="ko-KR" altLang="en-US" smtClean="0"/>
-              <a:t>2021-03-24</a:t>
+              <a:t>2021-03-25</a:t>
             </a:fld>
             <a:endParaRPr lang="ko-KR" altLang="en-US"/>
           </a:p>
@@ -3346,6 +3348,191 @@
       </p:grpSpPr>
       <p:sp>
         <p:nvSpPr>
+          <p:cNvPr id="4" name="TextBox 3">
+            <a:extLst>
+              <a:ext uri="{FF2B5EF4-FFF2-40B4-BE49-F238E27FC236}">
+                <a16:creationId xmlns:a16="http://schemas.microsoft.com/office/drawing/2014/main" id="{179D70D0-4870-4B5C-B17D-EA53EC1C2611}"/>
+              </a:ext>
+            </a:extLst>
+          </p:cNvPr>
+          <p:cNvSpPr txBox="1"/>
+          <p:nvPr/>
+        </p:nvSpPr>
+        <p:spPr>
+          <a:xfrm>
+            <a:off x="208344" y="162046"/>
+            <a:ext cx="6433171" cy="646331"/>
+          </a:xfrm>
+          <a:prstGeom prst="rect">
+            <a:avLst/>
+          </a:prstGeom>
+          <a:noFill/>
+        </p:spPr>
+        <p:txBody>
+          <a:bodyPr wrap="none" rtlCol="0">
+            <a:spAutoFit/>
+          </a:bodyPr>
+          <a:lstStyle/>
+          <a:p>
+            <a:r>
+              <a:rPr lang="en-US" altLang="ko-KR" dirty="0"/>
+              <a:t>Git commit rules</a:t>
+            </a:r>
+          </a:p>
+          <a:p>
+            <a:r>
+              <a:rPr lang="en-US" altLang="ko-KR" dirty="0"/>
+              <a:t>https://blog.ull.im/engineering/2019/03/10/logs-on-git.html</a:t>
+            </a:r>
+          </a:p>
+        </p:txBody>
+      </p:sp>
+      <p:sp>
+        <p:nvSpPr>
+          <p:cNvPr id="5" name="TextBox 4">
+            <a:extLst>
+              <a:ext uri="{FF2B5EF4-FFF2-40B4-BE49-F238E27FC236}">
+                <a16:creationId xmlns:a16="http://schemas.microsoft.com/office/drawing/2014/main" id="{66B550A6-2325-4F5C-8D3D-E9AF0EE7CFD1}"/>
+              </a:ext>
+            </a:extLst>
+          </p:cNvPr>
+          <p:cNvSpPr txBox="1"/>
+          <p:nvPr/>
+        </p:nvSpPr>
+        <p:spPr>
+          <a:xfrm>
+            <a:off x="208344" y="1898908"/>
+            <a:ext cx="4876335" cy="923330"/>
+          </a:xfrm>
+          <a:prstGeom prst="rect">
+            <a:avLst/>
+          </a:prstGeom>
+          <a:noFill/>
+        </p:spPr>
+        <p:txBody>
+          <a:bodyPr wrap="none" rtlCol="0">
+            <a:spAutoFit/>
+          </a:bodyPr>
+          <a:lstStyle/>
+          <a:p>
+            <a:r>
+              <a:rPr lang="en-US" altLang="ko-KR" dirty="0"/>
+              <a:t>Fix</a:t>
+            </a:r>
+            <a:r>
+              <a:rPr lang="ko-KR" altLang="en-US" dirty="0"/>
+              <a:t> </a:t>
+            </a:r>
+            <a:r>
+              <a:rPr lang="en-US" altLang="ko-KR" dirty="0"/>
+              <a:t>A</a:t>
+            </a:r>
+            <a:r>
+              <a:rPr lang="ko-KR" altLang="en-US" dirty="0"/>
+              <a:t> </a:t>
+            </a:r>
+            <a:r>
+              <a:rPr lang="en-US" altLang="ko-KR" dirty="0"/>
+              <a:t>[in B] [which/that C] [to (be)/so that D]</a:t>
+            </a:r>
+          </a:p>
+          <a:p>
+            <a:endParaRPr lang="en-US" altLang="ko-KR" dirty="0"/>
+          </a:p>
+          <a:p>
+            <a:r>
+              <a:rPr lang="en-US" altLang="ko-KR" dirty="0"/>
+              <a:t>Fix issue/error/crash [where/when A]</a:t>
+            </a:r>
+            <a:endParaRPr lang="ko-KR" altLang="en-US" dirty="0"/>
+          </a:p>
+        </p:txBody>
+      </p:sp>
+      <p:sp>
+        <p:nvSpPr>
+          <p:cNvPr id="7" name="TextBox 6">
+            <a:extLst>
+              <a:ext uri="{FF2B5EF4-FFF2-40B4-BE49-F238E27FC236}">
+                <a16:creationId xmlns:a16="http://schemas.microsoft.com/office/drawing/2014/main" id="{0F00DBFF-48CD-4490-9FB2-3A50184A51E4}"/>
+              </a:ext>
+            </a:extLst>
+          </p:cNvPr>
+          <p:cNvSpPr txBox="1"/>
+          <p:nvPr/>
+        </p:nvSpPr>
+        <p:spPr>
+          <a:xfrm>
+            <a:off x="208344" y="3727575"/>
+            <a:ext cx="10767371" cy="1477328"/>
+          </a:xfrm>
+          <a:prstGeom prst="rect">
+            <a:avLst/>
+          </a:prstGeom>
+          <a:noFill/>
+        </p:spPr>
+        <p:txBody>
+          <a:bodyPr wrap="none" rtlCol="0">
+            <a:spAutoFit/>
+          </a:bodyPr>
+          <a:lstStyle/>
+          <a:p>
+            <a:r>
+              <a:rPr lang="en-US" altLang="ko-KR" dirty="0"/>
+              <a:t>Add A [for/to B] || Remove A [from B] || Use A [for/to/in/instead of B] || Update A to B || Make A B ||</a:t>
+            </a:r>
+          </a:p>
+          <a:p>
+            <a:endParaRPr lang="en-US" altLang="ko-KR" dirty="0"/>
+          </a:p>
+          <a:p>
+            <a:r>
+              <a:rPr lang="en-US" altLang="ko-KR" dirty="0"/>
+              <a:t>Refactor/Simplify/Specify/Improve/Implement/Revise/Correct/Ensure/Prevent/Avoid A ||</a:t>
+            </a:r>
+          </a:p>
+          <a:p>
+            <a:endParaRPr lang="en-US" altLang="ko-KR" dirty="0"/>
+          </a:p>
+          <a:p>
+            <a:r>
+              <a:rPr lang="en-US" altLang="ko-KR" dirty="0"/>
+              <a:t>Move A to/into B || Rename A to B || Allow A to B || Verify A || Set A to B || Pass A to B</a:t>
+            </a:r>
+          </a:p>
+        </p:txBody>
+      </p:sp>
+    </p:spTree>
+    <p:extLst>
+      <p:ext uri="{BB962C8B-B14F-4D97-AF65-F5344CB8AC3E}">
+        <p14:creationId xmlns:p14="http://schemas.microsoft.com/office/powerpoint/2010/main" val="3276750450"/>
+      </p:ext>
+    </p:extLst>
+  </p:cSld>
+  <p:clrMapOvr>
+    <a:masterClrMapping/>
+  </p:clrMapOvr>
+</p:sld>
+</file>
+
+<file path=ppt/slides/slide2.xml><?xml version="1.0" encoding="utf-8"?>
+<p:sld xmlns:a="http://schemas.openxmlformats.org/drawingml/2006/main" xmlns:r="http://schemas.openxmlformats.org/officeDocument/2006/relationships" xmlns:p="http://schemas.openxmlformats.org/presentationml/2006/main">
+  <p:cSld>
+    <p:spTree>
+      <p:nvGrpSpPr>
+        <p:cNvPr id="1" name=""/>
+        <p:cNvGrpSpPr/>
+        <p:nvPr/>
+      </p:nvGrpSpPr>
+      <p:grpSpPr>
+        <a:xfrm>
+          <a:off x="0" y="0"/>
+          <a:ext cx="0" cy="0"/>
+          <a:chOff x="0" y="0"/>
+          <a:chExt cx="0" cy="0"/>
+        </a:xfrm>
+      </p:grpSpPr>
+      <p:sp>
+        <p:nvSpPr>
           <p:cNvPr id="4" name="사각형: 둥근 모서리 3">
             <a:extLst>
               <a:ext uri="{FF2B5EF4-FFF2-40B4-BE49-F238E27FC236}">
@@ -3974,7 +4161,7 @@
 </p:sld>
 </file>
 
-<file path=ppt/slides/slide2.xml><?xml version="1.0" encoding="utf-8"?>
+<file path=ppt/slides/slide3.xml><?xml version="1.0" encoding="utf-8"?>
 <p:sld xmlns:a="http://schemas.openxmlformats.org/drawingml/2006/main" xmlns:r="http://schemas.openxmlformats.org/officeDocument/2006/relationships" xmlns:p="http://schemas.openxmlformats.org/presentationml/2006/main">
   <p:cSld>
     <p:spTree>
@@ -5808,7 +5995,7 @@
 </p:sld>
 </file>
 
-<file path=ppt/slides/slide3.xml><?xml version="1.0" encoding="utf-8"?>
+<file path=ppt/slides/slide4.xml><?xml version="1.0" encoding="utf-8"?>
 <p:sld xmlns:a="http://schemas.openxmlformats.org/drawingml/2006/main" xmlns:r="http://schemas.openxmlformats.org/officeDocument/2006/relationships" xmlns:p="http://schemas.openxmlformats.org/presentationml/2006/main">
   <p:cSld>
     <p:spTree>
@@ -6955,7 +7142,940 @@
 </p:sld>
 </file>
 
-<file path=ppt/slides/slide4.xml><?xml version="1.0" encoding="utf-8"?>
+<file path=ppt/slides/slide5.xml><?xml version="1.0" encoding="utf-8"?>
+<p:sld xmlns:a="http://schemas.openxmlformats.org/drawingml/2006/main" xmlns:r="http://schemas.openxmlformats.org/officeDocument/2006/relationships" xmlns:p="http://schemas.openxmlformats.org/presentationml/2006/main">
+  <p:cSld>
+    <p:spTree>
+      <p:nvGrpSpPr>
+        <p:cNvPr id="1" name=""/>
+        <p:cNvGrpSpPr/>
+        <p:nvPr/>
+      </p:nvGrpSpPr>
+      <p:grpSpPr>
+        <a:xfrm>
+          <a:off x="0" y="0"/>
+          <a:ext cx="0" cy="0"/>
+          <a:chOff x="0" y="0"/>
+          <a:chExt cx="0" cy="0"/>
+        </a:xfrm>
+      </p:grpSpPr>
+      <p:sp>
+        <p:nvSpPr>
+          <p:cNvPr id="4" name="직사각형 3">
+            <a:extLst>
+              <a:ext uri="{FF2B5EF4-FFF2-40B4-BE49-F238E27FC236}">
+                <a16:creationId xmlns:a16="http://schemas.microsoft.com/office/drawing/2014/main" id="{B8C693E7-7A39-4923-9F8A-EE57862DD9E5}"/>
+              </a:ext>
+            </a:extLst>
+          </p:cNvPr>
+          <p:cNvSpPr/>
+          <p:nvPr/>
+        </p:nvSpPr>
+        <p:spPr>
+          <a:xfrm>
+            <a:off x="266218" y="261358"/>
+            <a:ext cx="2534855" cy="646331"/>
+          </a:xfrm>
+          <a:prstGeom prst="rect">
+            <a:avLst/>
+          </a:prstGeom>
+        </p:spPr>
+        <p:style>
+          <a:lnRef idx="2">
+            <a:schemeClr val="accent5"/>
+          </a:lnRef>
+          <a:fillRef idx="1">
+            <a:schemeClr val="lt1"/>
+          </a:fillRef>
+          <a:effectRef idx="0">
+            <a:schemeClr val="accent5"/>
+          </a:effectRef>
+          <a:fontRef idx="minor">
+            <a:schemeClr val="dk1"/>
+          </a:fontRef>
+        </p:style>
+        <p:txBody>
+          <a:bodyPr wrap="square" rtlCol="0" anchor="ctr">
+            <a:spAutoFit/>
+          </a:bodyPr>
+          <a:lstStyle/>
+          <a:p>
+            <a:pPr algn="ctr"/>
+            <a:r>
+              <a:rPr lang="en-US" altLang="ko-KR" dirty="0"/>
+              <a:t>Worker threads pool</a:t>
+            </a:r>
+          </a:p>
+          <a:p>
+            <a:pPr algn="ctr"/>
+            <a:r>
+              <a:rPr lang="en-US" altLang="ko-KR" dirty="0"/>
+              <a:t>-&gt; CPU-intensive work</a:t>
+            </a:r>
+            <a:endParaRPr lang="ko-KR" altLang="en-US" dirty="0"/>
+          </a:p>
+        </p:txBody>
+      </p:sp>
+      <p:sp>
+        <p:nvSpPr>
+          <p:cNvPr id="5" name="직사각형 4">
+            <a:extLst>
+              <a:ext uri="{FF2B5EF4-FFF2-40B4-BE49-F238E27FC236}">
+                <a16:creationId xmlns:a16="http://schemas.microsoft.com/office/drawing/2014/main" id="{4B56DCAD-2434-485C-8F6E-608A008E1021}"/>
+              </a:ext>
+            </a:extLst>
+          </p:cNvPr>
+          <p:cNvSpPr/>
+          <p:nvPr/>
+        </p:nvSpPr>
+        <p:spPr>
+          <a:xfrm>
+            <a:off x="3356658" y="673896"/>
+            <a:ext cx="2465408" cy="369332"/>
+          </a:xfrm>
+          <a:prstGeom prst="rect">
+            <a:avLst/>
+          </a:prstGeom>
+        </p:spPr>
+        <p:style>
+          <a:lnRef idx="2">
+            <a:schemeClr val="accent5"/>
+          </a:lnRef>
+          <a:fillRef idx="1">
+            <a:schemeClr val="lt1"/>
+          </a:fillRef>
+          <a:effectRef idx="0">
+            <a:schemeClr val="accent5"/>
+          </a:effectRef>
+          <a:fontRef idx="minor">
+            <a:schemeClr val="dk1"/>
+          </a:fontRef>
+        </p:style>
+        <p:txBody>
+          <a:bodyPr wrap="square" rtlCol="0" anchor="ctr">
+            <a:spAutoFit/>
+          </a:bodyPr>
+          <a:lstStyle/>
+          <a:p>
+            <a:pPr algn="ctr"/>
+            <a:r>
+              <a:rPr lang="en-US" altLang="ko-KR" dirty="0" err="1"/>
+              <a:t>Uncompress</a:t>
+            </a:r>
+            <a:r>
+              <a:rPr lang="en-US" altLang="ko-KR" dirty="0"/>
+              <a:t> zip</a:t>
+            </a:r>
+            <a:endParaRPr lang="ko-KR" altLang="en-US" dirty="0"/>
+          </a:p>
+        </p:txBody>
+      </p:sp>
+      <p:sp>
+        <p:nvSpPr>
+          <p:cNvPr id="6" name="직사각형 5">
+            <a:extLst>
+              <a:ext uri="{FF2B5EF4-FFF2-40B4-BE49-F238E27FC236}">
+                <a16:creationId xmlns:a16="http://schemas.microsoft.com/office/drawing/2014/main" id="{D570E0D6-8EF1-4A1C-A9AB-CFAB8A3F0DDF}"/>
+              </a:ext>
+            </a:extLst>
+          </p:cNvPr>
+          <p:cNvSpPr/>
+          <p:nvPr/>
+        </p:nvSpPr>
+        <p:spPr>
+          <a:xfrm>
+            <a:off x="3356658" y="1096769"/>
+            <a:ext cx="2465408" cy="369332"/>
+          </a:xfrm>
+          <a:prstGeom prst="rect">
+            <a:avLst/>
+          </a:prstGeom>
+        </p:spPr>
+        <p:style>
+          <a:lnRef idx="2">
+            <a:schemeClr val="accent5"/>
+          </a:lnRef>
+          <a:fillRef idx="1">
+            <a:schemeClr val="lt1"/>
+          </a:fillRef>
+          <a:effectRef idx="0">
+            <a:schemeClr val="accent5"/>
+          </a:effectRef>
+          <a:fontRef idx="minor">
+            <a:schemeClr val="dk1"/>
+          </a:fontRef>
+        </p:style>
+        <p:txBody>
+          <a:bodyPr wrap="square" rtlCol="0" anchor="ctr">
+            <a:spAutoFit/>
+          </a:bodyPr>
+          <a:lstStyle/>
+          <a:p>
+            <a:pPr algn="ctr"/>
+            <a:r>
+              <a:rPr lang="en-US" altLang="ko-KR" dirty="0"/>
+              <a:t>Resize image</a:t>
+            </a:r>
+            <a:endParaRPr lang="ko-KR" altLang="en-US" dirty="0"/>
+          </a:p>
+        </p:txBody>
+      </p:sp>
+      <p:sp>
+        <p:nvSpPr>
+          <p:cNvPr id="7" name="직사각형 6">
+            <a:extLst>
+              <a:ext uri="{FF2B5EF4-FFF2-40B4-BE49-F238E27FC236}">
+                <a16:creationId xmlns:a16="http://schemas.microsoft.com/office/drawing/2014/main" id="{5B5C1C5A-38CF-41C6-AA48-893D8FEA5B33}"/>
+              </a:ext>
+            </a:extLst>
+          </p:cNvPr>
+          <p:cNvSpPr/>
+          <p:nvPr/>
+        </p:nvSpPr>
+        <p:spPr>
+          <a:xfrm>
+            <a:off x="3356658" y="238921"/>
+            <a:ext cx="2465409" cy="369332"/>
+          </a:xfrm>
+          <a:prstGeom prst="rect">
+            <a:avLst/>
+          </a:prstGeom>
+        </p:spPr>
+        <p:style>
+          <a:lnRef idx="2">
+            <a:schemeClr val="accent5"/>
+          </a:lnRef>
+          <a:fillRef idx="1">
+            <a:schemeClr val="lt1"/>
+          </a:fillRef>
+          <a:effectRef idx="0">
+            <a:schemeClr val="accent5"/>
+          </a:effectRef>
+          <a:fontRef idx="minor">
+            <a:schemeClr val="dk1"/>
+          </a:fontRef>
+        </p:style>
+        <p:txBody>
+          <a:bodyPr wrap="square" rtlCol="0" anchor="ctr">
+            <a:spAutoFit/>
+          </a:bodyPr>
+          <a:lstStyle/>
+          <a:p>
+            <a:pPr algn="ctr"/>
+            <a:r>
+              <a:rPr lang="en-US" altLang="ko-KR" dirty="0"/>
+              <a:t>Scan/Agent/Database</a:t>
+            </a:r>
+            <a:endParaRPr lang="ko-KR" altLang="en-US" dirty="0"/>
+          </a:p>
+        </p:txBody>
+      </p:sp>
+      <p:sp>
+        <p:nvSpPr>
+          <p:cNvPr id="10" name="TextBox 9">
+            <a:extLst>
+              <a:ext uri="{FF2B5EF4-FFF2-40B4-BE49-F238E27FC236}">
+                <a16:creationId xmlns:a16="http://schemas.microsoft.com/office/drawing/2014/main" id="{1C35E432-9E42-4BB1-8BFC-98214C60F259}"/>
+              </a:ext>
+            </a:extLst>
+          </p:cNvPr>
+          <p:cNvSpPr txBox="1"/>
+          <p:nvPr/>
+        </p:nvSpPr>
+        <p:spPr>
+          <a:xfrm>
+            <a:off x="266218" y="1704023"/>
+            <a:ext cx="4600234" cy="1477328"/>
+          </a:xfrm>
+          <a:prstGeom prst="rect">
+            <a:avLst/>
+          </a:prstGeom>
+          <a:noFill/>
+        </p:spPr>
+        <p:txBody>
+          <a:bodyPr wrap="none" rtlCol="0">
+            <a:spAutoFit/>
+          </a:bodyPr>
+          <a:lstStyle/>
+          <a:p>
+            <a:r>
+              <a:rPr lang="en-US" altLang="ko-KR" dirty="0"/>
+              <a:t>// using built-in module</a:t>
+            </a:r>
+          </a:p>
+          <a:p>
+            <a:r>
+              <a:rPr lang="en-US" altLang="ko-KR" dirty="0"/>
+              <a:t>// index.js</a:t>
+            </a:r>
+          </a:p>
+          <a:p>
+            <a:r>
+              <a:rPr lang="en-US" altLang="ko-KR" dirty="0"/>
+              <a:t>const {Worker} = require(‘</a:t>
+            </a:r>
+            <a:r>
+              <a:rPr lang="en-US" altLang="ko-KR" dirty="0" err="1"/>
+              <a:t>worker_threads</a:t>
+            </a:r>
+            <a:r>
+              <a:rPr lang="en-US" altLang="ko-KR" dirty="0"/>
+              <a:t>’)</a:t>
+            </a:r>
+          </a:p>
+          <a:p>
+            <a:r>
+              <a:rPr lang="en-US" altLang="ko-KR" dirty="0"/>
+              <a:t>const worker = new Worker(‘./process.js’)</a:t>
+            </a:r>
+          </a:p>
+          <a:p>
+            <a:r>
+              <a:rPr lang="en-US" altLang="ko-KR" dirty="0" err="1"/>
+              <a:t>worker.postMesasge</a:t>
+            </a:r>
+            <a:r>
+              <a:rPr lang="en-US" altLang="ko-KR" dirty="0"/>
+              <a:t>(‘ping!’)</a:t>
+            </a:r>
+            <a:endParaRPr lang="ko-KR" altLang="en-US" dirty="0"/>
+          </a:p>
+        </p:txBody>
+      </p:sp>
+      <p:sp>
+        <p:nvSpPr>
+          <p:cNvPr id="11" name="TextBox 10">
+            <a:extLst>
+              <a:ext uri="{FF2B5EF4-FFF2-40B4-BE49-F238E27FC236}">
+                <a16:creationId xmlns:a16="http://schemas.microsoft.com/office/drawing/2014/main" id="{79C12409-2450-434F-8FD8-E459CB167D37}"/>
+              </a:ext>
+            </a:extLst>
+          </p:cNvPr>
+          <p:cNvSpPr txBox="1"/>
+          <p:nvPr/>
+        </p:nvSpPr>
+        <p:spPr>
+          <a:xfrm>
+            <a:off x="5532700" y="1675749"/>
+            <a:ext cx="5210914" cy="1754326"/>
+          </a:xfrm>
+          <a:prstGeom prst="rect">
+            <a:avLst/>
+          </a:prstGeom>
+          <a:noFill/>
+        </p:spPr>
+        <p:txBody>
+          <a:bodyPr wrap="none" rtlCol="0">
+            <a:spAutoFit/>
+          </a:bodyPr>
+          <a:lstStyle/>
+          <a:p>
+            <a:r>
+              <a:rPr lang="en-US" altLang="ko-KR" dirty="0"/>
+              <a:t>//process.js</a:t>
+            </a:r>
+          </a:p>
+          <a:p>
+            <a:r>
+              <a:rPr lang="en-US" altLang="ko-KR" dirty="0"/>
+              <a:t>const {</a:t>
+            </a:r>
+            <a:r>
+              <a:rPr lang="en-US" altLang="ko-KR" dirty="0" err="1"/>
+              <a:t>parentPort</a:t>
+            </a:r>
+            <a:r>
+              <a:rPr lang="en-US" altLang="ko-KR" dirty="0"/>
+              <a:t>} = require(‘</a:t>
+            </a:r>
+            <a:r>
+              <a:rPr lang="en-US" altLang="ko-KR" dirty="0" err="1"/>
+              <a:t>worker_threads</a:t>
+            </a:r>
+            <a:r>
+              <a:rPr lang="en-US" altLang="ko-KR" dirty="0"/>
+              <a:t>’)</a:t>
+            </a:r>
+          </a:p>
+          <a:p>
+            <a:endParaRPr lang="en-US" altLang="ko-KR" dirty="0"/>
+          </a:p>
+          <a:p>
+            <a:r>
+              <a:rPr lang="en-US" altLang="ko-KR" dirty="0" err="1"/>
+              <a:t>parentPort.on</a:t>
+            </a:r>
+            <a:r>
+              <a:rPr lang="en-US" altLang="ko-KR" dirty="0"/>
+              <a:t>(‘message’, msg =&gt; {</a:t>
+            </a:r>
+          </a:p>
+          <a:p>
+            <a:r>
+              <a:rPr lang="en-US" altLang="ko-KR" dirty="0"/>
+              <a:t>  console.log(`worker received message: ${msg}`</a:t>
+            </a:r>
+          </a:p>
+          <a:p>
+            <a:r>
+              <a:rPr lang="en-US" altLang="ko-KR" dirty="0"/>
+              <a:t>})</a:t>
+            </a:r>
+            <a:endParaRPr lang="ko-KR" altLang="en-US" dirty="0"/>
+          </a:p>
+        </p:txBody>
+      </p:sp>
+      <p:cxnSp>
+        <p:nvCxnSpPr>
+          <p:cNvPr id="13" name="직선 연결선 12">
+            <a:extLst>
+              <a:ext uri="{FF2B5EF4-FFF2-40B4-BE49-F238E27FC236}">
+                <a16:creationId xmlns:a16="http://schemas.microsoft.com/office/drawing/2014/main" id="{852A5FBE-BD62-45ED-A9A1-602EA9908FBE}"/>
+              </a:ext>
+            </a:extLst>
+          </p:cNvPr>
+          <p:cNvCxnSpPr/>
+          <p:nvPr/>
+        </p:nvCxnSpPr>
+        <p:spPr>
+          <a:xfrm>
+            <a:off x="0" y="1655180"/>
+            <a:ext cx="12192000" cy="0"/>
+          </a:xfrm>
+          <a:prstGeom prst="line">
+            <a:avLst/>
+          </a:prstGeom>
+        </p:spPr>
+        <p:style>
+          <a:lnRef idx="1">
+            <a:schemeClr val="accent1"/>
+          </a:lnRef>
+          <a:fillRef idx="0">
+            <a:schemeClr val="accent1"/>
+          </a:fillRef>
+          <a:effectRef idx="0">
+            <a:schemeClr val="accent1"/>
+          </a:effectRef>
+          <a:fontRef idx="minor">
+            <a:schemeClr val="tx1"/>
+          </a:fontRef>
+        </p:style>
+      </p:cxnSp>
+      <p:cxnSp>
+        <p:nvCxnSpPr>
+          <p:cNvPr id="14" name="직선 연결선 13">
+            <a:extLst>
+              <a:ext uri="{FF2B5EF4-FFF2-40B4-BE49-F238E27FC236}">
+                <a16:creationId xmlns:a16="http://schemas.microsoft.com/office/drawing/2014/main" id="{91C27E45-8EAD-4700-87E3-E70C66B7EDA5}"/>
+              </a:ext>
+            </a:extLst>
+          </p:cNvPr>
+          <p:cNvCxnSpPr/>
+          <p:nvPr/>
+        </p:nvCxnSpPr>
+        <p:spPr>
+          <a:xfrm>
+            <a:off x="0" y="3454078"/>
+            <a:ext cx="12192000" cy="0"/>
+          </a:xfrm>
+          <a:prstGeom prst="line">
+            <a:avLst/>
+          </a:prstGeom>
+        </p:spPr>
+        <p:style>
+          <a:lnRef idx="1">
+            <a:schemeClr val="accent1"/>
+          </a:lnRef>
+          <a:fillRef idx="0">
+            <a:schemeClr val="accent1"/>
+          </a:fillRef>
+          <a:effectRef idx="0">
+            <a:schemeClr val="accent1"/>
+          </a:effectRef>
+          <a:fontRef idx="minor">
+            <a:schemeClr val="tx1"/>
+          </a:fontRef>
+        </p:style>
+      </p:cxnSp>
+      <p:sp>
+        <p:nvSpPr>
+          <p:cNvPr id="16" name="직사각형 15">
+            <a:extLst>
+              <a:ext uri="{FF2B5EF4-FFF2-40B4-BE49-F238E27FC236}">
+                <a16:creationId xmlns:a16="http://schemas.microsoft.com/office/drawing/2014/main" id="{74471616-CC05-435D-810C-979D3F8B660A}"/>
+              </a:ext>
+            </a:extLst>
+          </p:cNvPr>
+          <p:cNvSpPr/>
+          <p:nvPr/>
+        </p:nvSpPr>
+        <p:spPr>
+          <a:xfrm>
+            <a:off x="266218" y="3782462"/>
+            <a:ext cx="1493134" cy="369332"/>
+          </a:xfrm>
+          <a:prstGeom prst="rect">
+            <a:avLst/>
+          </a:prstGeom>
+        </p:spPr>
+        <p:style>
+          <a:lnRef idx="2">
+            <a:schemeClr val="accent5"/>
+          </a:lnRef>
+          <a:fillRef idx="1">
+            <a:schemeClr val="lt1"/>
+          </a:fillRef>
+          <a:effectRef idx="0">
+            <a:schemeClr val="accent5"/>
+          </a:effectRef>
+          <a:fontRef idx="minor">
+            <a:schemeClr val="dk1"/>
+          </a:fontRef>
+        </p:style>
+        <p:txBody>
+          <a:bodyPr wrap="square" rtlCol="0" anchor="ctr">
+            <a:spAutoFit/>
+          </a:bodyPr>
+          <a:lstStyle/>
+          <a:p>
+            <a:pPr algn="ctr"/>
+            <a:r>
+              <a:rPr lang="en-US" altLang="ko-KR" dirty="0"/>
+              <a:t>./</a:t>
+            </a:r>
+            <a:r>
+              <a:rPr lang="en-US" altLang="ko-KR" dirty="0" err="1"/>
+              <a:t>src</a:t>
+            </a:r>
+            <a:r>
+              <a:rPr lang="en-US" altLang="ko-KR" dirty="0"/>
+              <a:t>/queue</a:t>
+            </a:r>
+            <a:endParaRPr lang="ko-KR" altLang="en-US" dirty="0"/>
+          </a:p>
+        </p:txBody>
+      </p:sp>
+      <p:sp>
+        <p:nvSpPr>
+          <p:cNvPr id="17" name="직사각형 16">
+            <a:extLst>
+              <a:ext uri="{FF2B5EF4-FFF2-40B4-BE49-F238E27FC236}">
+                <a16:creationId xmlns:a16="http://schemas.microsoft.com/office/drawing/2014/main" id="{B0F51652-3412-425B-B8F9-163D61300035}"/>
+              </a:ext>
+            </a:extLst>
+          </p:cNvPr>
+          <p:cNvSpPr/>
+          <p:nvPr/>
+        </p:nvSpPr>
+        <p:spPr>
+          <a:xfrm>
+            <a:off x="1140107" y="4735290"/>
+            <a:ext cx="5110222" cy="369332"/>
+          </a:xfrm>
+          <a:prstGeom prst="rect">
+            <a:avLst/>
+          </a:prstGeom>
+        </p:spPr>
+        <p:style>
+          <a:lnRef idx="2">
+            <a:schemeClr val="accent5"/>
+          </a:lnRef>
+          <a:fillRef idx="1">
+            <a:schemeClr val="lt1"/>
+          </a:fillRef>
+          <a:effectRef idx="0">
+            <a:schemeClr val="accent5"/>
+          </a:effectRef>
+          <a:fontRef idx="minor">
+            <a:schemeClr val="dk1"/>
+          </a:fontRef>
+        </p:style>
+        <p:txBody>
+          <a:bodyPr wrap="square" rtlCol="0" anchor="ctr">
+            <a:spAutoFit/>
+          </a:bodyPr>
+          <a:lstStyle/>
+          <a:p>
+            <a:pPr algn="ctr"/>
+            <a:r>
+              <a:rPr lang="en-US" altLang="ko-KR" dirty="0"/>
+              <a:t>ParentWorker.js (class) @Params </a:t>
+            </a:r>
+            <a:r>
+              <a:rPr lang="en-US" altLang="ko-KR" dirty="0" err="1"/>
+              <a:t>processorPath</a:t>
+            </a:r>
+            <a:r>
+              <a:rPr lang="en-US" altLang="ko-KR" dirty="0"/>
+              <a:t>, </a:t>
+            </a:r>
+            <a:endParaRPr lang="ko-KR" altLang="en-US" dirty="0"/>
+          </a:p>
+        </p:txBody>
+      </p:sp>
+      <p:sp>
+        <p:nvSpPr>
+          <p:cNvPr id="18" name="직사각형 17">
+            <a:extLst>
+              <a:ext uri="{FF2B5EF4-FFF2-40B4-BE49-F238E27FC236}">
+                <a16:creationId xmlns:a16="http://schemas.microsoft.com/office/drawing/2014/main" id="{2559CFB0-C5F5-41E4-A444-10DB52D68AFA}"/>
+              </a:ext>
+            </a:extLst>
+          </p:cNvPr>
+          <p:cNvSpPr/>
+          <p:nvPr/>
+        </p:nvSpPr>
+        <p:spPr>
+          <a:xfrm>
+            <a:off x="1140107" y="4258876"/>
+            <a:ext cx="5110221" cy="369332"/>
+          </a:xfrm>
+          <a:prstGeom prst="rect">
+            <a:avLst/>
+          </a:prstGeom>
+        </p:spPr>
+        <p:style>
+          <a:lnRef idx="2">
+            <a:schemeClr val="accent5"/>
+          </a:lnRef>
+          <a:fillRef idx="1">
+            <a:schemeClr val="lt1"/>
+          </a:fillRef>
+          <a:effectRef idx="0">
+            <a:schemeClr val="accent5"/>
+          </a:effectRef>
+          <a:fontRef idx="minor">
+            <a:schemeClr val="dk1"/>
+          </a:fontRef>
+        </p:style>
+        <p:txBody>
+          <a:bodyPr wrap="square" rtlCol="0" anchor="ctr">
+            <a:spAutoFit/>
+          </a:bodyPr>
+          <a:lstStyle/>
+          <a:p>
+            <a:pPr algn="ctr"/>
+            <a:r>
+              <a:rPr lang="en-US" altLang="ko-KR" dirty="0"/>
+              <a:t>Index.js // export { new </a:t>
+            </a:r>
+            <a:r>
+              <a:rPr lang="en-US" altLang="ko-KR" dirty="0" err="1"/>
+              <a:t>ParentWorker</a:t>
+            </a:r>
+            <a:r>
+              <a:rPr lang="en-US" altLang="ko-KR" dirty="0"/>
+              <a:t>(…), …}</a:t>
+            </a:r>
+            <a:endParaRPr lang="ko-KR" altLang="en-US" dirty="0"/>
+          </a:p>
+        </p:txBody>
+      </p:sp>
+    </p:spTree>
+    <p:extLst>
+      <p:ext uri="{BB962C8B-B14F-4D97-AF65-F5344CB8AC3E}">
+        <p14:creationId xmlns:p14="http://schemas.microsoft.com/office/powerpoint/2010/main" val="1759680056"/>
+      </p:ext>
+    </p:extLst>
+  </p:cSld>
+  <p:clrMapOvr>
+    <a:masterClrMapping/>
+  </p:clrMapOvr>
+</p:sld>
+</file>
+
+<file path=ppt/slides/slide6.xml><?xml version="1.0" encoding="utf-8"?>
+<p:sld xmlns:a="http://schemas.openxmlformats.org/drawingml/2006/main" xmlns:r="http://schemas.openxmlformats.org/officeDocument/2006/relationships" xmlns:p="http://schemas.openxmlformats.org/presentationml/2006/main">
+  <p:cSld>
+    <p:spTree>
+      <p:nvGrpSpPr>
+        <p:cNvPr id="1" name=""/>
+        <p:cNvGrpSpPr/>
+        <p:nvPr/>
+      </p:nvGrpSpPr>
+      <p:grpSpPr>
+        <a:xfrm>
+          <a:off x="0" y="0"/>
+          <a:ext cx="0" cy="0"/>
+          <a:chOff x="0" y="0"/>
+          <a:chExt cx="0" cy="0"/>
+        </a:xfrm>
+      </p:grpSpPr>
+      <p:sp>
+        <p:nvSpPr>
+          <p:cNvPr id="4" name="직사각형 3">
+            <a:extLst>
+              <a:ext uri="{FF2B5EF4-FFF2-40B4-BE49-F238E27FC236}">
+                <a16:creationId xmlns:a16="http://schemas.microsoft.com/office/drawing/2014/main" id="{09115223-A1C2-44DE-94BB-4AE82D51E696}"/>
+              </a:ext>
+            </a:extLst>
+          </p:cNvPr>
+          <p:cNvSpPr/>
+          <p:nvPr/>
+        </p:nvSpPr>
+        <p:spPr>
+          <a:xfrm>
+            <a:off x="162046" y="122461"/>
+            <a:ext cx="2164466" cy="646331"/>
+          </a:xfrm>
+          <a:prstGeom prst="rect">
+            <a:avLst/>
+          </a:prstGeom>
+        </p:spPr>
+        <p:style>
+          <a:lnRef idx="2">
+            <a:schemeClr val="accent5"/>
+          </a:lnRef>
+          <a:fillRef idx="1">
+            <a:schemeClr val="lt1"/>
+          </a:fillRef>
+          <a:effectRef idx="0">
+            <a:schemeClr val="accent5"/>
+          </a:effectRef>
+          <a:fontRef idx="minor">
+            <a:schemeClr val="dk1"/>
+          </a:fontRef>
+        </p:style>
+        <p:txBody>
+          <a:bodyPr wrap="square" rtlCol="0" anchor="ctr">
+            <a:spAutoFit/>
+          </a:bodyPr>
+          <a:lstStyle/>
+          <a:p>
+            <a:pPr algn="ctr"/>
+            <a:r>
+              <a:rPr lang="en-US" altLang="ko-KR" dirty="0"/>
+              <a:t>Worker pool Module piscina</a:t>
+            </a:r>
+            <a:endParaRPr lang="ko-KR" altLang="en-US" dirty="0"/>
+          </a:p>
+        </p:txBody>
+      </p:sp>
+      <p:sp>
+        <p:nvSpPr>
+          <p:cNvPr id="5" name="TextBox 4">
+            <a:extLst>
+              <a:ext uri="{FF2B5EF4-FFF2-40B4-BE49-F238E27FC236}">
+                <a16:creationId xmlns:a16="http://schemas.microsoft.com/office/drawing/2014/main" id="{5C41C036-1D21-410D-8858-7EA953A25EC4}"/>
+              </a:ext>
+            </a:extLst>
+          </p:cNvPr>
+          <p:cNvSpPr txBox="1"/>
+          <p:nvPr/>
+        </p:nvSpPr>
+        <p:spPr>
+          <a:xfrm>
+            <a:off x="462987" y="1006997"/>
+            <a:ext cx="6136808" cy="5632311"/>
+          </a:xfrm>
+          <a:prstGeom prst="rect">
+            <a:avLst/>
+          </a:prstGeom>
+          <a:noFill/>
+        </p:spPr>
+        <p:txBody>
+          <a:bodyPr wrap="none" rtlCol="0">
+            <a:spAutoFit/>
+          </a:bodyPr>
+          <a:lstStyle/>
+          <a:p>
+            <a:r>
+              <a:rPr lang="en-US" altLang="ko-KR" dirty="0"/>
+              <a:t>// main.js</a:t>
+            </a:r>
+          </a:p>
+          <a:p>
+            <a:r>
+              <a:rPr lang="en-US" altLang="ko-KR" dirty="0"/>
+              <a:t>const Piscina = require(‘piscina’)</a:t>
+            </a:r>
+          </a:p>
+          <a:p>
+            <a:r>
+              <a:rPr lang="en-US" altLang="ko-KR" dirty="0"/>
+              <a:t>const piscina = new Piscina({</a:t>
+            </a:r>
+          </a:p>
+          <a:p>
+            <a:r>
+              <a:rPr lang="en-US" altLang="ko-KR" dirty="0"/>
+              <a:t>  filename: </a:t>
+            </a:r>
+            <a:r>
+              <a:rPr lang="en-US" altLang="ko-KR" dirty="0" err="1"/>
+              <a:t>path.resolve</a:t>
+            </a:r>
+            <a:r>
+              <a:rPr lang="en-US" altLang="ko-KR" dirty="0"/>
+              <a:t>(__</a:t>
+            </a:r>
+            <a:r>
+              <a:rPr lang="en-US" altLang="ko-KR" dirty="0" err="1"/>
+              <a:t>dirname</a:t>
+            </a:r>
+            <a:r>
+              <a:rPr lang="en-US" altLang="ko-KR" dirty="0"/>
+              <a:t>, ‘worker.js’),</a:t>
+            </a:r>
+          </a:p>
+          <a:p>
+            <a:r>
+              <a:rPr lang="en-US" altLang="ko-KR" dirty="0"/>
+              <a:t>  </a:t>
+            </a:r>
+            <a:r>
+              <a:rPr lang="en-US" altLang="ko-KR" dirty="0" err="1"/>
+              <a:t>maxQueue</a:t>
+            </a:r>
+            <a:r>
+              <a:rPr lang="en-US" altLang="ko-KR" dirty="0"/>
+              <a:t>: ‘auto’,</a:t>
+            </a:r>
+          </a:p>
+          <a:p>
+            <a:r>
+              <a:rPr lang="en-US" altLang="ko-KR" dirty="0"/>
+              <a:t>});</a:t>
+            </a:r>
+          </a:p>
+          <a:p>
+            <a:endParaRPr lang="en-US" altLang="ko-KR" dirty="0"/>
+          </a:p>
+          <a:p>
+            <a:r>
+              <a:rPr lang="en-US" altLang="ko-KR" dirty="0"/>
+              <a:t>(</a:t>
+            </a:r>
+          </a:p>
+          <a:p>
+            <a:r>
+              <a:rPr lang="en-US" altLang="ko-KR" dirty="0"/>
+              <a:t>async function(){</a:t>
+            </a:r>
+          </a:p>
+          <a:p>
+            <a:r>
+              <a:rPr lang="en-US" altLang="ko-KR" dirty="0"/>
+              <a:t>  const </a:t>
+            </a:r>
+            <a:r>
+              <a:rPr lang="en-US" altLang="ko-KR" dirty="0" err="1"/>
+              <a:t>abortController</a:t>
+            </a:r>
+            <a:r>
+              <a:rPr lang="en-US" altLang="ko-KR" dirty="0"/>
+              <a:t> = new </a:t>
+            </a:r>
+            <a:r>
+              <a:rPr lang="en-US" altLang="ko-KR" dirty="0" err="1"/>
+              <a:t>AbortController</a:t>
+            </a:r>
+            <a:r>
+              <a:rPr lang="en-US" altLang="ko-KR" dirty="0"/>
+              <a:t>();</a:t>
+            </a:r>
+          </a:p>
+          <a:p>
+            <a:r>
+              <a:rPr lang="en-US" altLang="ko-KR" dirty="0"/>
+              <a:t>  try{</a:t>
+            </a:r>
+          </a:p>
+          <a:p>
+            <a:r>
+              <a:rPr lang="en-US" altLang="ko-KR" dirty="0"/>
+              <a:t>    const task = </a:t>
+            </a:r>
+            <a:r>
+              <a:rPr lang="en-US" altLang="ko-KR" dirty="0" err="1"/>
+              <a:t>piscina.runTask</a:t>
+            </a:r>
+            <a:r>
+              <a:rPr lang="en-US" altLang="ko-KR" dirty="0"/>
+              <a:t>({}, </a:t>
+            </a:r>
+            <a:r>
+              <a:rPr lang="en-US" altLang="ko-KR" dirty="0" err="1"/>
+              <a:t>abortController.signal</a:t>
+            </a:r>
+            <a:r>
+              <a:rPr lang="en-US" altLang="ko-KR" dirty="0"/>
+              <a:t>);</a:t>
+            </a:r>
+          </a:p>
+          <a:p>
+            <a:r>
+              <a:rPr lang="en-US" altLang="ko-KR" dirty="0"/>
+              <a:t>    // abort  task</a:t>
+            </a:r>
+          </a:p>
+          <a:p>
+            <a:r>
+              <a:rPr lang="en-US" altLang="ko-KR" dirty="0"/>
+              <a:t>    // </a:t>
+            </a:r>
+            <a:r>
+              <a:rPr lang="en-US" altLang="ko-KR" dirty="0" err="1"/>
+              <a:t>abortController.abort</a:t>
+            </a:r>
+            <a:r>
+              <a:rPr lang="en-US" altLang="ko-KR" dirty="0"/>
+              <a:t>();</a:t>
+            </a:r>
+          </a:p>
+          <a:p>
+            <a:r>
+              <a:rPr lang="en-US" altLang="ko-KR" dirty="0"/>
+              <a:t>    const result = await task;</a:t>
+            </a:r>
+          </a:p>
+          <a:p>
+            <a:r>
+              <a:rPr lang="en-US" altLang="ko-KR" dirty="0"/>
+              <a:t>  } catch(e){</a:t>
+            </a:r>
+          </a:p>
+          <a:p>
+            <a:r>
+              <a:rPr lang="en-US" altLang="ko-KR" dirty="0"/>
+              <a:t>    console.log(`The task was cancelled’);</a:t>
+            </a:r>
+          </a:p>
+          <a:p>
+            <a:r>
+              <a:rPr lang="en-US" altLang="ko-KR" dirty="0"/>
+              <a:t>  }</a:t>
+            </a:r>
+          </a:p>
+          <a:p>
+            <a:r>
+              <a:rPr lang="en-US" altLang="ko-KR" dirty="0"/>
+              <a:t>}</a:t>
+            </a:r>
+          </a:p>
+          <a:p>
+            <a:r>
+              <a:rPr lang="en-US" altLang="ko-KR" dirty="0"/>
+              <a:t>)();</a:t>
+            </a:r>
+            <a:endParaRPr lang="ko-KR" altLang="en-US" dirty="0"/>
+          </a:p>
+        </p:txBody>
+      </p:sp>
+    </p:spTree>
+    <p:extLst>
+      <p:ext uri="{BB962C8B-B14F-4D97-AF65-F5344CB8AC3E}">
+        <p14:creationId xmlns:p14="http://schemas.microsoft.com/office/powerpoint/2010/main" val="2291508079"/>
+      </p:ext>
+    </p:extLst>
+  </p:cSld>
+  <p:clrMapOvr>
+    <a:masterClrMapping/>
+  </p:clrMapOvr>
+</p:sld>
+</file>
+
+<file path=ppt/slides/slide7.xml><?xml version="1.0" encoding="utf-8"?>
 <p:sld xmlns:a="http://schemas.openxmlformats.org/drawingml/2006/main" xmlns:r="http://schemas.openxmlformats.org/officeDocument/2006/relationships" xmlns:p="http://schemas.openxmlformats.org/presentationml/2006/main">
   <p:cSld>
     <p:spTree>
@@ -7200,7 +8320,7 @@
 </p:sld>
 </file>
 
-<file path=ppt/slides/slide5.xml><?xml version="1.0" encoding="utf-8"?>
+<file path=ppt/slides/slide8.xml><?xml version="1.0" encoding="utf-8"?>
 <p:sld xmlns:a="http://schemas.openxmlformats.org/drawingml/2006/main" xmlns:r="http://schemas.openxmlformats.org/officeDocument/2006/relationships" xmlns:p="http://schemas.openxmlformats.org/presentationml/2006/main">
   <p:cSld>
     <p:spTree>
@@ -8788,7 +9908,7 @@
 </p:sld>
 </file>
 
-<file path=ppt/slides/slide6.xml><?xml version="1.0" encoding="utf-8"?>
+<file path=ppt/slides/slide9.xml><?xml version="1.0" encoding="utf-8"?>
 <p:sld xmlns:a="http://schemas.openxmlformats.org/drawingml/2006/main" xmlns:r="http://schemas.openxmlformats.org/officeDocument/2006/relationships" xmlns:p="http://schemas.openxmlformats.org/presentationml/2006/main">
   <p:cSld>
     <p:spTree>
@@ -10822,191 +11942,6 @@
 </p:sld>
 </file>
 
-<file path=ppt/slides/slide7.xml><?xml version="1.0" encoding="utf-8"?>
-<p:sld xmlns:a="http://schemas.openxmlformats.org/drawingml/2006/main" xmlns:r="http://schemas.openxmlformats.org/officeDocument/2006/relationships" xmlns:p="http://schemas.openxmlformats.org/presentationml/2006/main">
-  <p:cSld>
-    <p:spTree>
-      <p:nvGrpSpPr>
-        <p:cNvPr id="1" name=""/>
-        <p:cNvGrpSpPr/>
-        <p:nvPr/>
-      </p:nvGrpSpPr>
-      <p:grpSpPr>
-        <a:xfrm>
-          <a:off x="0" y="0"/>
-          <a:ext cx="0" cy="0"/>
-          <a:chOff x="0" y="0"/>
-          <a:chExt cx="0" cy="0"/>
-        </a:xfrm>
-      </p:grpSpPr>
-      <p:sp>
-        <p:nvSpPr>
-          <p:cNvPr id="4" name="TextBox 3">
-            <a:extLst>
-              <a:ext uri="{FF2B5EF4-FFF2-40B4-BE49-F238E27FC236}">
-                <a16:creationId xmlns:a16="http://schemas.microsoft.com/office/drawing/2014/main" id="{179D70D0-4870-4B5C-B17D-EA53EC1C2611}"/>
-              </a:ext>
-            </a:extLst>
-          </p:cNvPr>
-          <p:cNvSpPr txBox="1"/>
-          <p:nvPr/>
-        </p:nvSpPr>
-        <p:spPr>
-          <a:xfrm>
-            <a:off x="208344" y="162046"/>
-            <a:ext cx="6433171" cy="646331"/>
-          </a:xfrm>
-          <a:prstGeom prst="rect">
-            <a:avLst/>
-          </a:prstGeom>
-          <a:noFill/>
-        </p:spPr>
-        <p:txBody>
-          <a:bodyPr wrap="none" rtlCol="0">
-            <a:spAutoFit/>
-          </a:bodyPr>
-          <a:lstStyle/>
-          <a:p>
-            <a:r>
-              <a:rPr lang="en-US" altLang="ko-KR" dirty="0"/>
-              <a:t>Git commit rules</a:t>
-            </a:r>
-          </a:p>
-          <a:p>
-            <a:r>
-              <a:rPr lang="en-US" altLang="ko-KR" dirty="0"/>
-              <a:t>https://blog.ull.im/engineering/2019/03/10/logs-on-git.html</a:t>
-            </a:r>
-          </a:p>
-        </p:txBody>
-      </p:sp>
-      <p:sp>
-        <p:nvSpPr>
-          <p:cNvPr id="5" name="TextBox 4">
-            <a:extLst>
-              <a:ext uri="{FF2B5EF4-FFF2-40B4-BE49-F238E27FC236}">
-                <a16:creationId xmlns:a16="http://schemas.microsoft.com/office/drawing/2014/main" id="{66B550A6-2325-4F5C-8D3D-E9AF0EE7CFD1}"/>
-              </a:ext>
-            </a:extLst>
-          </p:cNvPr>
-          <p:cNvSpPr txBox="1"/>
-          <p:nvPr/>
-        </p:nvSpPr>
-        <p:spPr>
-          <a:xfrm>
-            <a:off x="208344" y="1898908"/>
-            <a:ext cx="4876335" cy="923330"/>
-          </a:xfrm>
-          <a:prstGeom prst="rect">
-            <a:avLst/>
-          </a:prstGeom>
-          <a:noFill/>
-        </p:spPr>
-        <p:txBody>
-          <a:bodyPr wrap="none" rtlCol="0">
-            <a:spAutoFit/>
-          </a:bodyPr>
-          <a:lstStyle/>
-          <a:p>
-            <a:r>
-              <a:rPr lang="en-US" altLang="ko-KR" dirty="0"/>
-              <a:t>Fix</a:t>
-            </a:r>
-            <a:r>
-              <a:rPr lang="ko-KR" altLang="en-US" dirty="0"/>
-              <a:t> </a:t>
-            </a:r>
-            <a:r>
-              <a:rPr lang="en-US" altLang="ko-KR" dirty="0"/>
-              <a:t>A</a:t>
-            </a:r>
-            <a:r>
-              <a:rPr lang="ko-KR" altLang="en-US" dirty="0"/>
-              <a:t> </a:t>
-            </a:r>
-            <a:r>
-              <a:rPr lang="en-US" altLang="ko-KR" dirty="0"/>
-              <a:t>[in B] [which/that C] [to (be)/so that D]</a:t>
-            </a:r>
-          </a:p>
-          <a:p>
-            <a:endParaRPr lang="en-US" altLang="ko-KR" dirty="0"/>
-          </a:p>
-          <a:p>
-            <a:r>
-              <a:rPr lang="en-US" altLang="ko-KR" dirty="0"/>
-              <a:t>Fix issue/error/crash [where/when A]</a:t>
-            </a:r>
-            <a:endParaRPr lang="ko-KR" altLang="en-US" dirty="0"/>
-          </a:p>
-        </p:txBody>
-      </p:sp>
-      <p:sp>
-        <p:nvSpPr>
-          <p:cNvPr id="7" name="TextBox 6">
-            <a:extLst>
-              <a:ext uri="{FF2B5EF4-FFF2-40B4-BE49-F238E27FC236}">
-                <a16:creationId xmlns:a16="http://schemas.microsoft.com/office/drawing/2014/main" id="{0F00DBFF-48CD-4490-9FB2-3A50184A51E4}"/>
-              </a:ext>
-            </a:extLst>
-          </p:cNvPr>
-          <p:cNvSpPr txBox="1"/>
-          <p:nvPr/>
-        </p:nvSpPr>
-        <p:spPr>
-          <a:xfrm>
-            <a:off x="208344" y="3727575"/>
-            <a:ext cx="10767371" cy="1477328"/>
-          </a:xfrm>
-          <a:prstGeom prst="rect">
-            <a:avLst/>
-          </a:prstGeom>
-          <a:noFill/>
-        </p:spPr>
-        <p:txBody>
-          <a:bodyPr wrap="none" rtlCol="0">
-            <a:spAutoFit/>
-          </a:bodyPr>
-          <a:lstStyle/>
-          <a:p>
-            <a:r>
-              <a:rPr lang="en-US" altLang="ko-KR" dirty="0"/>
-              <a:t>Add A [for/to B] || Remove A [from B] || Use A [for/to/in/instead of B] || Update A to B || Make A B ||</a:t>
-            </a:r>
-          </a:p>
-          <a:p>
-            <a:endParaRPr lang="en-US" altLang="ko-KR" dirty="0"/>
-          </a:p>
-          <a:p>
-            <a:r>
-              <a:rPr lang="en-US" altLang="ko-KR" dirty="0"/>
-              <a:t>Refactor/Simplify/Specify/Improve/Implement/Revise/Correct/Ensure/Prevent/Avoid A ||</a:t>
-            </a:r>
-          </a:p>
-          <a:p>
-            <a:endParaRPr lang="en-US" altLang="ko-KR" dirty="0"/>
-          </a:p>
-          <a:p>
-            <a:r>
-              <a:rPr lang="en-US" altLang="ko-KR" dirty="0"/>
-              <a:t>Move A to/into B || Rename A to B || Allow A to B || Verify A || Set A to B || Pass A to B</a:t>
-            </a:r>
-          </a:p>
-        </p:txBody>
-      </p:sp>
-    </p:spTree>
-    <p:extLst>
-      <p:ext uri="{BB962C8B-B14F-4D97-AF65-F5344CB8AC3E}">
-        <p14:creationId xmlns:p14="http://schemas.microsoft.com/office/powerpoint/2010/main" val="3276750450"/>
-      </p:ext>
-    </p:extLst>
-  </p:cSld>
-  <p:clrMapOvr>
-    <a:masterClrMapping/>
-  </p:clrMapOvr>
-</p:sld>
-</file>
-
 <file path=ppt/theme/theme1.xml><?xml version="1.0" encoding="utf-8"?>
 <a:theme xmlns:a="http://schemas.openxmlformats.org/drawingml/2006/main" name="Office 테마">
   <a:themeElements>

</xml_diff>